<commit_message>
update environment setup links
</commit_message>
<xml_diff>
--- a/03. Programming Basics/Presentation/Program Flow Control.pptx
+++ b/03. Programming Basics/Presentation/Program Flow Control.pptx
@@ -2,7 +2,7 @@
 <file path=ppt/presentation.xml><?xml version="1.0" encoding="utf-8"?>
 <p:presentation xmlns:a="http://schemas.openxmlformats.org/drawingml/2006/main" xmlns:r="http://schemas.openxmlformats.org/officeDocument/2006/relationships" xmlns:p="http://schemas.openxmlformats.org/presentationml/2006/main" saveSubsetFonts="1" autoCompressPictures="0">
   <p:sldMasterIdLst>
-    <p:sldMasterId id="2147483709" r:id="rId1"/>
+    <p:sldMasterId id="2147483648" r:id="rId1"/>
   </p:sldMasterIdLst>
   <p:notesMasterIdLst>
     <p:notesMasterId r:id="rId21"/>
@@ -14,7 +14,7 @@
     <p:sldId id="260" r:id="rId5"/>
     <p:sldId id="261" r:id="rId6"/>
     <p:sldId id="262" r:id="rId7"/>
-    <p:sldId id="263" r:id="rId8"/>
+    <p:sldId id="321" r:id="rId8"/>
     <p:sldId id="264" r:id="rId9"/>
     <p:sldId id="265" r:id="rId10"/>
     <p:sldId id="269" r:id="rId11"/>
@@ -26,15 +26,15 @@
     <p:sldId id="276" r:id="rId17"/>
     <p:sldId id="277" r:id="rId18"/>
     <p:sldId id="278" r:id="rId19"/>
-    <p:sldId id="321" r:id="rId20"/>
+    <p:sldId id="322" r:id="rId20"/>
   </p:sldIdLst>
-  <p:sldSz cx="9144000" cy="6858000" type="screen4x3"/>
+  <p:sldSz cx="12192000" cy="6858000"/>
   <p:notesSz cx="6858000" cy="9144000"/>
   <p:defaultTextStyle>
     <a:defPPr>
       <a:defRPr lang="en-US"/>
     </a:defPPr>
-    <a:lvl1pPr marL="0" algn="l" defTabSz="457200" rtl="0" eaLnBrk="1" latinLnBrk="0" hangingPunct="1">
+    <a:lvl1pPr marL="0" algn="l" defTabSz="914400" rtl="0" eaLnBrk="1" latinLnBrk="0" hangingPunct="1">
       <a:defRPr sz="1800" kern="1200">
         <a:solidFill>
           <a:schemeClr val="tx1"/>
@@ -44,7 +44,7 @@
         <a:cs typeface="+mn-cs"/>
       </a:defRPr>
     </a:lvl1pPr>
-    <a:lvl2pPr marL="457200" algn="l" defTabSz="457200" rtl="0" eaLnBrk="1" latinLnBrk="0" hangingPunct="1">
+    <a:lvl2pPr marL="457200" algn="l" defTabSz="914400" rtl="0" eaLnBrk="1" latinLnBrk="0" hangingPunct="1">
       <a:defRPr sz="1800" kern="1200">
         <a:solidFill>
           <a:schemeClr val="tx1"/>
@@ -54,7 +54,7 @@
         <a:cs typeface="+mn-cs"/>
       </a:defRPr>
     </a:lvl2pPr>
-    <a:lvl3pPr marL="914400" algn="l" defTabSz="457200" rtl="0" eaLnBrk="1" latinLnBrk="0" hangingPunct="1">
+    <a:lvl3pPr marL="914400" algn="l" defTabSz="914400" rtl="0" eaLnBrk="1" latinLnBrk="0" hangingPunct="1">
       <a:defRPr sz="1800" kern="1200">
         <a:solidFill>
           <a:schemeClr val="tx1"/>
@@ -64,7 +64,7 @@
         <a:cs typeface="+mn-cs"/>
       </a:defRPr>
     </a:lvl3pPr>
-    <a:lvl4pPr marL="1371600" algn="l" defTabSz="457200" rtl="0" eaLnBrk="1" latinLnBrk="0" hangingPunct="1">
+    <a:lvl4pPr marL="1371600" algn="l" defTabSz="914400" rtl="0" eaLnBrk="1" latinLnBrk="0" hangingPunct="1">
       <a:defRPr sz="1800" kern="1200">
         <a:solidFill>
           <a:schemeClr val="tx1"/>
@@ -74,7 +74,7 @@
         <a:cs typeface="+mn-cs"/>
       </a:defRPr>
     </a:lvl4pPr>
-    <a:lvl5pPr marL="1828800" algn="l" defTabSz="457200" rtl="0" eaLnBrk="1" latinLnBrk="0" hangingPunct="1">
+    <a:lvl5pPr marL="1828800" algn="l" defTabSz="914400" rtl="0" eaLnBrk="1" latinLnBrk="0" hangingPunct="1">
       <a:defRPr sz="1800" kern="1200">
         <a:solidFill>
           <a:schemeClr val="tx1"/>
@@ -84,7 +84,7 @@
         <a:cs typeface="+mn-cs"/>
       </a:defRPr>
     </a:lvl5pPr>
-    <a:lvl6pPr marL="2286000" algn="l" defTabSz="457200" rtl="0" eaLnBrk="1" latinLnBrk="0" hangingPunct="1">
+    <a:lvl6pPr marL="2286000" algn="l" defTabSz="914400" rtl="0" eaLnBrk="1" latinLnBrk="0" hangingPunct="1">
       <a:defRPr sz="1800" kern="1200">
         <a:solidFill>
           <a:schemeClr val="tx1"/>
@@ -94,7 +94,7 @@
         <a:cs typeface="+mn-cs"/>
       </a:defRPr>
     </a:lvl6pPr>
-    <a:lvl7pPr marL="2743200" algn="l" defTabSz="457200" rtl="0" eaLnBrk="1" latinLnBrk="0" hangingPunct="1">
+    <a:lvl7pPr marL="2743200" algn="l" defTabSz="914400" rtl="0" eaLnBrk="1" latinLnBrk="0" hangingPunct="1">
       <a:defRPr sz="1800" kern="1200">
         <a:solidFill>
           <a:schemeClr val="tx1"/>
@@ -104,7 +104,7 @@
         <a:cs typeface="+mn-cs"/>
       </a:defRPr>
     </a:lvl7pPr>
-    <a:lvl8pPr marL="3200400" algn="l" defTabSz="457200" rtl="0" eaLnBrk="1" latinLnBrk="0" hangingPunct="1">
+    <a:lvl8pPr marL="3200400" algn="l" defTabSz="914400" rtl="0" eaLnBrk="1" latinLnBrk="0" hangingPunct="1">
       <a:defRPr sz="1800" kern="1200">
         <a:solidFill>
           <a:schemeClr val="tx1"/>
@@ -114,7 +114,7 @@
         <a:cs typeface="+mn-cs"/>
       </a:defRPr>
     </a:lvl8pPr>
-    <a:lvl9pPr marL="3657600" algn="l" defTabSz="457200" rtl="0" eaLnBrk="1" latinLnBrk="0" hangingPunct="1">
+    <a:lvl9pPr marL="3657600" algn="l" defTabSz="914400" rtl="0" eaLnBrk="1" latinLnBrk="0" hangingPunct="1">
       <a:defRPr sz="1800" kern="1200">
         <a:solidFill>
           <a:schemeClr val="tx1"/>
@@ -127,18 +127,7 @@
   </p:defaultTextStyle>
   <p:extLst>
     <p:ext uri="{EFAFB233-063F-42B5-8137-9DF3F51BA10A}">
-      <p15:sldGuideLst xmlns:p15="http://schemas.microsoft.com/office/powerpoint/2012/main">
-        <p15:guide id="1" orient="horz" pos="2160">
-          <p15:clr>
-            <a:srgbClr val="A4A3A4"/>
-          </p15:clr>
-        </p15:guide>
-        <p15:guide id="2" pos="2880">
-          <p15:clr>
-            <a:srgbClr val="A4A3A4"/>
-          </p15:clr>
-        </p15:guide>
-      </p15:sldGuideLst>
+      <p15:sldGuideLst xmlns:p15="http://schemas.microsoft.com/office/powerpoint/2012/main"/>
     </p:ext>
   </p:extLst>
 </p:presentation>
@@ -224,9 +213,9 @@
             </a:lvl1pPr>
           </a:lstStyle>
           <a:p>
-            <a:fld id="{D7492970-DFEC-9C47-BA83-F3D32BFB63B2}" type="datetimeFigureOut">
+            <a:fld id="{7387BF4C-1AC5-8047-9CB7-F6FE835C9ED7}" type="datetimeFigureOut">
               <a:rPr lang="en-US" smtClean="0"/>
-              <a:t>9/19/22</a:t>
+              <a:t>5/28/23</a:t>
             </a:fld>
             <a:endParaRPr lang="en-US"/>
           </a:p>
@@ -244,8 +233,8 @@
         </p:nvSpPr>
         <p:spPr>
           <a:xfrm>
-            <a:off x="1371600" y="1143000"/>
-            <a:ext cx="4114800" cy="3086100"/>
+            <a:off x="685800" y="1143000"/>
+            <a:ext cx="5486400" cy="3086100"/>
           </a:xfrm>
           <a:prstGeom prst="rect">
             <a:avLst/>
@@ -382,7 +371,7 @@
             </a:lvl1pPr>
           </a:lstStyle>
           <a:p>
-            <a:fld id="{4FBF9678-D9E4-7549-B0BA-F9332B0E31CE}" type="slidenum">
+            <a:fld id="{22AC1118-207A-2F4A-BE1B-12455BD6056C}" type="slidenum">
               <a:rPr lang="en-US" smtClean="0"/>
               <a:t>‹#›</a:t>
             </a:fld>
@@ -393,7 +382,7 @@
     </p:spTree>
     <p:extLst>
       <p:ext uri="{BB962C8B-B14F-4D97-AF65-F5344CB8AC3E}">
-        <p14:creationId xmlns:p14="http://schemas.microsoft.com/office/powerpoint/2010/main" val="2925578516"/>
+        <p14:creationId xmlns:p14="http://schemas.microsoft.com/office/powerpoint/2010/main" val="796951922"/>
       </p:ext>
     </p:extLst>
   </p:cSld>
@@ -494,7 +483,7 @@
 </file>
 
 <file path=ppt/slideLayouts/slideLayout1.xml><?xml version="1.0" encoding="utf-8"?>
-<p:sldLayout xmlns:a="http://schemas.openxmlformats.org/drawingml/2006/main" xmlns:r="http://schemas.openxmlformats.org/officeDocument/2006/relationships" xmlns:p="http://schemas.openxmlformats.org/presentationml/2006/main" showMasterSp="0" type="title" preserve="1">
+<p:sldLayout xmlns:a="http://schemas.openxmlformats.org/drawingml/2006/main" xmlns:r="http://schemas.openxmlformats.org/officeDocument/2006/relationships" xmlns:p="http://schemas.openxmlformats.org/presentationml/2006/main" type="title" preserve="1">
   <p:cSld name="Title Slide">
     <p:spTree>
       <p:nvGrpSpPr>
@@ -512,7 +501,13 @@
       </p:grpSpPr>
       <p:sp>
         <p:nvSpPr>
-          <p:cNvPr id="2" name="Title 1"/>
+          <p:cNvPr id="2" name="Title 1">
+            <a:extLst>
+              <a:ext uri="{FF2B5EF4-FFF2-40B4-BE49-F238E27FC236}">
+                <a16:creationId xmlns:a16="http://schemas.microsoft.com/office/drawing/2014/main" id="{0D937894-C376-5539-0900-2C9FE59CD569}"/>
+              </a:ext>
+            </a:extLst>
+          </p:cNvPr>
           <p:cNvSpPr>
             <a:spLocks noGrp="1"/>
           </p:cNvSpPr>
@@ -522,17 +517,15 @@
         </p:nvSpPr>
         <p:spPr>
           <a:xfrm>
-            <a:off x="342900" y="4960137"/>
-            <a:ext cx="5829300" cy="1463040"/>
+            <a:off x="1524000" y="1122363"/>
+            <a:ext cx="9144000" cy="2387600"/>
           </a:xfrm>
         </p:spPr>
         <p:txBody>
-          <a:bodyPr anchor="ctr">
-            <a:normAutofit/>
-          </a:bodyPr>
+          <a:bodyPr anchor="b"/>
           <a:lstStyle>
-            <a:lvl1pPr algn="r">
-              <a:defRPr sz="4400" spc="200" baseline="0"/>
+            <a:lvl1pPr algn="ctr">
+              <a:defRPr sz="6000"/>
             </a:lvl1pPr>
           </a:lstStyle>
           <a:p>
@@ -540,13 +533,18 @@
               <a:rPr lang="en-US"/>
               <a:t>Click to edit Master title style</a:t>
             </a:r>
-            <a:endParaRPr lang="en-US" dirty="0"/>
           </a:p>
         </p:txBody>
       </p:sp>
       <p:sp>
         <p:nvSpPr>
-          <p:cNvPr id="3" name="Subtitle 2"/>
+          <p:cNvPr id="3" name="Subtitle 2">
+            <a:extLst>
+              <a:ext uri="{FF2B5EF4-FFF2-40B4-BE49-F238E27FC236}">
+                <a16:creationId xmlns:a16="http://schemas.microsoft.com/office/drawing/2014/main" id="{BDF5AAAC-733F-F136-24BF-F7497CC6F2F5}"/>
+              </a:ext>
+            </a:extLst>
+          </p:cNvPr>
           <p:cNvSpPr>
             <a:spLocks noGrp="1"/>
           </p:cNvSpPr>
@@ -556,39 +554,24 @@
         </p:nvSpPr>
         <p:spPr>
           <a:xfrm>
-            <a:off x="6457950" y="4960137"/>
-            <a:ext cx="2400300" cy="1463040"/>
+            <a:off x="1524000" y="3602038"/>
+            <a:ext cx="9144000" cy="1655762"/>
           </a:xfrm>
         </p:spPr>
         <p:txBody>
-          <a:bodyPr lIns="91440" rIns="91440" anchor="ctr">
-            <a:normAutofit/>
-          </a:bodyPr>
+          <a:bodyPr/>
           <a:lstStyle>
-            <a:lvl1pPr marL="0" indent="0" algn="l">
-              <a:lnSpc>
-                <a:spcPct val="100000"/>
-              </a:lnSpc>
-              <a:spcBef>
-                <a:spcPts val="0"/>
-              </a:spcBef>
+            <a:lvl1pPr marL="0" indent="0" algn="ctr">
               <a:buNone/>
-              <a:defRPr sz="1600">
-                <a:solidFill>
-                  <a:schemeClr val="tx1">
-                    <a:lumMod val="95000"/>
-                    <a:lumOff val="5000"/>
-                  </a:schemeClr>
-                </a:solidFill>
-              </a:defRPr>
+              <a:defRPr sz="2400"/>
             </a:lvl1pPr>
             <a:lvl2pPr marL="457200" indent="0" algn="ctr">
               <a:buNone/>
-              <a:defRPr sz="1600"/>
+              <a:defRPr sz="2000"/>
             </a:lvl2pPr>
             <a:lvl3pPr marL="914400" indent="0" algn="ctr">
               <a:buNone/>
-              <a:defRPr sz="1600"/>
+              <a:defRPr sz="1800"/>
             </a:lvl3pPr>
             <a:lvl4pPr marL="1371600" indent="0" algn="ctr">
               <a:buNone/>
@@ -620,13 +603,18 @@
               <a:rPr lang="en-US"/>
               <a:t>Click to edit Master subtitle style</a:t>
             </a:r>
-            <a:endParaRPr lang="en-US" dirty="0"/>
           </a:p>
         </p:txBody>
       </p:sp>
       <p:sp>
         <p:nvSpPr>
-          <p:cNvPr id="4" name="Date Placeholder 3"/>
+          <p:cNvPr id="4" name="Date Placeholder 3">
+            <a:extLst>
+              <a:ext uri="{FF2B5EF4-FFF2-40B4-BE49-F238E27FC236}">
+                <a16:creationId xmlns:a16="http://schemas.microsoft.com/office/drawing/2014/main" id="{0E305E61-7CE6-1F92-099D-BD952FB7E670}"/>
+              </a:ext>
+            </a:extLst>
+          </p:cNvPr>
           <p:cNvSpPr>
             <a:spLocks noGrp="1"/>
           </p:cNvSpPr>
@@ -637,19 +625,25 @@
         <p:spPr/>
         <p:txBody>
           <a:bodyPr/>
-          <a:lstStyle>
-            <a:lvl1pPr algn="l">
-              <a:defRPr/>
-            </a:lvl1pPr>
-          </a:lstStyle>
-          <a:p>
-            <a:endParaRPr lang="en-US" altLang="en-US"/>
+          <a:lstStyle/>
+          <a:p>
+            <a:fld id="{ECC70838-5FF0-6843-9A06-8BB3239391C6}" type="datetime1">
+              <a:rPr lang="en-US" smtClean="0"/>
+              <a:t>5/28/23</a:t>
+            </a:fld>
+            <a:endParaRPr lang="en-US"/>
           </a:p>
         </p:txBody>
       </p:sp>
       <p:sp>
         <p:nvSpPr>
-          <p:cNvPr id="5" name="Footer Placeholder 4"/>
+          <p:cNvPr id="5" name="Footer Placeholder 4">
+            <a:extLst>
+              <a:ext uri="{FF2B5EF4-FFF2-40B4-BE49-F238E27FC236}">
+                <a16:creationId xmlns:a16="http://schemas.microsoft.com/office/drawing/2014/main" id="{71A4B8BD-9686-0BB4-A2A6-F309E1CD4611}"/>
+              </a:ext>
+            </a:extLst>
+          </p:cNvPr>
           <p:cNvSpPr>
             <a:spLocks noGrp="1"/>
           </p:cNvSpPr>
@@ -663,7 +657,7 @@
           <a:lstStyle/>
           <a:p>
             <a:r>
-              <a:rPr lang="en-US" altLang="en-US"/>
+              <a:rPr lang="en-US"/>
               <a:t>YETANOTHERMASTERYLEARNING</a:t>
             </a:r>
           </a:p>
@@ -671,7 +665,13 @@
       </p:sp>
       <p:sp>
         <p:nvSpPr>
-          <p:cNvPr id="6" name="Slide Number Placeholder 5"/>
+          <p:cNvPr id="6" name="Slide Number Placeholder 5">
+            <a:extLst>
+              <a:ext uri="{FF2B5EF4-FFF2-40B4-BE49-F238E27FC236}">
+                <a16:creationId xmlns:a16="http://schemas.microsoft.com/office/drawing/2014/main" id="{08364A84-3F39-9E37-C7E4-B90F6608FDB1}"/>
+              </a:ext>
+            </a:extLst>
+          </p:cNvPr>
           <p:cNvSpPr>
             <a:spLocks noGrp="1"/>
           </p:cNvSpPr>
@@ -684,102 +684,18 @@
           <a:bodyPr/>
           <a:lstStyle/>
           <a:p>
-            <a:fld id="{193FB314-4563-D645-89C6-751EA75457A8}" type="slidenum">
-              <a:rPr lang="en-US" altLang="en-US" smtClean="0"/>
-              <a:pPr/>
+            <a:fld id="{46B2860C-164B-0242-B761-89B72ADFD8CA}" type="slidenum">
+              <a:rPr lang="en-US" smtClean="0"/>
               <a:t>‹#›</a:t>
             </a:fld>
-            <a:endParaRPr lang="en-US" altLang="en-US"/>
+            <a:endParaRPr lang="en-US"/>
           </a:p>
         </p:txBody>
       </p:sp>
-      <p:sp>
-        <p:nvSpPr>
-          <p:cNvPr id="11" name="Rectangle 10"/>
-          <p:cNvSpPr/>
-          <p:nvPr/>
-        </p:nvSpPr>
-        <p:spPr>
-          <a:xfrm>
-            <a:off x="0" y="0"/>
-            <a:ext cx="9144000" cy="4572001"/>
-          </a:xfrm>
-          <a:prstGeom prst="rect">
-            <a:avLst/>
-          </a:prstGeom>
-          <a:blipFill dpi="0" rotWithShape="1">
-            <a:blip r:embed="rId2">
-              <a:duotone>
-                <a:schemeClr val="accent2">
-                  <a:shade val="45000"/>
-                  <a:satMod val="135000"/>
-                </a:schemeClr>
-                <a:prstClr val="white"/>
-              </a:duotone>
-            </a:blip>
-            <a:srcRect/>
-            <a:tile tx="-165100" ty="-76200" sx="35000" sy="35000" flip="none" algn="tl"/>
-          </a:blipFill>
-          <a:ln>
-            <a:noFill/>
-          </a:ln>
-        </p:spPr>
-        <p:style>
-          <a:lnRef idx="2">
-            <a:schemeClr val="accent1">
-              <a:shade val="50000"/>
-            </a:schemeClr>
-          </a:lnRef>
-          <a:fillRef idx="1">
-            <a:schemeClr val="accent1"/>
-          </a:fillRef>
-          <a:effectRef idx="0">
-            <a:schemeClr val="accent1"/>
-          </a:effectRef>
-          <a:fontRef idx="minor">
-            <a:schemeClr val="lt1"/>
-          </a:fontRef>
-        </p:style>
-      </p:sp>
-      <p:cxnSp>
-        <p:nvCxnSpPr>
-          <p:cNvPr id="12" name="Straight Connector 11"/>
-          <p:cNvCxnSpPr/>
-          <p:nvPr/>
-        </p:nvCxnSpPr>
-        <p:spPr>
-          <a:xfrm flipV="1">
-            <a:off x="6290132" y="5264106"/>
-            <a:ext cx="0" cy="914400"/>
-          </a:xfrm>
-          <a:prstGeom prst="line">
-            <a:avLst/>
-          </a:prstGeom>
-          <a:ln w="19050">
-            <a:solidFill>
-              <a:schemeClr val="accent2"/>
-            </a:solidFill>
-          </a:ln>
-        </p:spPr>
-        <p:style>
-          <a:lnRef idx="1">
-            <a:schemeClr val="accent1"/>
-          </a:lnRef>
-          <a:fillRef idx="0">
-            <a:schemeClr val="accent1"/>
-          </a:fillRef>
-          <a:effectRef idx="0">
-            <a:schemeClr val="accent1"/>
-          </a:effectRef>
-          <a:fontRef idx="minor">
-            <a:schemeClr val="tx1"/>
-          </a:fontRef>
-        </p:style>
-      </p:cxnSp>
     </p:spTree>
     <p:extLst>
       <p:ext uri="{BB962C8B-B14F-4D97-AF65-F5344CB8AC3E}">
-        <p14:creationId xmlns:p14="http://schemas.microsoft.com/office/powerpoint/2010/main" val="2834492274"/>
+        <p14:creationId xmlns:p14="http://schemas.microsoft.com/office/powerpoint/2010/main" val="1113323836"/>
       </p:ext>
     </p:extLst>
   </p:cSld>
@@ -808,7 +724,13 @@
       </p:grpSpPr>
       <p:sp>
         <p:nvSpPr>
-          <p:cNvPr id="2" name="Title 1"/>
+          <p:cNvPr id="2" name="Title 1">
+            <a:extLst>
+              <a:ext uri="{FF2B5EF4-FFF2-40B4-BE49-F238E27FC236}">
+                <a16:creationId xmlns:a16="http://schemas.microsoft.com/office/drawing/2014/main" id="{C30D0D86-557E-073E-294E-777996F8B5F7}"/>
+              </a:ext>
+            </a:extLst>
+          </p:cNvPr>
           <p:cNvSpPr>
             <a:spLocks noGrp="1"/>
           </p:cNvSpPr>
@@ -825,13 +747,18 @@
               <a:rPr lang="en-US"/>
               <a:t>Click to edit Master title style</a:t>
             </a:r>
-            <a:endParaRPr lang="en-US" dirty="0"/>
           </a:p>
         </p:txBody>
       </p:sp>
       <p:sp>
         <p:nvSpPr>
-          <p:cNvPr id="3" name="Vertical Text Placeholder 2"/>
+          <p:cNvPr id="3" name="Vertical Text Placeholder 2">
+            <a:extLst>
+              <a:ext uri="{FF2B5EF4-FFF2-40B4-BE49-F238E27FC236}">
+                <a16:creationId xmlns:a16="http://schemas.microsoft.com/office/drawing/2014/main" id="{E2FF8A59-6C34-911A-B41B-DE0A0A5618DE}"/>
+              </a:ext>
+            </a:extLst>
+          </p:cNvPr>
           <p:cNvSpPr>
             <a:spLocks noGrp="1"/>
           </p:cNvSpPr>
@@ -877,13 +804,18 @@
               <a:rPr lang="en-US"/>
               <a:t>Fifth level</a:t>
             </a:r>
-            <a:endParaRPr lang="en-US" dirty="0"/>
           </a:p>
         </p:txBody>
       </p:sp>
       <p:sp>
         <p:nvSpPr>
-          <p:cNvPr id="4" name="Date Placeholder 3"/>
+          <p:cNvPr id="4" name="Date Placeholder 3">
+            <a:extLst>
+              <a:ext uri="{FF2B5EF4-FFF2-40B4-BE49-F238E27FC236}">
+                <a16:creationId xmlns:a16="http://schemas.microsoft.com/office/drawing/2014/main" id="{4413A344-3E85-972D-C983-57D504BB5B5E}"/>
+              </a:ext>
+            </a:extLst>
+          </p:cNvPr>
           <p:cNvSpPr>
             <a:spLocks noGrp="1"/>
           </p:cNvSpPr>
@@ -896,13 +828,23 @@
           <a:bodyPr/>
           <a:lstStyle/>
           <a:p>
-            <a:endParaRPr lang="en-US" altLang="en-US"/>
+            <a:fld id="{31570ADD-F669-8841-AB9B-A5AA0F28842E}" type="datetime1">
+              <a:rPr lang="en-US" smtClean="0"/>
+              <a:t>5/28/23</a:t>
+            </a:fld>
+            <a:endParaRPr lang="en-US"/>
           </a:p>
         </p:txBody>
       </p:sp>
       <p:sp>
         <p:nvSpPr>
-          <p:cNvPr id="5" name="Footer Placeholder 4"/>
+          <p:cNvPr id="5" name="Footer Placeholder 4">
+            <a:extLst>
+              <a:ext uri="{FF2B5EF4-FFF2-40B4-BE49-F238E27FC236}">
+                <a16:creationId xmlns:a16="http://schemas.microsoft.com/office/drawing/2014/main" id="{A5C30927-7FAE-ACCF-EDBB-A8DE79B94058}"/>
+              </a:ext>
+            </a:extLst>
+          </p:cNvPr>
           <p:cNvSpPr>
             <a:spLocks noGrp="1"/>
           </p:cNvSpPr>
@@ -916,7 +858,7 @@
           <a:lstStyle/>
           <a:p>
             <a:r>
-              <a:rPr lang="en-US" altLang="en-US"/>
+              <a:rPr lang="en-US"/>
               <a:t>YETANOTHERMASTERYLEARNING</a:t>
             </a:r>
           </a:p>
@@ -924,7 +866,13 @@
       </p:sp>
       <p:sp>
         <p:nvSpPr>
-          <p:cNvPr id="6" name="Slide Number Placeholder 5"/>
+          <p:cNvPr id="6" name="Slide Number Placeholder 5">
+            <a:extLst>
+              <a:ext uri="{FF2B5EF4-FFF2-40B4-BE49-F238E27FC236}">
+                <a16:creationId xmlns:a16="http://schemas.microsoft.com/office/drawing/2014/main" id="{6D8BE878-F642-834B-18BF-7E4D3F3926AE}"/>
+              </a:ext>
+            </a:extLst>
+          </p:cNvPr>
           <p:cNvSpPr>
             <a:spLocks noGrp="1"/>
           </p:cNvSpPr>
@@ -937,19 +885,18 @@
           <a:bodyPr/>
           <a:lstStyle/>
           <a:p>
-            <a:fld id="{411C4063-9D9F-EF4B-984C-D5F7CDA8790D}" type="slidenum">
-              <a:rPr lang="en-US" altLang="en-US" smtClean="0"/>
-              <a:pPr/>
+            <a:fld id="{46B2860C-164B-0242-B761-89B72ADFD8CA}" type="slidenum">
+              <a:rPr lang="en-US" smtClean="0"/>
               <a:t>‹#›</a:t>
             </a:fld>
-            <a:endParaRPr lang="en-US" altLang="en-US"/>
+            <a:endParaRPr lang="en-US"/>
           </a:p>
         </p:txBody>
       </p:sp>
     </p:spTree>
     <p:extLst>
       <p:ext uri="{BB962C8B-B14F-4D97-AF65-F5344CB8AC3E}">
-        <p14:creationId xmlns:p14="http://schemas.microsoft.com/office/powerpoint/2010/main" val="1217034596"/>
+        <p14:creationId xmlns:p14="http://schemas.microsoft.com/office/powerpoint/2010/main" val="2455875465"/>
       </p:ext>
     </p:extLst>
   </p:cSld>
@@ -960,7 +907,7 @@
 </file>
 
 <file path=ppt/slideLayouts/slideLayout11.xml><?xml version="1.0" encoding="utf-8"?>
-<p:sldLayout xmlns:a="http://schemas.openxmlformats.org/drawingml/2006/main" xmlns:r="http://schemas.openxmlformats.org/officeDocument/2006/relationships" xmlns:p="http://schemas.openxmlformats.org/presentationml/2006/main" showMasterSp="0" type="vertTitleAndTx" preserve="1">
+<p:sldLayout xmlns:a="http://schemas.openxmlformats.org/drawingml/2006/main" xmlns:r="http://schemas.openxmlformats.org/officeDocument/2006/relationships" xmlns:p="http://schemas.openxmlformats.org/presentationml/2006/main" type="vertTitleAndTx" preserve="1">
   <p:cSld name="Vertical Title and Text">
     <p:spTree>
       <p:nvGrpSpPr>
@@ -978,7 +925,13 @@
       </p:grpSpPr>
       <p:sp>
         <p:nvSpPr>
-          <p:cNvPr id="2" name="Vertical Title 1"/>
+          <p:cNvPr id="2" name="Vertical Title 1">
+            <a:extLst>
+              <a:ext uri="{FF2B5EF4-FFF2-40B4-BE49-F238E27FC236}">
+                <a16:creationId xmlns:a16="http://schemas.microsoft.com/office/drawing/2014/main" id="{B5924922-3F5B-669F-2C35-85DA0F82F511}"/>
+              </a:ext>
+            </a:extLst>
+          </p:cNvPr>
           <p:cNvSpPr>
             <a:spLocks noGrp="1"/>
           </p:cNvSpPr>
@@ -988,25 +941,30 @@
         </p:nvSpPr>
         <p:spPr>
           <a:xfrm>
-            <a:off x="6543676" y="762000"/>
-            <a:ext cx="1971675" cy="5410200"/>
+            <a:off x="8724900" y="365125"/>
+            <a:ext cx="2628900" cy="5811838"/>
           </a:xfrm>
         </p:spPr>
         <p:txBody>
-          <a:bodyPr vert="eaVert" lIns="45720" tIns="91440" rIns="45720" bIns="91440"/>
+          <a:bodyPr vert="eaVert"/>
           <a:lstStyle/>
           <a:p>
             <a:r>
               <a:rPr lang="en-US"/>
               <a:t>Click to edit Master title style</a:t>
             </a:r>
-            <a:endParaRPr lang="en-US" dirty="0"/>
           </a:p>
         </p:txBody>
       </p:sp>
       <p:sp>
         <p:nvSpPr>
-          <p:cNvPr id="3" name="Vertical Text Placeholder 2"/>
+          <p:cNvPr id="3" name="Vertical Text Placeholder 2">
+            <a:extLst>
+              <a:ext uri="{FF2B5EF4-FFF2-40B4-BE49-F238E27FC236}">
+                <a16:creationId xmlns:a16="http://schemas.microsoft.com/office/drawing/2014/main" id="{2F080060-B227-3A87-E1EF-790F9B207FBB}"/>
+              </a:ext>
+            </a:extLst>
+          </p:cNvPr>
           <p:cNvSpPr>
             <a:spLocks noGrp="1"/>
           </p:cNvSpPr>
@@ -1016,8 +974,8 @@
         </p:nvSpPr>
         <p:spPr>
           <a:xfrm>
-            <a:off x="742951" y="762000"/>
-            <a:ext cx="5686425" cy="5410200"/>
+            <a:off x="838200" y="365125"/>
+            <a:ext cx="7734300" cy="5811838"/>
           </a:xfrm>
         </p:spPr>
         <p:txBody>
@@ -1057,13 +1015,18 @@
               <a:rPr lang="en-US"/>
               <a:t>Fifth level</a:t>
             </a:r>
-            <a:endParaRPr lang="en-US" dirty="0"/>
           </a:p>
         </p:txBody>
       </p:sp>
       <p:sp>
         <p:nvSpPr>
-          <p:cNvPr id="4" name="Date Placeholder 3"/>
+          <p:cNvPr id="4" name="Date Placeholder 3">
+            <a:extLst>
+              <a:ext uri="{FF2B5EF4-FFF2-40B4-BE49-F238E27FC236}">
+                <a16:creationId xmlns:a16="http://schemas.microsoft.com/office/drawing/2014/main" id="{59C717B1-423B-BDFE-22BB-A66639ADE05A}"/>
+              </a:ext>
+            </a:extLst>
+          </p:cNvPr>
           <p:cNvSpPr>
             <a:spLocks noGrp="1"/>
           </p:cNvSpPr>
@@ -1076,13 +1039,23 @@
           <a:bodyPr/>
           <a:lstStyle/>
           <a:p>
-            <a:endParaRPr lang="en-US" altLang="en-US"/>
+            <a:fld id="{AA912952-008C-3C45-9EB3-C597E7BCA0F3}" type="datetime1">
+              <a:rPr lang="en-US" smtClean="0"/>
+              <a:t>5/28/23</a:t>
+            </a:fld>
+            <a:endParaRPr lang="en-US"/>
           </a:p>
         </p:txBody>
       </p:sp>
       <p:sp>
         <p:nvSpPr>
-          <p:cNvPr id="5" name="Footer Placeholder 4"/>
+          <p:cNvPr id="5" name="Footer Placeholder 4">
+            <a:extLst>
+              <a:ext uri="{FF2B5EF4-FFF2-40B4-BE49-F238E27FC236}">
+                <a16:creationId xmlns:a16="http://schemas.microsoft.com/office/drawing/2014/main" id="{1238AB57-64B7-20E4-E96D-D0FCBE58BB8E}"/>
+              </a:ext>
+            </a:extLst>
+          </p:cNvPr>
           <p:cNvSpPr>
             <a:spLocks noGrp="1"/>
           </p:cNvSpPr>
@@ -1096,7 +1069,7 @@
           <a:lstStyle/>
           <a:p>
             <a:r>
-              <a:rPr lang="en-US" altLang="en-US"/>
+              <a:rPr lang="en-US"/>
               <a:t>YETANOTHERMASTERYLEARNING</a:t>
             </a:r>
           </a:p>
@@ -1104,7 +1077,13 @@
       </p:sp>
       <p:sp>
         <p:nvSpPr>
-          <p:cNvPr id="6" name="Slide Number Placeholder 5"/>
+          <p:cNvPr id="6" name="Slide Number Placeholder 5">
+            <a:extLst>
+              <a:ext uri="{FF2B5EF4-FFF2-40B4-BE49-F238E27FC236}">
+                <a16:creationId xmlns:a16="http://schemas.microsoft.com/office/drawing/2014/main" id="{BF6B6A01-1276-79CB-A753-F02B47E61B28}"/>
+              </a:ext>
+            </a:extLst>
+          </p:cNvPr>
           <p:cNvSpPr>
             <a:spLocks noGrp="1"/>
           </p:cNvSpPr>
@@ -1117,54 +1096,18 @@
           <a:bodyPr/>
           <a:lstStyle/>
           <a:p>
-            <a:fld id="{0458B352-6EBF-594A-861A-32671D5662E7}" type="slidenum">
-              <a:rPr lang="en-US" altLang="en-US" smtClean="0"/>
-              <a:pPr/>
+            <a:fld id="{46B2860C-164B-0242-B761-89B72ADFD8CA}" type="slidenum">
+              <a:rPr lang="en-US" smtClean="0"/>
               <a:t>‹#›</a:t>
             </a:fld>
-            <a:endParaRPr lang="en-US" altLang="en-US"/>
+            <a:endParaRPr lang="en-US"/>
           </a:p>
         </p:txBody>
       </p:sp>
-      <p:cxnSp>
-        <p:nvCxnSpPr>
-          <p:cNvPr id="8" name="Straight Connector 7"/>
-          <p:cNvCxnSpPr/>
-          <p:nvPr/>
-        </p:nvCxnSpPr>
-        <p:spPr>
-          <a:xfrm rot="5400000" flipV="1">
-            <a:off x="7543800" y="173563"/>
-            <a:ext cx="0" cy="685800"/>
-          </a:xfrm>
-          <a:prstGeom prst="line">
-            <a:avLst/>
-          </a:prstGeom>
-          <a:ln w="19050">
-            <a:solidFill>
-              <a:schemeClr val="accent2"/>
-            </a:solidFill>
-          </a:ln>
-        </p:spPr>
-        <p:style>
-          <a:lnRef idx="1">
-            <a:schemeClr val="accent1"/>
-          </a:lnRef>
-          <a:fillRef idx="0">
-            <a:schemeClr val="accent1"/>
-          </a:fillRef>
-          <a:effectRef idx="0">
-            <a:schemeClr val="accent1"/>
-          </a:effectRef>
-          <a:fontRef idx="minor">
-            <a:schemeClr val="tx1"/>
-          </a:fontRef>
-        </p:style>
-      </p:cxnSp>
     </p:spTree>
     <p:extLst>
       <p:ext uri="{BB962C8B-B14F-4D97-AF65-F5344CB8AC3E}">
-        <p14:creationId xmlns:p14="http://schemas.microsoft.com/office/powerpoint/2010/main" val="2651980665"/>
+        <p14:creationId xmlns:p14="http://schemas.microsoft.com/office/powerpoint/2010/main" val="1405775839"/>
       </p:ext>
     </p:extLst>
   </p:cSld>
@@ -1193,7 +1136,13 @@
       </p:grpSpPr>
       <p:sp>
         <p:nvSpPr>
-          <p:cNvPr id="2" name="Title 1"/>
+          <p:cNvPr id="2" name="Title 1">
+            <a:extLst>
+              <a:ext uri="{FF2B5EF4-FFF2-40B4-BE49-F238E27FC236}">
+                <a16:creationId xmlns:a16="http://schemas.microsoft.com/office/drawing/2014/main" id="{ECCCFC09-8AB4-79EA-9222-61B64384E323}"/>
+              </a:ext>
+            </a:extLst>
+          </p:cNvPr>
           <p:cNvSpPr>
             <a:spLocks noGrp="1"/>
           </p:cNvSpPr>
@@ -1210,13 +1159,18 @@
               <a:rPr lang="en-US"/>
               <a:t>Click to edit Master title style</a:t>
             </a:r>
-            <a:endParaRPr lang="en-US" dirty="0"/>
           </a:p>
         </p:txBody>
       </p:sp>
       <p:sp>
         <p:nvSpPr>
-          <p:cNvPr id="3" name="Content Placeholder 2"/>
+          <p:cNvPr id="3" name="Content Placeholder 2">
+            <a:extLst>
+              <a:ext uri="{FF2B5EF4-FFF2-40B4-BE49-F238E27FC236}">
+                <a16:creationId xmlns:a16="http://schemas.microsoft.com/office/drawing/2014/main" id="{EB3F8B40-0856-6382-D549-4CE3D1DFD4D2}"/>
+              </a:ext>
+            </a:extLst>
+          </p:cNvPr>
           <p:cNvSpPr>
             <a:spLocks noGrp="1"/>
           </p:cNvSpPr>
@@ -1262,13 +1216,18 @@
               <a:rPr lang="en-US"/>
               <a:t>Fifth level</a:t>
             </a:r>
-            <a:endParaRPr lang="en-US" dirty="0"/>
           </a:p>
         </p:txBody>
       </p:sp>
       <p:sp>
         <p:nvSpPr>
-          <p:cNvPr id="4" name="Date Placeholder 3"/>
+          <p:cNvPr id="4" name="Date Placeholder 3">
+            <a:extLst>
+              <a:ext uri="{FF2B5EF4-FFF2-40B4-BE49-F238E27FC236}">
+                <a16:creationId xmlns:a16="http://schemas.microsoft.com/office/drawing/2014/main" id="{8C2250A2-8908-C83A-6B42-7E0FA5588150}"/>
+              </a:ext>
+            </a:extLst>
+          </p:cNvPr>
           <p:cNvSpPr>
             <a:spLocks noGrp="1"/>
           </p:cNvSpPr>
@@ -1281,13 +1240,23 @@
           <a:bodyPr/>
           <a:lstStyle/>
           <a:p>
-            <a:endParaRPr lang="en-US" altLang="en-US"/>
+            <a:fld id="{6CF203A7-EF4B-D74F-9740-596E359A0361}" type="datetime1">
+              <a:rPr lang="en-US" smtClean="0"/>
+              <a:t>5/28/23</a:t>
+            </a:fld>
+            <a:endParaRPr lang="en-US"/>
           </a:p>
         </p:txBody>
       </p:sp>
       <p:sp>
         <p:nvSpPr>
-          <p:cNvPr id="5" name="Footer Placeholder 4"/>
+          <p:cNvPr id="5" name="Footer Placeholder 4">
+            <a:extLst>
+              <a:ext uri="{FF2B5EF4-FFF2-40B4-BE49-F238E27FC236}">
+                <a16:creationId xmlns:a16="http://schemas.microsoft.com/office/drawing/2014/main" id="{59CA4F28-C36C-CDBF-E4A6-15247C0FBB48}"/>
+              </a:ext>
+            </a:extLst>
+          </p:cNvPr>
           <p:cNvSpPr>
             <a:spLocks noGrp="1"/>
           </p:cNvSpPr>
@@ -1301,7 +1270,7 @@
           <a:lstStyle/>
           <a:p>
             <a:r>
-              <a:rPr lang="en-US" altLang="en-US"/>
+              <a:rPr lang="en-US"/>
               <a:t>YETANOTHERMASTERYLEARNING</a:t>
             </a:r>
           </a:p>
@@ -1309,7 +1278,13 @@
       </p:sp>
       <p:sp>
         <p:nvSpPr>
-          <p:cNvPr id="6" name="Slide Number Placeholder 5"/>
+          <p:cNvPr id="6" name="Slide Number Placeholder 5">
+            <a:extLst>
+              <a:ext uri="{FF2B5EF4-FFF2-40B4-BE49-F238E27FC236}">
+                <a16:creationId xmlns:a16="http://schemas.microsoft.com/office/drawing/2014/main" id="{AC8C51D5-60CA-D70B-21DE-6D2A7438ED92}"/>
+              </a:ext>
+            </a:extLst>
+          </p:cNvPr>
           <p:cNvSpPr>
             <a:spLocks noGrp="1"/>
           </p:cNvSpPr>
@@ -1322,19 +1297,18 @@
           <a:bodyPr/>
           <a:lstStyle/>
           <a:p>
-            <a:fld id="{8CF6FC91-AF02-944A-88B9-7506F82D4EBF}" type="slidenum">
-              <a:rPr lang="en-US" altLang="en-US" smtClean="0"/>
-              <a:pPr/>
+            <a:fld id="{46B2860C-164B-0242-B761-89B72ADFD8CA}" type="slidenum">
+              <a:rPr lang="en-US" smtClean="0"/>
               <a:t>‹#›</a:t>
             </a:fld>
-            <a:endParaRPr lang="en-US" altLang="en-US"/>
+            <a:endParaRPr lang="en-US"/>
           </a:p>
         </p:txBody>
       </p:sp>
     </p:spTree>
     <p:extLst>
       <p:ext uri="{BB962C8B-B14F-4D97-AF65-F5344CB8AC3E}">
-        <p14:creationId xmlns:p14="http://schemas.microsoft.com/office/powerpoint/2010/main" val="2774742070"/>
+        <p14:creationId xmlns:p14="http://schemas.microsoft.com/office/powerpoint/2010/main" val="1485417676"/>
       </p:ext>
     </p:extLst>
   </p:cSld>
@@ -1345,7 +1319,7 @@
 </file>
 
 <file path=ppt/slideLayouts/slideLayout3.xml><?xml version="1.0" encoding="utf-8"?>
-<p:sldLayout xmlns:a="http://schemas.openxmlformats.org/drawingml/2006/main" xmlns:r="http://schemas.openxmlformats.org/officeDocument/2006/relationships" xmlns:p="http://schemas.openxmlformats.org/presentationml/2006/main" showMasterSp="0" type="secHead" preserve="1">
+<p:sldLayout xmlns:a="http://schemas.openxmlformats.org/drawingml/2006/main" xmlns:r="http://schemas.openxmlformats.org/officeDocument/2006/relationships" xmlns:p="http://schemas.openxmlformats.org/presentationml/2006/main" type="secHead" preserve="1">
   <p:cSld name="Section Header">
     <p:spTree>
       <p:nvGrpSpPr>
@@ -1363,7 +1337,13 @@
       </p:grpSpPr>
       <p:sp>
         <p:nvSpPr>
-          <p:cNvPr id="2" name="Title 1"/>
+          <p:cNvPr id="2" name="Title 1">
+            <a:extLst>
+              <a:ext uri="{FF2B5EF4-FFF2-40B4-BE49-F238E27FC236}">
+                <a16:creationId xmlns:a16="http://schemas.microsoft.com/office/drawing/2014/main" id="{B35675EB-30E8-73BA-8250-EF5C6C2415B5}"/>
+              </a:ext>
+            </a:extLst>
+          </p:cNvPr>
           <p:cNvSpPr>
             <a:spLocks noGrp="1"/>
           </p:cNvSpPr>
@@ -1373,17 +1353,15 @@
         </p:nvSpPr>
         <p:spPr>
           <a:xfrm>
-            <a:off x="342900" y="4960137"/>
-            <a:ext cx="5829300" cy="1463040"/>
+            <a:off x="831850" y="1709738"/>
+            <a:ext cx="10515600" cy="2852737"/>
           </a:xfrm>
         </p:spPr>
         <p:txBody>
-          <a:bodyPr anchor="ctr">
-            <a:normAutofit/>
-          </a:bodyPr>
+          <a:bodyPr anchor="b"/>
           <a:lstStyle>
-            <a:lvl1pPr algn="r">
-              <a:defRPr sz="4400" b="0" spc="200" baseline="0"/>
+            <a:lvl1pPr>
+              <a:defRPr sz="6000"/>
             </a:lvl1pPr>
           </a:lstStyle>
           <a:p>
@@ -1391,13 +1369,18 @@
               <a:rPr lang="en-US"/>
               <a:t>Click to edit Master title style</a:t>
             </a:r>
-            <a:endParaRPr lang="en-US" dirty="0"/>
           </a:p>
         </p:txBody>
       </p:sp>
       <p:sp>
         <p:nvSpPr>
-          <p:cNvPr id="3" name="Text Placeholder 2"/>
+          <p:cNvPr id="3" name="Text Placeholder 2">
+            <a:extLst>
+              <a:ext uri="{FF2B5EF4-FFF2-40B4-BE49-F238E27FC236}">
+                <a16:creationId xmlns:a16="http://schemas.microsoft.com/office/drawing/2014/main" id="{F078A551-77A7-359F-51AF-C77439EBF70B}"/>
+              </a:ext>
+            </a:extLst>
+          </p:cNvPr>
           <p:cNvSpPr>
             <a:spLocks noGrp="1"/>
           </p:cNvSpPr>
@@ -1407,35 +1390,26 @@
         </p:nvSpPr>
         <p:spPr>
           <a:xfrm>
-            <a:off x="6457950" y="4960137"/>
-            <a:ext cx="2400300" cy="1463040"/>
+            <a:off x="831850" y="4589463"/>
+            <a:ext cx="10515600" cy="1500187"/>
           </a:xfrm>
         </p:spPr>
         <p:txBody>
-          <a:bodyPr lIns="91440" rIns="91440" anchor="ctr">
-            <a:normAutofit/>
-          </a:bodyPr>
+          <a:bodyPr/>
           <a:lstStyle>
             <a:lvl1pPr marL="0" indent="0">
-              <a:lnSpc>
-                <a:spcPct val="100000"/>
-              </a:lnSpc>
-              <a:spcBef>
-                <a:spcPts val="0"/>
-              </a:spcBef>
               <a:buNone/>
-              <a:defRPr sz="1600">
+              <a:defRPr sz="2400">
                 <a:solidFill>
                   <a:schemeClr val="tx1">
-                    <a:lumMod val="95000"/>
-                    <a:lumOff val="5000"/>
+                    <a:tint val="75000"/>
                   </a:schemeClr>
                 </a:solidFill>
               </a:defRPr>
             </a:lvl1pPr>
             <a:lvl2pPr marL="457200" indent="0">
               <a:buNone/>
-              <a:defRPr sz="1600">
+              <a:defRPr sz="2000">
                 <a:solidFill>
                   <a:schemeClr val="tx1">
                     <a:tint val="75000"/>
@@ -1445,7 +1419,7 @@
             </a:lvl2pPr>
             <a:lvl3pPr marL="914400" indent="0">
               <a:buNone/>
-              <a:defRPr sz="1600">
+              <a:defRPr sz="1800">
                 <a:solidFill>
                   <a:schemeClr val="tx1">
                     <a:tint val="75000"/>
@@ -1455,7 +1429,7 @@
             </a:lvl3pPr>
             <a:lvl4pPr marL="1371600" indent="0">
               <a:buNone/>
-              <a:defRPr sz="1400">
+              <a:defRPr sz="1600">
                 <a:solidFill>
                   <a:schemeClr val="tx1">
                     <a:tint val="75000"/>
@@ -1465,7 +1439,7 @@
             </a:lvl4pPr>
             <a:lvl5pPr marL="1828800" indent="0">
               <a:buNone/>
-              <a:defRPr sz="1400">
+              <a:defRPr sz="1600">
                 <a:solidFill>
                   <a:schemeClr val="tx1">
                     <a:tint val="75000"/>
@@ -1475,7 +1449,7 @@
             </a:lvl5pPr>
             <a:lvl6pPr marL="2286000" indent="0">
               <a:buNone/>
-              <a:defRPr sz="1400">
+              <a:defRPr sz="1600">
                 <a:solidFill>
                   <a:schemeClr val="tx1">
                     <a:tint val="75000"/>
@@ -1485,7 +1459,7 @@
             </a:lvl6pPr>
             <a:lvl7pPr marL="2743200" indent="0">
               <a:buNone/>
-              <a:defRPr sz="1400">
+              <a:defRPr sz="1600">
                 <a:solidFill>
                   <a:schemeClr val="tx1">
                     <a:tint val="75000"/>
@@ -1495,7 +1469,7 @@
             </a:lvl7pPr>
             <a:lvl8pPr marL="3200400" indent="0">
               <a:buNone/>
-              <a:defRPr sz="1400">
+              <a:defRPr sz="1600">
                 <a:solidFill>
                   <a:schemeClr val="tx1">
                     <a:tint val="75000"/>
@@ -1505,7 +1479,7 @@
             </a:lvl8pPr>
             <a:lvl9pPr marL="3657600" indent="0">
               <a:buNone/>
-              <a:defRPr sz="1400">
+              <a:defRPr sz="1600">
                 <a:solidFill>
                   <a:schemeClr val="tx1">
                     <a:tint val="75000"/>
@@ -1525,7 +1499,13 @@
       </p:sp>
       <p:sp>
         <p:nvSpPr>
-          <p:cNvPr id="4" name="Date Placeholder 3"/>
+          <p:cNvPr id="4" name="Date Placeholder 3">
+            <a:extLst>
+              <a:ext uri="{FF2B5EF4-FFF2-40B4-BE49-F238E27FC236}">
+                <a16:creationId xmlns:a16="http://schemas.microsoft.com/office/drawing/2014/main" id="{092F3220-1575-627F-FB34-64A534D63C02}"/>
+              </a:ext>
+            </a:extLst>
+          </p:cNvPr>
           <p:cNvSpPr>
             <a:spLocks noGrp="1"/>
           </p:cNvSpPr>
@@ -1538,13 +1518,23 @@
           <a:bodyPr/>
           <a:lstStyle/>
           <a:p>
-            <a:endParaRPr lang="en-US" altLang="en-US"/>
+            <a:fld id="{3415B036-F9A8-3348-9FA5-9BB980FD5FB8}" type="datetime1">
+              <a:rPr lang="en-US" smtClean="0"/>
+              <a:t>5/28/23</a:t>
+            </a:fld>
+            <a:endParaRPr lang="en-US"/>
           </a:p>
         </p:txBody>
       </p:sp>
       <p:sp>
         <p:nvSpPr>
-          <p:cNvPr id="5" name="Footer Placeholder 4"/>
+          <p:cNvPr id="5" name="Footer Placeholder 4">
+            <a:extLst>
+              <a:ext uri="{FF2B5EF4-FFF2-40B4-BE49-F238E27FC236}">
+                <a16:creationId xmlns:a16="http://schemas.microsoft.com/office/drawing/2014/main" id="{3A6BBE21-6A4D-EA5D-F2F8-8BE02DDD69D2}"/>
+              </a:ext>
+            </a:extLst>
+          </p:cNvPr>
           <p:cNvSpPr>
             <a:spLocks noGrp="1"/>
           </p:cNvSpPr>
@@ -1558,7 +1548,7 @@
           <a:lstStyle/>
           <a:p>
             <a:r>
-              <a:rPr lang="en-US" altLang="en-US"/>
+              <a:rPr lang="en-US"/>
               <a:t>YETANOTHERMASTERYLEARNING</a:t>
             </a:r>
           </a:p>
@@ -1566,7 +1556,13 @@
       </p:sp>
       <p:sp>
         <p:nvSpPr>
-          <p:cNvPr id="6" name="Slide Number Placeholder 5"/>
+          <p:cNvPr id="6" name="Slide Number Placeholder 5">
+            <a:extLst>
+              <a:ext uri="{FF2B5EF4-FFF2-40B4-BE49-F238E27FC236}">
+                <a16:creationId xmlns:a16="http://schemas.microsoft.com/office/drawing/2014/main" id="{CA22E70B-A662-FAF0-2071-99BD2D60613F}"/>
+              </a:ext>
+            </a:extLst>
+          </p:cNvPr>
           <p:cNvSpPr>
             <a:spLocks noGrp="1"/>
           </p:cNvSpPr>
@@ -1579,102 +1575,18 @@
           <a:bodyPr/>
           <a:lstStyle/>
           <a:p>
-            <a:fld id="{A9A63D0B-363A-C74E-8F4C-BB7ABC5B1231}" type="slidenum">
-              <a:rPr lang="en-US" altLang="en-US" smtClean="0"/>
-              <a:pPr/>
+            <a:fld id="{46B2860C-164B-0242-B761-89B72ADFD8CA}" type="slidenum">
+              <a:rPr lang="en-US" smtClean="0"/>
               <a:t>‹#›</a:t>
             </a:fld>
-            <a:endParaRPr lang="en-US" altLang="en-US"/>
+            <a:endParaRPr lang="en-US"/>
           </a:p>
         </p:txBody>
       </p:sp>
-      <p:sp>
-        <p:nvSpPr>
-          <p:cNvPr id="10" name="Rectangle 9"/>
-          <p:cNvSpPr/>
-          <p:nvPr/>
-        </p:nvSpPr>
-        <p:spPr>
-          <a:xfrm>
-            <a:off x="0" y="0"/>
-            <a:ext cx="9144000" cy="4572000"/>
-          </a:xfrm>
-          <a:prstGeom prst="rect">
-            <a:avLst/>
-          </a:prstGeom>
-          <a:blipFill dpi="0" rotWithShape="1">
-            <a:blip r:embed="rId2">
-              <a:duotone>
-                <a:schemeClr val="accent1">
-                  <a:shade val="45000"/>
-                  <a:satMod val="135000"/>
-                </a:schemeClr>
-                <a:prstClr val="white"/>
-              </a:duotone>
-            </a:blip>
-            <a:srcRect/>
-            <a:tile tx="-165100" ty="-76200" sx="35000" sy="35000" flip="none" algn="tl"/>
-          </a:blipFill>
-          <a:ln>
-            <a:noFill/>
-          </a:ln>
-        </p:spPr>
-        <p:style>
-          <a:lnRef idx="2">
-            <a:schemeClr val="accent1">
-              <a:shade val="50000"/>
-            </a:schemeClr>
-          </a:lnRef>
-          <a:fillRef idx="1">
-            <a:schemeClr val="accent1"/>
-          </a:fillRef>
-          <a:effectRef idx="0">
-            <a:schemeClr val="accent1"/>
-          </a:effectRef>
-          <a:fontRef idx="minor">
-            <a:schemeClr val="lt1"/>
-          </a:fontRef>
-        </p:style>
-      </p:sp>
-      <p:cxnSp>
-        <p:nvCxnSpPr>
-          <p:cNvPr id="12" name="Straight Connector 11"/>
-          <p:cNvCxnSpPr/>
-          <p:nvPr/>
-        </p:nvCxnSpPr>
-        <p:spPr>
-          <a:xfrm flipV="1">
-            <a:off x="6290132" y="5264106"/>
-            <a:ext cx="0" cy="914400"/>
-          </a:xfrm>
-          <a:prstGeom prst="line">
-            <a:avLst/>
-          </a:prstGeom>
-          <a:ln w="19050">
-            <a:solidFill>
-              <a:schemeClr val="accent1"/>
-            </a:solidFill>
-          </a:ln>
-        </p:spPr>
-        <p:style>
-          <a:lnRef idx="1">
-            <a:schemeClr val="accent1"/>
-          </a:lnRef>
-          <a:fillRef idx="0">
-            <a:schemeClr val="accent1"/>
-          </a:fillRef>
-          <a:effectRef idx="0">
-            <a:schemeClr val="accent1"/>
-          </a:effectRef>
-          <a:fontRef idx="minor">
-            <a:schemeClr val="tx1"/>
-          </a:fontRef>
-        </p:style>
-      </p:cxnSp>
     </p:spTree>
     <p:extLst>
       <p:ext uri="{BB962C8B-B14F-4D97-AF65-F5344CB8AC3E}">
-        <p14:creationId xmlns:p14="http://schemas.microsoft.com/office/powerpoint/2010/main" val="1944926158"/>
+        <p14:creationId xmlns:p14="http://schemas.microsoft.com/office/powerpoint/2010/main" val="123254386"/>
       </p:ext>
     </p:extLst>
   </p:cSld>
@@ -1703,7 +1615,13 @@
       </p:grpSpPr>
       <p:sp>
         <p:nvSpPr>
-          <p:cNvPr id="2" name="Title 1"/>
+          <p:cNvPr id="2" name="Title 1">
+            <a:extLst>
+              <a:ext uri="{FF2B5EF4-FFF2-40B4-BE49-F238E27FC236}">
+                <a16:creationId xmlns:a16="http://schemas.microsoft.com/office/drawing/2014/main" id="{FC6F1BD1-9DCD-02C4-271D-4811B742AFB1}"/>
+              </a:ext>
+            </a:extLst>
+          </p:cNvPr>
           <p:cNvSpPr>
             <a:spLocks noGrp="1"/>
           </p:cNvSpPr>
@@ -1711,12 +1629,7 @@
             <p:ph type="title"/>
           </p:nvPr>
         </p:nvSpPr>
-        <p:spPr>
-          <a:xfrm>
-            <a:off x="768096" y="585216"/>
-            <a:ext cx="7290054" cy="1499616"/>
-          </a:xfrm>
-        </p:spPr>
+        <p:spPr/>
         <p:txBody>
           <a:bodyPr/>
           <a:lstStyle/>
@@ -1725,13 +1638,18 @@
               <a:rPr lang="en-US"/>
               <a:t>Click to edit Master title style</a:t>
             </a:r>
-            <a:endParaRPr lang="en-US" dirty="0"/>
           </a:p>
         </p:txBody>
       </p:sp>
       <p:sp>
         <p:nvSpPr>
-          <p:cNvPr id="3" name="Content Placeholder 2"/>
+          <p:cNvPr id="3" name="Content Placeholder 2">
+            <a:extLst>
+              <a:ext uri="{FF2B5EF4-FFF2-40B4-BE49-F238E27FC236}">
+                <a16:creationId xmlns:a16="http://schemas.microsoft.com/office/drawing/2014/main" id="{AACCF5FE-7B87-41E7-AAD2-0D676BE2FADD}"/>
+              </a:ext>
+            </a:extLst>
+          </p:cNvPr>
           <p:cNvSpPr>
             <a:spLocks noGrp="1"/>
           </p:cNvSpPr>
@@ -1741,8 +1659,8 @@
         </p:nvSpPr>
         <p:spPr>
           <a:xfrm>
-            <a:off x="768096" y="2286000"/>
-            <a:ext cx="3566160" cy="4023360"/>
+            <a:off x="838200" y="1825625"/>
+            <a:ext cx="5181600" cy="4351338"/>
           </a:xfrm>
         </p:spPr>
         <p:txBody>
@@ -1782,13 +1700,18 @@
               <a:rPr lang="en-US"/>
               <a:t>Fifth level</a:t>
             </a:r>
-            <a:endParaRPr lang="en-US" dirty="0"/>
           </a:p>
         </p:txBody>
       </p:sp>
       <p:sp>
         <p:nvSpPr>
-          <p:cNvPr id="4" name="Content Placeholder 3"/>
+          <p:cNvPr id="4" name="Content Placeholder 3">
+            <a:extLst>
+              <a:ext uri="{FF2B5EF4-FFF2-40B4-BE49-F238E27FC236}">
+                <a16:creationId xmlns:a16="http://schemas.microsoft.com/office/drawing/2014/main" id="{CEA5803D-6CE2-5A83-C911-DB0D044229A7}"/>
+              </a:ext>
+            </a:extLst>
+          </p:cNvPr>
           <p:cNvSpPr>
             <a:spLocks noGrp="1"/>
           </p:cNvSpPr>
@@ -1798,8 +1721,8 @@
         </p:nvSpPr>
         <p:spPr>
           <a:xfrm>
-            <a:off x="4491990" y="2286000"/>
-            <a:ext cx="3566160" cy="4023360"/>
+            <a:off x="6172200" y="1825625"/>
+            <a:ext cx="5181600" cy="4351338"/>
           </a:xfrm>
         </p:spPr>
         <p:txBody>
@@ -1839,13 +1762,18 @@
               <a:rPr lang="en-US"/>
               <a:t>Fifth level</a:t>
             </a:r>
-            <a:endParaRPr lang="en-US" dirty="0"/>
           </a:p>
         </p:txBody>
       </p:sp>
       <p:sp>
         <p:nvSpPr>
-          <p:cNvPr id="5" name="Date Placeholder 4"/>
+          <p:cNvPr id="5" name="Date Placeholder 4">
+            <a:extLst>
+              <a:ext uri="{FF2B5EF4-FFF2-40B4-BE49-F238E27FC236}">
+                <a16:creationId xmlns:a16="http://schemas.microsoft.com/office/drawing/2014/main" id="{2D88D0FE-CD83-2CE9-E282-6E33CD29A7DD}"/>
+              </a:ext>
+            </a:extLst>
+          </p:cNvPr>
           <p:cNvSpPr>
             <a:spLocks noGrp="1"/>
           </p:cNvSpPr>
@@ -1858,13 +1786,23 @@
           <a:bodyPr/>
           <a:lstStyle/>
           <a:p>
-            <a:endParaRPr lang="en-US" altLang="en-US"/>
+            <a:fld id="{D4A8B59E-FA37-844F-9869-E2895E496266}" type="datetime1">
+              <a:rPr lang="en-US" smtClean="0"/>
+              <a:t>5/28/23</a:t>
+            </a:fld>
+            <a:endParaRPr lang="en-US"/>
           </a:p>
         </p:txBody>
       </p:sp>
       <p:sp>
         <p:nvSpPr>
-          <p:cNvPr id="6" name="Footer Placeholder 5"/>
+          <p:cNvPr id="6" name="Footer Placeholder 5">
+            <a:extLst>
+              <a:ext uri="{FF2B5EF4-FFF2-40B4-BE49-F238E27FC236}">
+                <a16:creationId xmlns:a16="http://schemas.microsoft.com/office/drawing/2014/main" id="{5FE032EA-F88D-73FF-7B20-065F75717A86}"/>
+              </a:ext>
+            </a:extLst>
+          </p:cNvPr>
           <p:cNvSpPr>
             <a:spLocks noGrp="1"/>
           </p:cNvSpPr>
@@ -1878,7 +1816,7 @@
           <a:lstStyle/>
           <a:p>
             <a:r>
-              <a:rPr lang="en-US" altLang="en-US"/>
+              <a:rPr lang="en-US"/>
               <a:t>YETANOTHERMASTERYLEARNING</a:t>
             </a:r>
           </a:p>
@@ -1886,7 +1824,13 @@
       </p:sp>
       <p:sp>
         <p:nvSpPr>
-          <p:cNvPr id="7" name="Slide Number Placeholder 6"/>
+          <p:cNvPr id="7" name="Slide Number Placeholder 6">
+            <a:extLst>
+              <a:ext uri="{FF2B5EF4-FFF2-40B4-BE49-F238E27FC236}">
+                <a16:creationId xmlns:a16="http://schemas.microsoft.com/office/drawing/2014/main" id="{D832E2D1-A405-D43F-FA8F-AA4155EF2A07}"/>
+              </a:ext>
+            </a:extLst>
+          </p:cNvPr>
           <p:cNvSpPr>
             <a:spLocks noGrp="1"/>
           </p:cNvSpPr>
@@ -1899,19 +1843,18 @@
           <a:bodyPr/>
           <a:lstStyle/>
           <a:p>
-            <a:fld id="{0C4AFAA8-C6B5-4D4B-9E17-C41B35482554}" type="slidenum">
-              <a:rPr lang="en-US" altLang="en-US" smtClean="0"/>
-              <a:pPr/>
+            <a:fld id="{46B2860C-164B-0242-B761-89B72ADFD8CA}" type="slidenum">
+              <a:rPr lang="en-US" smtClean="0"/>
               <a:t>‹#›</a:t>
             </a:fld>
-            <a:endParaRPr lang="en-US" altLang="en-US"/>
+            <a:endParaRPr lang="en-US"/>
           </a:p>
         </p:txBody>
       </p:sp>
     </p:spTree>
     <p:extLst>
       <p:ext uri="{BB962C8B-B14F-4D97-AF65-F5344CB8AC3E}">
-        <p14:creationId xmlns:p14="http://schemas.microsoft.com/office/powerpoint/2010/main" val="804298909"/>
+        <p14:creationId xmlns:p14="http://schemas.microsoft.com/office/powerpoint/2010/main" val="3510941418"/>
       </p:ext>
     </p:extLst>
   </p:cSld>
@@ -1940,7 +1883,13 @@
       </p:grpSpPr>
       <p:sp>
         <p:nvSpPr>
-          <p:cNvPr id="10" name="Title 9"/>
+          <p:cNvPr id="2" name="Title 1">
+            <a:extLst>
+              <a:ext uri="{FF2B5EF4-FFF2-40B4-BE49-F238E27FC236}">
+                <a16:creationId xmlns:a16="http://schemas.microsoft.com/office/drawing/2014/main" id="{7A9C5611-226D-D904-C66A-EEA11B373441}"/>
+              </a:ext>
+            </a:extLst>
+          </p:cNvPr>
           <p:cNvSpPr>
             <a:spLocks noGrp="1"/>
           </p:cNvSpPr>
@@ -1950,8 +1899,8 @@
         </p:nvSpPr>
         <p:spPr>
           <a:xfrm>
-            <a:off x="768096" y="585216"/>
-            <a:ext cx="7290054" cy="1499616"/>
+            <a:off x="839788" y="365125"/>
+            <a:ext cx="10515600" cy="1325563"/>
           </a:xfrm>
         </p:spPr>
         <p:txBody>
@@ -1962,13 +1911,18 @@
               <a:rPr lang="en-US"/>
               <a:t>Click to edit Master title style</a:t>
             </a:r>
-            <a:endParaRPr lang="en-US" dirty="0"/>
           </a:p>
         </p:txBody>
       </p:sp>
       <p:sp>
         <p:nvSpPr>
-          <p:cNvPr id="3" name="Text Placeholder 2"/>
+          <p:cNvPr id="3" name="Text Placeholder 2">
+            <a:extLst>
+              <a:ext uri="{FF2B5EF4-FFF2-40B4-BE49-F238E27FC236}">
+                <a16:creationId xmlns:a16="http://schemas.microsoft.com/office/drawing/2014/main" id="{9D8258CE-3DC6-3E12-2856-70D5CD63CA3F}"/>
+              </a:ext>
+            </a:extLst>
+          </p:cNvPr>
           <p:cNvSpPr>
             <a:spLocks noGrp="1"/>
           </p:cNvSpPr>
@@ -1978,29 +1932,16 @@
         </p:nvSpPr>
         <p:spPr>
           <a:xfrm>
-            <a:off x="768096" y="2179636"/>
-            <a:ext cx="3566160" cy="822960"/>
+            <a:off x="839788" y="1681163"/>
+            <a:ext cx="5157787" cy="823912"/>
           </a:xfrm>
         </p:spPr>
         <p:txBody>
-          <a:bodyPr lIns="137160" rIns="137160" anchor="ctr">
-            <a:normAutofit/>
-          </a:bodyPr>
+          <a:bodyPr anchor="b"/>
           <a:lstStyle>
             <a:lvl1pPr marL="0" indent="0">
-              <a:spcBef>
-                <a:spcPts val="0"/>
-              </a:spcBef>
-              <a:spcAft>
-                <a:spcPts val="0"/>
-              </a:spcAft>
               <a:buNone/>
-              <a:defRPr sz="2200" b="0" cap="none" baseline="0">
-                <a:solidFill>
-                  <a:schemeClr val="accent2"/>
-                </a:solidFill>
-                <a:latin typeface="+mn-lt"/>
-              </a:defRPr>
+              <a:defRPr sz="2400" b="1"/>
             </a:lvl1pPr>
             <a:lvl2pPr marL="457200" indent="0">
               <a:buNone/>
@@ -2046,7 +1987,13 @@
       </p:sp>
       <p:sp>
         <p:nvSpPr>
-          <p:cNvPr id="4" name="Content Placeholder 3"/>
+          <p:cNvPr id="4" name="Content Placeholder 3">
+            <a:extLst>
+              <a:ext uri="{FF2B5EF4-FFF2-40B4-BE49-F238E27FC236}">
+                <a16:creationId xmlns:a16="http://schemas.microsoft.com/office/drawing/2014/main" id="{C7439BA5-1335-5A2C-A453-6CF71660D247}"/>
+              </a:ext>
+            </a:extLst>
+          </p:cNvPr>
           <p:cNvSpPr>
             <a:spLocks noGrp="1"/>
           </p:cNvSpPr>
@@ -2056,8 +2003,8 @@
         </p:nvSpPr>
         <p:spPr>
           <a:xfrm>
-            <a:off x="768096" y="2967788"/>
-            <a:ext cx="3566160" cy="3341572"/>
+            <a:off x="839788" y="2505075"/>
+            <a:ext cx="5157787" cy="3684588"/>
           </a:xfrm>
         </p:spPr>
         <p:txBody>
@@ -2097,13 +2044,18 @@
               <a:rPr lang="en-US"/>
               <a:t>Fifth level</a:t>
             </a:r>
-            <a:endParaRPr lang="en-US" dirty="0"/>
           </a:p>
         </p:txBody>
       </p:sp>
       <p:sp>
         <p:nvSpPr>
-          <p:cNvPr id="5" name="Text Placeholder 4"/>
+          <p:cNvPr id="5" name="Text Placeholder 4">
+            <a:extLst>
+              <a:ext uri="{FF2B5EF4-FFF2-40B4-BE49-F238E27FC236}">
+                <a16:creationId xmlns:a16="http://schemas.microsoft.com/office/drawing/2014/main" id="{8BFFB716-5DFA-DD88-DFA9-3E00A0CC18A7}"/>
+              </a:ext>
+            </a:extLst>
+          </p:cNvPr>
           <p:cNvSpPr>
             <a:spLocks noGrp="1"/>
           </p:cNvSpPr>
@@ -2113,31 +2065,16 @@
         </p:nvSpPr>
         <p:spPr>
           <a:xfrm>
-            <a:off x="4491990" y="2179636"/>
-            <a:ext cx="3566160" cy="822960"/>
+            <a:off x="6172200" y="1681163"/>
+            <a:ext cx="5183188" cy="823912"/>
           </a:xfrm>
         </p:spPr>
         <p:txBody>
-          <a:bodyPr lIns="137160" rIns="137160" anchor="ctr">
-            <a:normAutofit/>
-          </a:bodyPr>
+          <a:bodyPr anchor="b"/>
           <a:lstStyle>
             <a:lvl1pPr marL="0" indent="0">
-              <a:spcBef>
-                <a:spcPts val="0"/>
-              </a:spcBef>
-              <a:spcAft>
-                <a:spcPts val="0"/>
-              </a:spcAft>
               <a:buNone/>
-              <a:defRPr lang="en-US" sz="2200" b="0" kern="1200" cap="none" baseline="0" dirty="0">
-                <a:solidFill>
-                  <a:schemeClr val="accent2"/>
-                </a:solidFill>
-                <a:latin typeface="+mn-lt"/>
-                <a:ea typeface="+mn-ea"/>
-                <a:cs typeface="+mn-cs"/>
-              </a:defRPr>
+              <a:defRPr sz="2400" b="1"/>
             </a:lvl1pPr>
             <a:lvl2pPr marL="457200" indent="0">
               <a:buNone/>
@@ -2173,15 +2110,7 @@
             </a:lvl9pPr>
           </a:lstStyle>
           <a:p>
-            <a:pPr marL="0" lvl="0" indent="0" algn="l" defTabSz="914400" rtl="0" eaLnBrk="1" latinLnBrk="0" hangingPunct="1">
-              <a:lnSpc>
-                <a:spcPct val="90000"/>
-              </a:lnSpc>
-              <a:spcBef>
-                <a:spcPts val="1800"/>
-              </a:spcBef>
-              <a:buNone/>
-            </a:pPr>
+            <a:pPr lvl="0"/>
             <a:r>
               <a:rPr lang="en-US"/>
               <a:t>Click to edit Master text styles</a:t>
@@ -2191,7 +2120,13 @@
       </p:sp>
       <p:sp>
         <p:nvSpPr>
-          <p:cNvPr id="6" name="Content Placeholder 5"/>
+          <p:cNvPr id="6" name="Content Placeholder 5">
+            <a:extLst>
+              <a:ext uri="{FF2B5EF4-FFF2-40B4-BE49-F238E27FC236}">
+                <a16:creationId xmlns:a16="http://schemas.microsoft.com/office/drawing/2014/main" id="{41592F90-9F7E-013B-AD3F-94A93326AAB8}"/>
+              </a:ext>
+            </a:extLst>
+          </p:cNvPr>
           <p:cNvSpPr>
             <a:spLocks noGrp="1"/>
           </p:cNvSpPr>
@@ -2201,8 +2136,8 @@
         </p:nvSpPr>
         <p:spPr>
           <a:xfrm>
-            <a:off x="4491990" y="2967788"/>
-            <a:ext cx="3566160" cy="3341572"/>
+            <a:off x="6172200" y="2505075"/>
+            <a:ext cx="5183188" cy="3684588"/>
           </a:xfrm>
         </p:spPr>
         <p:txBody>
@@ -2242,13 +2177,18 @@
               <a:rPr lang="en-US"/>
               <a:t>Fifth level</a:t>
             </a:r>
-            <a:endParaRPr lang="en-US" dirty="0"/>
           </a:p>
         </p:txBody>
       </p:sp>
       <p:sp>
         <p:nvSpPr>
-          <p:cNvPr id="7" name="Date Placeholder 6"/>
+          <p:cNvPr id="7" name="Date Placeholder 6">
+            <a:extLst>
+              <a:ext uri="{FF2B5EF4-FFF2-40B4-BE49-F238E27FC236}">
+                <a16:creationId xmlns:a16="http://schemas.microsoft.com/office/drawing/2014/main" id="{C26E462A-09BE-4117-9D00-447C1F7E99D3}"/>
+              </a:ext>
+            </a:extLst>
+          </p:cNvPr>
           <p:cNvSpPr>
             <a:spLocks noGrp="1"/>
           </p:cNvSpPr>
@@ -2261,13 +2201,23 @@
           <a:bodyPr/>
           <a:lstStyle/>
           <a:p>
-            <a:endParaRPr lang="en-US" altLang="en-US"/>
+            <a:fld id="{BD093969-71F8-DE4A-A08A-7B2FB71B62A4}" type="datetime1">
+              <a:rPr lang="en-US" smtClean="0"/>
+              <a:t>5/28/23</a:t>
+            </a:fld>
+            <a:endParaRPr lang="en-US"/>
           </a:p>
         </p:txBody>
       </p:sp>
       <p:sp>
         <p:nvSpPr>
-          <p:cNvPr id="8" name="Footer Placeholder 7"/>
+          <p:cNvPr id="8" name="Footer Placeholder 7">
+            <a:extLst>
+              <a:ext uri="{FF2B5EF4-FFF2-40B4-BE49-F238E27FC236}">
+                <a16:creationId xmlns:a16="http://schemas.microsoft.com/office/drawing/2014/main" id="{4472AFFC-D84F-F323-3C94-E9EA5056457E}"/>
+              </a:ext>
+            </a:extLst>
+          </p:cNvPr>
           <p:cNvSpPr>
             <a:spLocks noGrp="1"/>
           </p:cNvSpPr>
@@ -2281,7 +2231,7 @@
           <a:lstStyle/>
           <a:p>
             <a:r>
-              <a:rPr lang="en-US" altLang="en-US"/>
+              <a:rPr lang="en-US"/>
               <a:t>YETANOTHERMASTERYLEARNING</a:t>
             </a:r>
           </a:p>
@@ -2289,7 +2239,13 @@
       </p:sp>
       <p:sp>
         <p:nvSpPr>
-          <p:cNvPr id="9" name="Slide Number Placeholder 8"/>
+          <p:cNvPr id="9" name="Slide Number Placeholder 8">
+            <a:extLst>
+              <a:ext uri="{FF2B5EF4-FFF2-40B4-BE49-F238E27FC236}">
+                <a16:creationId xmlns:a16="http://schemas.microsoft.com/office/drawing/2014/main" id="{DD963909-6671-E416-7FFD-A178F67D7DAA}"/>
+              </a:ext>
+            </a:extLst>
+          </p:cNvPr>
           <p:cNvSpPr>
             <a:spLocks noGrp="1"/>
           </p:cNvSpPr>
@@ -2302,19 +2258,18 @@
           <a:bodyPr/>
           <a:lstStyle/>
           <a:p>
-            <a:fld id="{B4DD973D-B0B9-2A43-9687-A201B0B9CF3D}" type="slidenum">
-              <a:rPr lang="en-US" altLang="en-US" smtClean="0"/>
-              <a:pPr/>
+            <a:fld id="{46B2860C-164B-0242-B761-89B72ADFD8CA}" type="slidenum">
+              <a:rPr lang="en-US" smtClean="0"/>
               <a:t>‹#›</a:t>
             </a:fld>
-            <a:endParaRPr lang="en-US" altLang="en-US"/>
+            <a:endParaRPr lang="en-US"/>
           </a:p>
         </p:txBody>
       </p:sp>
     </p:spTree>
     <p:extLst>
       <p:ext uri="{BB962C8B-B14F-4D97-AF65-F5344CB8AC3E}">
-        <p14:creationId xmlns:p14="http://schemas.microsoft.com/office/powerpoint/2010/main" val="2599927242"/>
+        <p14:creationId xmlns:p14="http://schemas.microsoft.com/office/powerpoint/2010/main" val="284254964"/>
       </p:ext>
     </p:extLst>
   </p:cSld>
@@ -2343,7 +2298,13 @@
       </p:grpSpPr>
       <p:sp>
         <p:nvSpPr>
-          <p:cNvPr id="2" name="Title 1"/>
+          <p:cNvPr id="2" name="Title 1">
+            <a:extLst>
+              <a:ext uri="{FF2B5EF4-FFF2-40B4-BE49-F238E27FC236}">
+                <a16:creationId xmlns:a16="http://schemas.microsoft.com/office/drawing/2014/main" id="{54EACDDA-9B31-F652-DC94-3FEDCA6A4D2B}"/>
+              </a:ext>
+            </a:extLst>
+          </p:cNvPr>
           <p:cNvSpPr>
             <a:spLocks noGrp="1"/>
           </p:cNvSpPr>
@@ -2360,13 +2321,18 @@
               <a:rPr lang="en-US"/>
               <a:t>Click to edit Master title style</a:t>
             </a:r>
-            <a:endParaRPr lang="en-US" dirty="0"/>
           </a:p>
         </p:txBody>
       </p:sp>
       <p:sp>
         <p:nvSpPr>
-          <p:cNvPr id="3" name="Date Placeholder 2"/>
+          <p:cNvPr id="3" name="Date Placeholder 2">
+            <a:extLst>
+              <a:ext uri="{FF2B5EF4-FFF2-40B4-BE49-F238E27FC236}">
+                <a16:creationId xmlns:a16="http://schemas.microsoft.com/office/drawing/2014/main" id="{40E67159-B66B-A59B-BE77-E97324F78BD5}"/>
+              </a:ext>
+            </a:extLst>
+          </p:cNvPr>
           <p:cNvSpPr>
             <a:spLocks noGrp="1"/>
           </p:cNvSpPr>
@@ -2379,13 +2345,23 @@
           <a:bodyPr/>
           <a:lstStyle/>
           <a:p>
-            <a:endParaRPr lang="en-US" altLang="en-US"/>
+            <a:fld id="{27246A0E-1A56-1041-B2D4-D54F75F602B9}" type="datetime1">
+              <a:rPr lang="en-US" smtClean="0"/>
+              <a:t>5/28/23</a:t>
+            </a:fld>
+            <a:endParaRPr lang="en-US"/>
           </a:p>
         </p:txBody>
       </p:sp>
       <p:sp>
         <p:nvSpPr>
-          <p:cNvPr id="4" name="Footer Placeholder 3"/>
+          <p:cNvPr id="4" name="Footer Placeholder 3">
+            <a:extLst>
+              <a:ext uri="{FF2B5EF4-FFF2-40B4-BE49-F238E27FC236}">
+                <a16:creationId xmlns:a16="http://schemas.microsoft.com/office/drawing/2014/main" id="{4F490E13-37FE-7E98-D4A0-CF2A876BBE40}"/>
+              </a:ext>
+            </a:extLst>
+          </p:cNvPr>
           <p:cNvSpPr>
             <a:spLocks noGrp="1"/>
           </p:cNvSpPr>
@@ -2399,7 +2375,7 @@
           <a:lstStyle/>
           <a:p>
             <a:r>
-              <a:rPr lang="en-US" altLang="en-US"/>
+              <a:rPr lang="en-US"/>
               <a:t>YETANOTHERMASTERYLEARNING</a:t>
             </a:r>
           </a:p>
@@ -2407,7 +2383,13 @@
       </p:sp>
       <p:sp>
         <p:nvSpPr>
-          <p:cNvPr id="5" name="Slide Number Placeholder 4"/>
+          <p:cNvPr id="5" name="Slide Number Placeholder 4">
+            <a:extLst>
+              <a:ext uri="{FF2B5EF4-FFF2-40B4-BE49-F238E27FC236}">
+                <a16:creationId xmlns:a16="http://schemas.microsoft.com/office/drawing/2014/main" id="{790CBB90-2D45-3BE6-A77C-F7771A159211}"/>
+              </a:ext>
+            </a:extLst>
+          </p:cNvPr>
           <p:cNvSpPr>
             <a:spLocks noGrp="1"/>
           </p:cNvSpPr>
@@ -2420,19 +2402,18 @@
           <a:bodyPr/>
           <a:lstStyle/>
           <a:p>
-            <a:fld id="{62040DA0-7567-8D4B-8EEE-C27451A177E3}" type="slidenum">
-              <a:rPr lang="en-US" altLang="en-US" smtClean="0"/>
-              <a:pPr/>
+            <a:fld id="{46B2860C-164B-0242-B761-89B72ADFD8CA}" type="slidenum">
+              <a:rPr lang="en-US" smtClean="0"/>
               <a:t>‹#›</a:t>
             </a:fld>
-            <a:endParaRPr lang="en-US" altLang="en-US"/>
+            <a:endParaRPr lang="en-US"/>
           </a:p>
         </p:txBody>
       </p:sp>
     </p:spTree>
     <p:extLst>
       <p:ext uri="{BB962C8B-B14F-4D97-AF65-F5344CB8AC3E}">
-        <p14:creationId xmlns:p14="http://schemas.microsoft.com/office/powerpoint/2010/main" val="3278341881"/>
+        <p14:creationId xmlns:p14="http://schemas.microsoft.com/office/powerpoint/2010/main" val="903256266"/>
       </p:ext>
     </p:extLst>
   </p:cSld>
@@ -2443,7 +2424,7 @@
 </file>
 
 <file path=ppt/slideLayouts/slideLayout7.xml><?xml version="1.0" encoding="utf-8"?>
-<p:sldLayout xmlns:a="http://schemas.openxmlformats.org/drawingml/2006/main" xmlns:r="http://schemas.openxmlformats.org/officeDocument/2006/relationships" xmlns:p="http://schemas.openxmlformats.org/presentationml/2006/main" showMasterSp="0" type="blank" preserve="1">
+<p:sldLayout xmlns:a="http://schemas.openxmlformats.org/drawingml/2006/main" xmlns:r="http://schemas.openxmlformats.org/officeDocument/2006/relationships" xmlns:p="http://schemas.openxmlformats.org/presentationml/2006/main" type="blank" preserve="1">
   <p:cSld name="Blank">
     <p:spTree>
       <p:nvGrpSpPr>
@@ -2461,7 +2442,13 @@
       </p:grpSpPr>
       <p:sp>
         <p:nvSpPr>
-          <p:cNvPr id="2" name="Date Placeholder 1"/>
+          <p:cNvPr id="2" name="Date Placeholder 1">
+            <a:extLst>
+              <a:ext uri="{FF2B5EF4-FFF2-40B4-BE49-F238E27FC236}">
+                <a16:creationId xmlns:a16="http://schemas.microsoft.com/office/drawing/2014/main" id="{7B53DE18-6E58-63C2-6991-9F0F935E98D4}"/>
+              </a:ext>
+            </a:extLst>
+          </p:cNvPr>
           <p:cNvSpPr>
             <a:spLocks noGrp="1"/>
           </p:cNvSpPr>
@@ -2474,13 +2461,23 @@
           <a:bodyPr/>
           <a:lstStyle/>
           <a:p>
-            <a:endParaRPr lang="en-US" altLang="en-US"/>
+            <a:fld id="{5C259648-EF0C-7A4D-B12F-F417F8F456B9}" type="datetime1">
+              <a:rPr lang="en-US" smtClean="0"/>
+              <a:t>5/28/23</a:t>
+            </a:fld>
+            <a:endParaRPr lang="en-US"/>
           </a:p>
         </p:txBody>
       </p:sp>
       <p:sp>
         <p:nvSpPr>
-          <p:cNvPr id="3" name="Footer Placeholder 2"/>
+          <p:cNvPr id="3" name="Footer Placeholder 2">
+            <a:extLst>
+              <a:ext uri="{FF2B5EF4-FFF2-40B4-BE49-F238E27FC236}">
+                <a16:creationId xmlns:a16="http://schemas.microsoft.com/office/drawing/2014/main" id="{200E0C33-FA6E-EEA5-B112-CC9A37C704A7}"/>
+              </a:ext>
+            </a:extLst>
+          </p:cNvPr>
           <p:cNvSpPr>
             <a:spLocks noGrp="1"/>
           </p:cNvSpPr>
@@ -2494,7 +2491,7 @@
           <a:lstStyle/>
           <a:p>
             <a:r>
-              <a:rPr lang="en-US" altLang="en-US"/>
+              <a:rPr lang="en-US"/>
               <a:t>YETANOTHERMASTERYLEARNING</a:t>
             </a:r>
           </a:p>
@@ -2502,7 +2499,13 @@
       </p:sp>
       <p:sp>
         <p:nvSpPr>
-          <p:cNvPr id="4" name="Slide Number Placeholder 3"/>
+          <p:cNvPr id="4" name="Slide Number Placeholder 3">
+            <a:extLst>
+              <a:ext uri="{FF2B5EF4-FFF2-40B4-BE49-F238E27FC236}">
+                <a16:creationId xmlns:a16="http://schemas.microsoft.com/office/drawing/2014/main" id="{D1165659-923C-DC17-C96A-EFA582087E62}"/>
+              </a:ext>
+            </a:extLst>
+          </p:cNvPr>
           <p:cNvSpPr>
             <a:spLocks noGrp="1"/>
           </p:cNvSpPr>
@@ -2515,19 +2518,18 @@
           <a:bodyPr/>
           <a:lstStyle/>
           <a:p>
-            <a:fld id="{79C1B0E8-5108-F143-9647-A3DF71637223}" type="slidenum">
-              <a:rPr lang="en-US" altLang="en-US" smtClean="0"/>
-              <a:pPr/>
+            <a:fld id="{46B2860C-164B-0242-B761-89B72ADFD8CA}" type="slidenum">
+              <a:rPr lang="en-US" smtClean="0"/>
               <a:t>‹#›</a:t>
             </a:fld>
-            <a:endParaRPr lang="en-US" altLang="en-US"/>
+            <a:endParaRPr lang="en-US"/>
           </a:p>
         </p:txBody>
       </p:sp>
     </p:spTree>
     <p:extLst>
       <p:ext uri="{BB962C8B-B14F-4D97-AF65-F5344CB8AC3E}">
-        <p14:creationId xmlns:p14="http://schemas.microsoft.com/office/powerpoint/2010/main" val="1927824022"/>
+        <p14:creationId xmlns:p14="http://schemas.microsoft.com/office/powerpoint/2010/main" val="3155865220"/>
       </p:ext>
     </p:extLst>
   </p:cSld>
@@ -2556,7 +2558,13 @@
       </p:grpSpPr>
       <p:sp>
         <p:nvSpPr>
-          <p:cNvPr id="8" name="Title 7"/>
+          <p:cNvPr id="2" name="Title 1">
+            <a:extLst>
+              <a:ext uri="{FF2B5EF4-FFF2-40B4-BE49-F238E27FC236}">
+                <a16:creationId xmlns:a16="http://schemas.microsoft.com/office/drawing/2014/main" id="{8AD6EF08-1511-8DBC-BF12-BD0176BF2CDE}"/>
+              </a:ext>
+            </a:extLst>
+          </p:cNvPr>
           <p:cNvSpPr>
             <a:spLocks noGrp="1"/>
           </p:cNvSpPr>
@@ -2566,20 +2574,15 @@
         </p:nvSpPr>
         <p:spPr>
           <a:xfrm>
-            <a:off x="768096" y="471509"/>
-            <a:ext cx="3291840" cy="1737360"/>
+            <a:off x="839788" y="457200"/>
+            <a:ext cx="3932237" cy="1600200"/>
           </a:xfrm>
         </p:spPr>
         <p:txBody>
-          <a:bodyPr>
-            <a:noAutofit/>
-          </a:bodyPr>
+          <a:bodyPr anchor="b"/>
           <a:lstStyle>
             <a:lvl1pPr>
-              <a:lnSpc>
-                <a:spcPct val="80000"/>
-              </a:lnSpc>
-              <a:defRPr sz="3600"/>
+              <a:defRPr sz="3200"/>
             </a:lvl1pPr>
           </a:lstStyle>
           <a:p>
@@ -2587,13 +2590,18 @@
               <a:rPr lang="en-US"/>
               <a:t>Click to edit Master title style</a:t>
             </a:r>
-            <a:endParaRPr lang="en-US" dirty="0"/>
           </a:p>
         </p:txBody>
       </p:sp>
       <p:sp>
         <p:nvSpPr>
-          <p:cNvPr id="3" name="Content Placeholder 2"/>
+          <p:cNvPr id="3" name="Content Placeholder 2">
+            <a:extLst>
+              <a:ext uri="{FF2B5EF4-FFF2-40B4-BE49-F238E27FC236}">
+                <a16:creationId xmlns:a16="http://schemas.microsoft.com/office/drawing/2014/main" id="{20C47347-E5A6-56F7-2F12-BFFA8E7710C7}"/>
+              </a:ext>
+            </a:extLst>
+          </p:cNvPr>
           <p:cNvSpPr>
             <a:spLocks noGrp="1"/>
           </p:cNvSpPr>
@@ -2603,41 +2611,39 @@
         </p:nvSpPr>
         <p:spPr>
           <a:xfrm>
-            <a:off x="4286250" y="822960"/>
-            <a:ext cx="4258818" cy="5184648"/>
+            <a:off x="5183188" y="987425"/>
+            <a:ext cx="6172200" cy="4873625"/>
           </a:xfrm>
         </p:spPr>
         <p:txBody>
-          <a:bodyPr>
-            <a:normAutofit/>
-          </a:bodyPr>
+          <a:bodyPr/>
           <a:lstStyle>
             <a:lvl1pPr>
-              <a:defRPr sz="2000"/>
+              <a:defRPr sz="3200"/>
             </a:lvl1pPr>
             <a:lvl2pPr>
-              <a:defRPr sz="1600"/>
+              <a:defRPr sz="2800"/>
             </a:lvl2pPr>
             <a:lvl3pPr>
-              <a:defRPr sz="1200"/>
+              <a:defRPr sz="2400"/>
             </a:lvl3pPr>
             <a:lvl4pPr>
-              <a:defRPr sz="1200"/>
+              <a:defRPr sz="2000"/>
             </a:lvl4pPr>
             <a:lvl5pPr>
-              <a:defRPr sz="1200"/>
+              <a:defRPr sz="2000"/>
             </a:lvl5pPr>
             <a:lvl6pPr>
-              <a:defRPr sz="1200"/>
+              <a:defRPr sz="2000"/>
             </a:lvl6pPr>
             <a:lvl7pPr>
-              <a:defRPr sz="1200"/>
+              <a:defRPr sz="2000"/>
             </a:lvl7pPr>
             <a:lvl8pPr>
-              <a:defRPr sz="1200"/>
+              <a:defRPr sz="2000"/>
             </a:lvl8pPr>
             <a:lvl9pPr>
-              <a:defRPr sz="1200"/>
+              <a:defRPr sz="2000"/>
             </a:lvl9pPr>
           </a:lstStyle>
           <a:p>
@@ -2674,13 +2680,18 @@
               <a:rPr lang="en-US"/>
               <a:t>Fifth level</a:t>
             </a:r>
-            <a:endParaRPr lang="en-US" dirty="0"/>
           </a:p>
         </p:txBody>
       </p:sp>
       <p:sp>
         <p:nvSpPr>
-          <p:cNvPr id="4" name="Text Placeholder 3"/>
+          <p:cNvPr id="4" name="Text Placeholder 3">
+            <a:extLst>
+              <a:ext uri="{FF2B5EF4-FFF2-40B4-BE49-F238E27FC236}">
+                <a16:creationId xmlns:a16="http://schemas.microsoft.com/office/drawing/2014/main" id="{207E1B61-FC73-8110-493C-D94BE9A5AF7F}"/>
+              </a:ext>
+            </a:extLst>
+          </p:cNvPr>
           <p:cNvSpPr>
             <a:spLocks noGrp="1"/>
           </p:cNvSpPr>
@@ -2690,56 +2701,48 @@
         </p:nvSpPr>
         <p:spPr>
           <a:xfrm>
-            <a:off x="768096" y="2257506"/>
-            <a:ext cx="3291840" cy="3762294"/>
+            <a:off x="839788" y="2057400"/>
+            <a:ext cx="3932237" cy="3811588"/>
           </a:xfrm>
         </p:spPr>
         <p:txBody>
-          <a:bodyPr lIns="91440" rIns="91440">
-            <a:normAutofit/>
-          </a:bodyPr>
+          <a:bodyPr/>
           <a:lstStyle>
             <a:lvl1pPr marL="0" indent="0">
-              <a:lnSpc>
-                <a:spcPct val="108000"/>
-              </a:lnSpc>
-              <a:spcBef>
-                <a:spcPts val="600"/>
-              </a:spcBef>
               <a:buNone/>
               <a:defRPr sz="1600"/>
             </a:lvl1pPr>
             <a:lvl2pPr marL="457200" indent="0">
               <a:buNone/>
-              <a:defRPr sz="1200"/>
+              <a:defRPr sz="1400"/>
             </a:lvl2pPr>
             <a:lvl3pPr marL="914400" indent="0">
               <a:buNone/>
-              <a:defRPr sz="1000"/>
+              <a:defRPr sz="1200"/>
             </a:lvl3pPr>
             <a:lvl4pPr marL="1371600" indent="0">
               <a:buNone/>
-              <a:defRPr sz="900"/>
+              <a:defRPr sz="1000"/>
             </a:lvl4pPr>
             <a:lvl5pPr marL="1828800" indent="0">
               <a:buNone/>
-              <a:defRPr sz="900"/>
+              <a:defRPr sz="1000"/>
             </a:lvl5pPr>
             <a:lvl6pPr marL="2286000" indent="0">
               <a:buNone/>
-              <a:defRPr sz="900"/>
+              <a:defRPr sz="1000"/>
             </a:lvl6pPr>
             <a:lvl7pPr marL="2743200" indent="0">
               <a:buNone/>
-              <a:defRPr sz="900"/>
+              <a:defRPr sz="1000"/>
             </a:lvl7pPr>
             <a:lvl8pPr marL="3200400" indent="0">
               <a:buNone/>
-              <a:defRPr sz="900"/>
+              <a:defRPr sz="1000"/>
             </a:lvl8pPr>
             <a:lvl9pPr marL="3657600" indent="0">
               <a:buNone/>
-              <a:defRPr sz="900"/>
+              <a:defRPr sz="1000"/>
             </a:lvl9pPr>
           </a:lstStyle>
           <a:p>
@@ -2753,7 +2756,13 @@
       </p:sp>
       <p:sp>
         <p:nvSpPr>
-          <p:cNvPr id="5" name="Date Placeholder 4"/>
+          <p:cNvPr id="5" name="Date Placeholder 4">
+            <a:extLst>
+              <a:ext uri="{FF2B5EF4-FFF2-40B4-BE49-F238E27FC236}">
+                <a16:creationId xmlns:a16="http://schemas.microsoft.com/office/drawing/2014/main" id="{BA2A5E2F-FBA8-BCD9-F458-C7565F9BB155}"/>
+              </a:ext>
+            </a:extLst>
+          </p:cNvPr>
           <p:cNvSpPr>
             <a:spLocks noGrp="1"/>
           </p:cNvSpPr>
@@ -2766,13 +2775,23 @@
           <a:bodyPr/>
           <a:lstStyle/>
           <a:p>
-            <a:endParaRPr lang="en-US" altLang="en-US"/>
+            <a:fld id="{7DA12E91-5121-B048-9BAD-68AD8AAE125D}" type="datetime1">
+              <a:rPr lang="en-US" smtClean="0"/>
+              <a:t>5/28/23</a:t>
+            </a:fld>
+            <a:endParaRPr lang="en-US"/>
           </a:p>
         </p:txBody>
       </p:sp>
       <p:sp>
         <p:nvSpPr>
-          <p:cNvPr id="6" name="Footer Placeholder 5"/>
+          <p:cNvPr id="6" name="Footer Placeholder 5">
+            <a:extLst>
+              <a:ext uri="{FF2B5EF4-FFF2-40B4-BE49-F238E27FC236}">
+                <a16:creationId xmlns:a16="http://schemas.microsoft.com/office/drawing/2014/main" id="{D18BCA79-0A72-32D0-FCB4-F045E8E20BEC}"/>
+              </a:ext>
+            </a:extLst>
+          </p:cNvPr>
           <p:cNvSpPr>
             <a:spLocks noGrp="1"/>
           </p:cNvSpPr>
@@ -2786,7 +2805,7 @@
           <a:lstStyle/>
           <a:p>
             <a:r>
-              <a:rPr lang="en-US" altLang="en-US"/>
+              <a:rPr lang="en-US"/>
               <a:t>YETANOTHERMASTERYLEARNING</a:t>
             </a:r>
           </a:p>
@@ -2794,7 +2813,13 @@
       </p:sp>
       <p:sp>
         <p:nvSpPr>
-          <p:cNvPr id="7" name="Slide Number Placeholder 6"/>
+          <p:cNvPr id="7" name="Slide Number Placeholder 6">
+            <a:extLst>
+              <a:ext uri="{FF2B5EF4-FFF2-40B4-BE49-F238E27FC236}">
+                <a16:creationId xmlns:a16="http://schemas.microsoft.com/office/drawing/2014/main" id="{B96C5526-79BE-85E9-C9EA-FB7BDC902B96}"/>
+              </a:ext>
+            </a:extLst>
+          </p:cNvPr>
           <p:cNvSpPr>
             <a:spLocks noGrp="1"/>
           </p:cNvSpPr>
@@ -2807,19 +2832,18 @@
           <a:bodyPr/>
           <a:lstStyle/>
           <a:p>
-            <a:fld id="{4FE47AFD-88B7-FA4A-978C-0122FEE13093}" type="slidenum">
-              <a:rPr lang="en-US" altLang="en-US" smtClean="0"/>
-              <a:pPr/>
+            <a:fld id="{46B2860C-164B-0242-B761-89B72ADFD8CA}" type="slidenum">
+              <a:rPr lang="en-US" smtClean="0"/>
               <a:t>‹#›</a:t>
             </a:fld>
-            <a:endParaRPr lang="en-US" altLang="en-US"/>
+            <a:endParaRPr lang="en-US"/>
           </a:p>
         </p:txBody>
       </p:sp>
     </p:spTree>
     <p:extLst>
       <p:ext uri="{BB962C8B-B14F-4D97-AF65-F5344CB8AC3E}">
-        <p14:creationId xmlns:p14="http://schemas.microsoft.com/office/powerpoint/2010/main" val="2766548504"/>
+        <p14:creationId xmlns:p14="http://schemas.microsoft.com/office/powerpoint/2010/main" val="930314577"/>
       </p:ext>
     </p:extLst>
   </p:cSld>
@@ -2830,7 +2854,7 @@
 </file>
 
 <file path=ppt/slideLayouts/slideLayout9.xml><?xml version="1.0" encoding="utf-8"?>
-<p:sldLayout xmlns:a="http://schemas.openxmlformats.org/drawingml/2006/main" xmlns:r="http://schemas.openxmlformats.org/officeDocument/2006/relationships" xmlns:p="http://schemas.openxmlformats.org/presentationml/2006/main" showMasterSp="0" type="picTx" preserve="1">
+<p:sldLayout xmlns:a="http://schemas.openxmlformats.org/drawingml/2006/main" xmlns:r="http://schemas.openxmlformats.org/officeDocument/2006/relationships" xmlns:p="http://schemas.openxmlformats.org/presentationml/2006/main" type="picTx" preserve="1">
   <p:cSld name="Picture with Caption">
     <p:spTree>
       <p:nvGrpSpPr>
@@ -2848,7 +2872,13 @@
       </p:grpSpPr>
       <p:sp>
         <p:nvSpPr>
-          <p:cNvPr id="2" name="Title 1"/>
+          <p:cNvPr id="2" name="Title 1">
+            <a:extLst>
+              <a:ext uri="{FF2B5EF4-FFF2-40B4-BE49-F238E27FC236}">
+                <a16:creationId xmlns:a16="http://schemas.microsoft.com/office/drawing/2014/main" id="{88B5D184-83B4-696E-FA61-4E1BFDCADE11}"/>
+              </a:ext>
+            </a:extLst>
+          </p:cNvPr>
           <p:cNvSpPr>
             <a:spLocks noGrp="1"/>
           </p:cNvSpPr>
@@ -2858,17 +2888,15 @@
         </p:nvSpPr>
         <p:spPr>
           <a:xfrm>
-            <a:off x="342900" y="4960138"/>
-            <a:ext cx="5829300" cy="1463040"/>
+            <a:off x="839788" y="457200"/>
+            <a:ext cx="3932237" cy="1600200"/>
           </a:xfrm>
         </p:spPr>
         <p:txBody>
-          <a:bodyPr anchor="ctr">
-            <a:normAutofit/>
-          </a:bodyPr>
+          <a:bodyPr anchor="b"/>
           <a:lstStyle>
-            <a:lvl1pPr algn="r">
-              <a:defRPr sz="4400" spc="200" baseline="0"/>
+            <a:lvl1pPr>
+              <a:defRPr sz="3200"/>
             </a:lvl1pPr>
           </a:lstStyle>
           <a:p>
@@ -2876,15 +2904,20 @@
               <a:rPr lang="en-US"/>
               <a:t>Click to edit Master title style</a:t>
             </a:r>
-            <a:endParaRPr lang="en-US" dirty="0"/>
           </a:p>
         </p:txBody>
       </p:sp>
       <p:sp>
         <p:nvSpPr>
-          <p:cNvPr id="3" name="Picture Placeholder 2"/>
+          <p:cNvPr id="3" name="Picture Placeholder 2">
+            <a:extLst>
+              <a:ext uri="{FF2B5EF4-FFF2-40B4-BE49-F238E27FC236}">
+                <a16:creationId xmlns:a16="http://schemas.microsoft.com/office/drawing/2014/main" id="{9C7E5575-44FF-8473-421A-C995FDC3A8B5}"/>
+              </a:ext>
+            </a:extLst>
+          </p:cNvPr>
           <p:cNvSpPr>
-            <a:spLocks noGrp="1" noChangeAspect="1"/>
+            <a:spLocks noGrp="1"/>
           </p:cNvSpPr>
           <p:nvPr>
             <p:ph type="pic" idx="1"/>
@@ -2892,68 +2925,64 @@
         </p:nvSpPr>
         <p:spPr>
           <a:xfrm>
-            <a:off x="0" y="-1"/>
-            <a:ext cx="9141714" cy="4572000"/>
+            <a:off x="5183188" y="987425"/>
+            <a:ext cx="6172200" cy="4873625"/>
           </a:xfrm>
-          <a:solidFill>
-            <a:schemeClr val="accent2">
-              <a:lumMod val="60000"/>
-              <a:lumOff val="40000"/>
-            </a:schemeClr>
-          </a:solidFill>
         </p:spPr>
         <p:txBody>
-          <a:bodyPr lIns="457200" tIns="365760" anchor="t"/>
+          <a:bodyPr/>
           <a:lstStyle>
             <a:lvl1pPr marL="0" indent="0">
               <a:buNone/>
+              <a:defRPr sz="3200"/>
+            </a:lvl1pPr>
+            <a:lvl2pPr marL="457200" indent="0">
+              <a:buNone/>
+              <a:defRPr sz="2800"/>
+            </a:lvl2pPr>
+            <a:lvl3pPr marL="914400" indent="0">
+              <a:buNone/>
               <a:defRPr sz="2400"/>
-            </a:lvl1pPr>
-            <a:lvl2pPr marL="342900" indent="0">
+            </a:lvl3pPr>
+            <a:lvl4pPr marL="1371600" indent="0">
               <a:buNone/>
-              <a:defRPr sz="2100"/>
-            </a:lvl2pPr>
-            <a:lvl3pPr marL="685800" indent="0">
+              <a:defRPr sz="2000"/>
+            </a:lvl4pPr>
+            <a:lvl5pPr marL="1828800" indent="0">
               <a:buNone/>
-              <a:defRPr sz="1800"/>
-            </a:lvl3pPr>
-            <a:lvl4pPr marL="1028700" indent="0">
+              <a:defRPr sz="2000"/>
+            </a:lvl5pPr>
+            <a:lvl6pPr marL="2286000" indent="0">
               <a:buNone/>
-              <a:defRPr sz="1500"/>
-            </a:lvl4pPr>
-            <a:lvl5pPr marL="1371600" indent="0">
+              <a:defRPr sz="2000"/>
+            </a:lvl6pPr>
+            <a:lvl7pPr marL="2743200" indent="0">
               <a:buNone/>
-              <a:defRPr sz="1500"/>
-            </a:lvl5pPr>
-            <a:lvl6pPr marL="1714500" indent="0">
+              <a:defRPr sz="2000"/>
+            </a:lvl7pPr>
+            <a:lvl8pPr marL="3200400" indent="0">
               <a:buNone/>
-              <a:defRPr sz="1500"/>
-            </a:lvl6pPr>
-            <a:lvl7pPr marL="2057400" indent="0">
+              <a:defRPr sz="2000"/>
+            </a:lvl8pPr>
+            <a:lvl9pPr marL="3657600" indent="0">
               <a:buNone/>
-              <a:defRPr sz="1500"/>
-            </a:lvl7pPr>
-            <a:lvl8pPr marL="2400300" indent="0">
-              <a:buNone/>
-              <a:defRPr sz="1500"/>
-            </a:lvl8pPr>
-            <a:lvl9pPr marL="2743200" indent="0">
-              <a:buNone/>
-              <a:defRPr sz="1500"/>
+              <a:defRPr sz="2000"/>
             </a:lvl9pPr>
           </a:lstStyle>
           <a:p>
-            <a:r>
-              <a:rPr lang="en-US"/>
-              <a:t>Click icon to add picture</a:t>
-            </a:r>
-            <a:endParaRPr lang="en-US" dirty="0"/>
+            <a:endParaRPr lang="en-US"/>
           </a:p>
         </p:txBody>
       </p:sp>
       <p:sp>
         <p:nvSpPr>
-          <p:cNvPr id="4" name="Text Placeholder 3"/>
+          <p:cNvPr id="4" name="Text Placeholder 3">
+            <a:extLst>
+              <a:ext uri="{FF2B5EF4-FFF2-40B4-BE49-F238E27FC236}">
+                <a16:creationId xmlns:a16="http://schemas.microsoft.com/office/drawing/2014/main" id="{A348B890-45E4-6AFB-F38A-AEF7B71AA241}"/>
+              </a:ext>
+            </a:extLst>
+          </p:cNvPr>
           <p:cNvSpPr>
             <a:spLocks noGrp="1"/>
           </p:cNvSpPr>
@@ -2963,63 +2992,48 @@
         </p:nvSpPr>
         <p:spPr>
           <a:xfrm>
-            <a:off x="6457950" y="4960138"/>
-            <a:ext cx="2400300" cy="1463040"/>
+            <a:off x="839788" y="2057400"/>
+            <a:ext cx="3932237" cy="3811588"/>
           </a:xfrm>
         </p:spPr>
         <p:txBody>
-          <a:bodyPr lIns="91440" rIns="91440" anchor="ctr">
-            <a:normAutofit/>
-          </a:bodyPr>
+          <a:bodyPr/>
           <a:lstStyle>
             <a:lvl1pPr marL="0" indent="0">
-              <a:lnSpc>
-                <a:spcPct val="100000"/>
-              </a:lnSpc>
-              <a:spcBef>
-                <a:spcPts val="0"/>
-              </a:spcBef>
               <a:buNone/>
-              <a:defRPr sz="1600">
-                <a:solidFill>
-                  <a:schemeClr val="tx1">
-                    <a:lumMod val="95000"/>
-                    <a:lumOff val="5000"/>
-                  </a:schemeClr>
-                </a:solidFill>
-              </a:defRPr>
+              <a:defRPr sz="1600"/>
             </a:lvl1pPr>
-            <a:lvl2pPr marL="342900" indent="0">
+            <a:lvl2pPr marL="457200" indent="0">
               <a:buNone/>
-              <a:defRPr sz="1050"/>
+              <a:defRPr sz="1400"/>
             </a:lvl2pPr>
-            <a:lvl3pPr marL="685800" indent="0">
+            <a:lvl3pPr marL="914400" indent="0">
               <a:buNone/>
-              <a:defRPr sz="900"/>
+              <a:defRPr sz="1200"/>
             </a:lvl3pPr>
-            <a:lvl4pPr marL="1028700" indent="0">
+            <a:lvl4pPr marL="1371600" indent="0">
               <a:buNone/>
-              <a:defRPr sz="750"/>
+              <a:defRPr sz="1000"/>
             </a:lvl4pPr>
-            <a:lvl5pPr marL="1371600" indent="0">
+            <a:lvl5pPr marL="1828800" indent="0">
               <a:buNone/>
-              <a:defRPr sz="750"/>
+              <a:defRPr sz="1000"/>
             </a:lvl5pPr>
-            <a:lvl6pPr marL="1714500" indent="0">
+            <a:lvl6pPr marL="2286000" indent="0">
               <a:buNone/>
-              <a:defRPr sz="750"/>
+              <a:defRPr sz="1000"/>
             </a:lvl6pPr>
-            <a:lvl7pPr marL="2057400" indent="0">
+            <a:lvl7pPr marL="2743200" indent="0">
               <a:buNone/>
-              <a:defRPr sz="750"/>
+              <a:defRPr sz="1000"/>
             </a:lvl7pPr>
-            <a:lvl8pPr marL="2400300" indent="0">
+            <a:lvl8pPr marL="3200400" indent="0">
               <a:buNone/>
-              <a:defRPr sz="750"/>
+              <a:defRPr sz="1000"/>
             </a:lvl8pPr>
-            <a:lvl9pPr marL="2743200" indent="0">
+            <a:lvl9pPr marL="3657600" indent="0">
               <a:buNone/>
-              <a:defRPr sz="750"/>
+              <a:defRPr sz="1000"/>
             </a:lvl9pPr>
           </a:lstStyle>
           <a:p>
@@ -3033,7 +3047,13 @@
       </p:sp>
       <p:sp>
         <p:nvSpPr>
-          <p:cNvPr id="5" name="Date Placeholder 4"/>
+          <p:cNvPr id="5" name="Date Placeholder 4">
+            <a:extLst>
+              <a:ext uri="{FF2B5EF4-FFF2-40B4-BE49-F238E27FC236}">
+                <a16:creationId xmlns:a16="http://schemas.microsoft.com/office/drawing/2014/main" id="{B05EB32A-A2F6-3170-5900-E50CDB3EB1FF}"/>
+              </a:ext>
+            </a:extLst>
+          </p:cNvPr>
           <p:cNvSpPr>
             <a:spLocks noGrp="1"/>
           </p:cNvSpPr>
@@ -3046,13 +3066,23 @@
           <a:bodyPr/>
           <a:lstStyle/>
           <a:p>
-            <a:endParaRPr lang="en-US" altLang="en-US"/>
+            <a:fld id="{74CF6637-AED6-A84E-81A1-94A0C37C8374}" type="datetime1">
+              <a:rPr lang="en-US" smtClean="0"/>
+              <a:t>5/28/23</a:t>
+            </a:fld>
+            <a:endParaRPr lang="en-US"/>
           </a:p>
         </p:txBody>
       </p:sp>
       <p:sp>
         <p:nvSpPr>
-          <p:cNvPr id="6" name="Footer Placeholder 5"/>
+          <p:cNvPr id="6" name="Footer Placeholder 5">
+            <a:extLst>
+              <a:ext uri="{FF2B5EF4-FFF2-40B4-BE49-F238E27FC236}">
+                <a16:creationId xmlns:a16="http://schemas.microsoft.com/office/drawing/2014/main" id="{67FDAFE4-0824-F104-C0E0-793147B37A70}"/>
+              </a:ext>
+            </a:extLst>
+          </p:cNvPr>
           <p:cNvSpPr>
             <a:spLocks noGrp="1"/>
           </p:cNvSpPr>
@@ -3066,7 +3096,7 @@
           <a:lstStyle/>
           <a:p>
             <a:r>
-              <a:rPr lang="en-US" altLang="en-US"/>
+              <a:rPr lang="en-US"/>
               <a:t>YETANOTHERMASTERYLEARNING</a:t>
             </a:r>
           </a:p>
@@ -3074,7 +3104,13 @@
       </p:sp>
       <p:sp>
         <p:nvSpPr>
-          <p:cNvPr id="7" name="Slide Number Placeholder 6"/>
+          <p:cNvPr id="7" name="Slide Number Placeholder 6">
+            <a:extLst>
+              <a:ext uri="{FF2B5EF4-FFF2-40B4-BE49-F238E27FC236}">
+                <a16:creationId xmlns:a16="http://schemas.microsoft.com/office/drawing/2014/main" id="{A279A999-9FEF-11C6-9061-6EF65A0C1502}"/>
+              </a:ext>
+            </a:extLst>
+          </p:cNvPr>
           <p:cNvSpPr>
             <a:spLocks noGrp="1"/>
           </p:cNvSpPr>
@@ -3087,54 +3123,18 @@
           <a:bodyPr/>
           <a:lstStyle/>
           <a:p>
-            <a:fld id="{1CFDCC3F-6085-0A45-8183-4F9E7373B83D}" type="slidenum">
-              <a:rPr lang="en-US" altLang="en-US" smtClean="0"/>
-              <a:pPr/>
+            <a:fld id="{46B2860C-164B-0242-B761-89B72ADFD8CA}" type="slidenum">
+              <a:rPr lang="en-US" smtClean="0"/>
               <a:t>‹#›</a:t>
             </a:fld>
-            <a:endParaRPr lang="en-US" altLang="en-US"/>
+            <a:endParaRPr lang="en-US"/>
           </a:p>
         </p:txBody>
       </p:sp>
-      <p:cxnSp>
-        <p:nvCxnSpPr>
-          <p:cNvPr id="8" name="Straight Connector 7"/>
-          <p:cNvCxnSpPr/>
-          <p:nvPr/>
-        </p:nvCxnSpPr>
-        <p:spPr>
-          <a:xfrm flipV="1">
-            <a:off x="6290132" y="5264106"/>
-            <a:ext cx="0" cy="914400"/>
-          </a:xfrm>
-          <a:prstGeom prst="line">
-            <a:avLst/>
-          </a:prstGeom>
-          <a:ln w="19050">
-            <a:solidFill>
-              <a:schemeClr val="accent1"/>
-            </a:solidFill>
-          </a:ln>
-        </p:spPr>
-        <p:style>
-          <a:lnRef idx="1">
-            <a:schemeClr val="accent1"/>
-          </a:lnRef>
-          <a:fillRef idx="0">
-            <a:schemeClr val="accent1"/>
-          </a:fillRef>
-          <a:effectRef idx="0">
-            <a:schemeClr val="accent1"/>
-          </a:effectRef>
-          <a:fontRef idx="minor">
-            <a:schemeClr val="tx1"/>
-          </a:fontRef>
-        </p:style>
-      </p:cxnSp>
     </p:spTree>
     <p:extLst>
       <p:ext uri="{BB962C8B-B14F-4D97-AF65-F5344CB8AC3E}">
-        <p14:creationId xmlns:p14="http://schemas.microsoft.com/office/powerpoint/2010/main" val="2998534706"/>
+        <p14:creationId xmlns:p14="http://schemas.microsoft.com/office/powerpoint/2010/main" val="2171362142"/>
       </p:ext>
     </p:extLst>
   </p:cSld>
@@ -3148,9 +3148,12 @@
 <p:sldMaster xmlns:a="http://schemas.openxmlformats.org/drawingml/2006/main" xmlns:r="http://schemas.openxmlformats.org/officeDocument/2006/relationships" xmlns:p="http://schemas.openxmlformats.org/presentationml/2006/main">
   <p:cSld>
     <p:bg>
-      <p:bgRef idx="1001">
-        <a:schemeClr val="bg1"/>
-      </p:bgRef>
+      <p:bgPr>
+        <a:solidFill>
+          <a:srgbClr val="B8D0CD"/>
+        </a:solidFill>
+        <a:effectLst/>
+      </p:bgPr>
     </p:bg>
     <p:spTree>
       <p:nvGrpSpPr>
@@ -3168,7 +3171,13 @@
       </p:grpSpPr>
       <p:sp>
         <p:nvSpPr>
-          <p:cNvPr id="2" name="Title Placeholder 1"/>
+          <p:cNvPr id="2" name="Title Placeholder 1">
+            <a:extLst>
+              <a:ext uri="{FF2B5EF4-FFF2-40B4-BE49-F238E27FC236}">
+                <a16:creationId xmlns:a16="http://schemas.microsoft.com/office/drawing/2014/main" id="{AA1DC494-4E74-7F2F-B144-0A7E1A5FDD54}"/>
+              </a:ext>
+            </a:extLst>
+          </p:cNvPr>
           <p:cNvSpPr>
             <a:spLocks noGrp="1"/>
           </p:cNvSpPr>
@@ -3178,8 +3187,8 @@
         </p:nvSpPr>
         <p:spPr>
           <a:xfrm>
-            <a:off x="768096" y="585216"/>
-            <a:ext cx="7290054" cy="1499616"/>
+            <a:off x="838200" y="365125"/>
+            <a:ext cx="10515600" cy="1325563"/>
           </a:xfrm>
           <a:prstGeom prst="rect">
             <a:avLst/>
@@ -3195,13 +3204,18 @@
               <a:rPr lang="en-US"/>
               <a:t>Click to edit Master title style</a:t>
             </a:r>
-            <a:endParaRPr lang="en-US" dirty="0"/>
           </a:p>
         </p:txBody>
       </p:sp>
       <p:sp>
         <p:nvSpPr>
-          <p:cNvPr id="3" name="Text Placeholder 2"/>
+          <p:cNvPr id="3" name="Text Placeholder 2">
+            <a:extLst>
+              <a:ext uri="{FF2B5EF4-FFF2-40B4-BE49-F238E27FC236}">
+                <a16:creationId xmlns:a16="http://schemas.microsoft.com/office/drawing/2014/main" id="{B8F57682-A467-55F1-AA64-2C57976E8354}"/>
+              </a:ext>
+            </a:extLst>
+          </p:cNvPr>
           <p:cNvSpPr>
             <a:spLocks noGrp="1"/>
           </p:cNvSpPr>
@@ -3211,15 +3225,15 @@
         </p:nvSpPr>
         <p:spPr>
           <a:xfrm>
-            <a:off x="768096" y="2286000"/>
-            <a:ext cx="7290055" cy="4023360"/>
+            <a:off x="838200" y="1825625"/>
+            <a:ext cx="10515600" cy="4351338"/>
           </a:xfrm>
           <a:prstGeom prst="rect">
             <a:avLst/>
           </a:prstGeom>
         </p:spPr>
         <p:txBody>
-          <a:bodyPr vert="horz" lIns="45720" tIns="45720" rIns="45720" bIns="45720" rtlCol="0">
+          <a:bodyPr vert="horz" lIns="91440" tIns="45720" rIns="91440" bIns="45720" rtlCol="0">
             <a:normAutofit/>
           </a:bodyPr>
           <a:lstStyle/>
@@ -3257,13 +3271,18 @@
               <a:rPr lang="en-US"/>
               <a:t>Fifth level</a:t>
             </a:r>
-            <a:endParaRPr lang="en-US" dirty="0"/>
           </a:p>
         </p:txBody>
       </p:sp>
       <p:sp>
         <p:nvSpPr>
-          <p:cNvPr id="4" name="Date Placeholder 3"/>
+          <p:cNvPr id="4" name="Date Placeholder 3">
+            <a:extLst>
+              <a:ext uri="{FF2B5EF4-FFF2-40B4-BE49-F238E27FC236}">
+                <a16:creationId xmlns:a16="http://schemas.microsoft.com/office/drawing/2014/main" id="{0F42513A-53D3-6007-E2A1-1372EEFA69AF}"/>
+              </a:ext>
+            </a:extLst>
+          </p:cNvPr>
           <p:cNvSpPr>
             <a:spLocks noGrp="1"/>
           </p:cNvSpPr>
@@ -3273,8 +3292,8 @@
         </p:nvSpPr>
         <p:spPr>
           <a:xfrm>
-            <a:off x="768097" y="6470704"/>
-            <a:ext cx="1615607" cy="274320"/>
+            <a:off x="838200" y="6356350"/>
+            <a:ext cx="2743200" cy="365125"/>
           </a:xfrm>
           <a:prstGeom prst="rect">
             <a:avLst/>
@@ -3284,25 +3303,33 @@
           <a:bodyPr vert="horz" lIns="91440" tIns="45720" rIns="91440" bIns="45720" rtlCol="0" anchor="ctr"/>
           <a:lstStyle>
             <a:lvl1pPr algn="l">
-              <a:defRPr sz="1000">
+              <a:defRPr sz="1200">
                 <a:solidFill>
                   <a:schemeClr val="tx1">
-                    <a:lumMod val="95000"/>
-                    <a:lumOff val="5000"/>
+                    <a:tint val="75000"/>
                   </a:schemeClr>
                 </a:solidFill>
-                <a:latin typeface="+mj-lt"/>
               </a:defRPr>
             </a:lvl1pPr>
           </a:lstStyle>
           <a:p>
-            <a:endParaRPr lang="en-US" altLang="en-US"/>
+            <a:fld id="{ED514CA8-E6B5-0342-8032-B57F75B2D9A7}" type="datetime1">
+              <a:rPr lang="en-US" smtClean="0"/>
+              <a:t>5/28/23</a:t>
+            </a:fld>
+            <a:endParaRPr lang="en-US"/>
           </a:p>
         </p:txBody>
       </p:sp>
       <p:sp>
         <p:nvSpPr>
-          <p:cNvPr id="5" name="Footer Placeholder 4"/>
+          <p:cNvPr id="5" name="Footer Placeholder 4">
+            <a:extLst>
+              <a:ext uri="{FF2B5EF4-FFF2-40B4-BE49-F238E27FC236}">
+                <a16:creationId xmlns:a16="http://schemas.microsoft.com/office/drawing/2014/main" id="{0200FFCC-C04D-09D0-9F76-C4439120C72E}"/>
+              </a:ext>
+            </a:extLst>
+          </p:cNvPr>
           <p:cNvSpPr>
             <a:spLocks noGrp="1"/>
           </p:cNvSpPr>
@@ -3312,8 +3339,54 @@
         </p:nvSpPr>
         <p:spPr>
           <a:xfrm>
-            <a:off x="3632200" y="6470704"/>
-            <a:ext cx="4426094" cy="274320"/>
+            <a:off x="4038600" y="6356350"/>
+            <a:ext cx="4114800" cy="365125"/>
+          </a:xfrm>
+          <a:prstGeom prst="rect">
+            <a:avLst/>
+          </a:prstGeom>
+        </p:spPr>
+        <p:txBody>
+          <a:bodyPr vert="horz" lIns="91440" tIns="45720" rIns="91440" bIns="45720" rtlCol="0" anchor="ctr"/>
+          <a:lstStyle>
+            <a:lvl1pPr algn="ctr">
+              <a:defRPr sz="1200">
+                <a:solidFill>
+                  <a:schemeClr val="tx1">
+                    <a:tint val="75000"/>
+                  </a:schemeClr>
+                </a:solidFill>
+              </a:defRPr>
+            </a:lvl1pPr>
+          </a:lstStyle>
+          <a:p>
+            <a:r>
+              <a:rPr lang="en-US"/>
+              <a:t>YETANOTHERMASTERYLEARNING</a:t>
+            </a:r>
+          </a:p>
+        </p:txBody>
+      </p:sp>
+      <p:sp>
+        <p:nvSpPr>
+          <p:cNvPr id="6" name="Slide Number Placeholder 5">
+            <a:extLst>
+              <a:ext uri="{FF2B5EF4-FFF2-40B4-BE49-F238E27FC236}">
+                <a16:creationId xmlns:a16="http://schemas.microsoft.com/office/drawing/2014/main" id="{6646C23D-4982-9FE6-E8C6-90E21910C875}"/>
+              </a:ext>
+            </a:extLst>
+          </p:cNvPr>
+          <p:cNvSpPr>
+            <a:spLocks noGrp="1"/>
+          </p:cNvSpPr>
+          <p:nvPr>
+            <p:ph type="sldNum" sz="quarter" idx="4"/>
+          </p:nvPr>
+        </p:nvSpPr>
+        <p:spPr>
+          <a:xfrm>
+            <a:off x="8610600" y="6356350"/>
+            <a:ext cx="2743200" cy="365125"/>
           </a:xfrm>
           <a:prstGeom prst="rect">
             <a:avLst/>
@@ -3323,142 +3396,59 @@
           <a:bodyPr vert="horz" lIns="91440" tIns="45720" rIns="91440" bIns="45720" rtlCol="0" anchor="ctr"/>
           <a:lstStyle>
             <a:lvl1pPr algn="r">
-              <a:defRPr sz="1000" cap="all" baseline="0">
+              <a:defRPr sz="1200">
                 <a:solidFill>
                   <a:schemeClr val="tx1">
-                    <a:lumMod val="95000"/>
-                    <a:lumOff val="5000"/>
+                    <a:tint val="75000"/>
                   </a:schemeClr>
                 </a:solidFill>
-                <a:latin typeface="+mj-lt"/>
               </a:defRPr>
             </a:lvl1pPr>
           </a:lstStyle>
           <a:p>
-            <a:r>
-              <a:rPr lang="en-US" altLang="en-US"/>
-              <a:t>YETANOTHERMASTERYLEARNING</a:t>
-            </a:r>
+            <a:fld id="{46B2860C-164B-0242-B761-89B72ADFD8CA}" type="slidenum">
+              <a:rPr lang="en-US" smtClean="0"/>
+              <a:t>‹#›</a:t>
+            </a:fld>
+            <a:endParaRPr lang="en-US"/>
           </a:p>
         </p:txBody>
       </p:sp>
-      <p:sp>
-        <p:nvSpPr>
-          <p:cNvPr id="6" name="Slide Number Placeholder 5"/>
-          <p:cNvSpPr>
-            <a:spLocks noGrp="1"/>
-          </p:cNvSpPr>
-          <p:nvPr>
-            <p:ph type="sldNum" sz="quarter" idx="4"/>
-          </p:nvPr>
-        </p:nvSpPr>
-        <p:spPr>
-          <a:xfrm>
-            <a:off x="8128000" y="6470704"/>
-            <a:ext cx="730250" cy="274320"/>
-          </a:xfrm>
-          <a:prstGeom prst="rect">
-            <a:avLst/>
-          </a:prstGeom>
-        </p:spPr>
-        <p:txBody>
-          <a:bodyPr vert="horz" lIns="91440" tIns="45720" rIns="91440" bIns="45720" rtlCol="0" anchor="ctr"/>
-          <a:lstStyle>
-            <a:lvl1pPr algn="l">
-              <a:defRPr sz="1000">
-                <a:solidFill>
-                  <a:schemeClr val="tx1">
-                    <a:lumMod val="95000"/>
-                    <a:lumOff val="5000"/>
-                  </a:schemeClr>
-                </a:solidFill>
-                <a:latin typeface="+mj-lt"/>
-              </a:defRPr>
-            </a:lvl1pPr>
-          </a:lstStyle>
-          <a:p>
-            <a:fld id="{44771516-934D-D443-8412-572CDDE959D8}" type="slidenum">
-              <a:rPr lang="en-US" altLang="en-US" smtClean="0"/>
-              <a:pPr/>
-              <a:t>‹#›</a:t>
-            </a:fld>
-            <a:endParaRPr lang="en-US" altLang="en-US"/>
-          </a:p>
-        </p:txBody>
-      </p:sp>
-      <p:cxnSp>
-        <p:nvCxnSpPr>
-          <p:cNvPr id="8" name="Straight Connector 7"/>
-          <p:cNvCxnSpPr/>
-          <p:nvPr/>
-        </p:nvCxnSpPr>
-        <p:spPr>
-          <a:xfrm flipV="1">
-            <a:off x="571500" y="826324"/>
-            <a:ext cx="0" cy="914400"/>
-          </a:xfrm>
-          <a:prstGeom prst="line">
-            <a:avLst/>
-          </a:prstGeom>
-          <a:ln w="19050">
-            <a:solidFill>
-              <a:schemeClr val="accent2"/>
-            </a:solidFill>
-          </a:ln>
-        </p:spPr>
-        <p:style>
-          <a:lnRef idx="1">
-            <a:schemeClr val="accent1"/>
-          </a:lnRef>
-          <a:fillRef idx="0">
-            <a:schemeClr val="accent1"/>
-          </a:fillRef>
-          <a:effectRef idx="0">
-            <a:schemeClr val="accent1"/>
-          </a:effectRef>
-          <a:fontRef idx="minor">
-            <a:schemeClr val="tx1"/>
-          </a:fontRef>
-        </p:style>
-      </p:cxnSp>
     </p:spTree>
     <p:extLst>
       <p:ext uri="{BB962C8B-B14F-4D97-AF65-F5344CB8AC3E}">
-        <p14:creationId xmlns:p14="http://schemas.microsoft.com/office/powerpoint/2010/main" val="3778582066"/>
+        <p14:creationId xmlns:p14="http://schemas.microsoft.com/office/powerpoint/2010/main" val="404898466"/>
       </p:ext>
     </p:extLst>
   </p:cSld>
   <p:clrMap bg1="lt1" tx1="dk1" bg2="lt2" tx2="dk2" accent1="accent1" accent2="accent2" accent3="accent3" accent4="accent4" accent5="accent5" accent6="accent6" hlink="hlink" folHlink="folHlink"/>
   <p:sldLayoutIdLst>
-    <p:sldLayoutId id="2147483710" r:id="rId1"/>
-    <p:sldLayoutId id="2147483711" r:id="rId2"/>
-    <p:sldLayoutId id="2147483712" r:id="rId3"/>
-    <p:sldLayoutId id="2147483713" r:id="rId4"/>
-    <p:sldLayoutId id="2147483714" r:id="rId5"/>
-    <p:sldLayoutId id="2147483715" r:id="rId6"/>
-    <p:sldLayoutId id="2147483716" r:id="rId7"/>
-    <p:sldLayoutId id="2147483717" r:id="rId8"/>
-    <p:sldLayoutId id="2147483718" r:id="rId9"/>
-    <p:sldLayoutId id="2147483719" r:id="rId10"/>
-    <p:sldLayoutId id="2147483720" r:id="rId11"/>
+    <p:sldLayoutId id="2147483649" r:id="rId1"/>
+    <p:sldLayoutId id="2147483650" r:id="rId2"/>
+    <p:sldLayoutId id="2147483651" r:id="rId3"/>
+    <p:sldLayoutId id="2147483652" r:id="rId4"/>
+    <p:sldLayoutId id="2147483653" r:id="rId5"/>
+    <p:sldLayoutId id="2147483654" r:id="rId6"/>
+    <p:sldLayoutId id="2147483655" r:id="rId7"/>
+    <p:sldLayoutId id="2147483656" r:id="rId8"/>
+    <p:sldLayoutId id="2147483657" r:id="rId9"/>
+    <p:sldLayoutId id="2147483658" r:id="rId10"/>
+    <p:sldLayoutId id="2147483659" r:id="rId11"/>
   </p:sldLayoutIdLst>
-  <p:hf sldNum="0" hdr="0" dt="0"/>
+  <p:hf sldNum="0" hdr="0" ftr="0" dt="0"/>
   <p:txStyles>
     <p:titleStyle>
       <a:lvl1pPr algn="l" defTabSz="914400" rtl="0" eaLnBrk="1" latinLnBrk="0" hangingPunct="1">
         <a:lnSpc>
-          <a:spcPct val="80000"/>
+          <a:spcPct val="90000"/>
         </a:lnSpc>
         <a:spcBef>
           <a:spcPct val="0"/>
         </a:spcBef>
         <a:buNone/>
-        <a:defRPr sz="4400" kern="1200" cap="all" spc="100" baseline="0">
+        <a:defRPr sz="4400" kern="1200">
           <a:solidFill>
-            <a:schemeClr val="tx1">
-              <a:lumMod val="95000"/>
-              <a:lumOff val="5000"/>
-            </a:schemeClr>
+            <a:schemeClr val="tx1"/>
           </a:solidFill>
           <a:latin typeface="+mj-lt"/>
           <a:ea typeface="+mj-ea"/>
@@ -3467,22 +3457,51 @@
       </a:lvl1pPr>
     </p:titleStyle>
     <p:bodyStyle>
-      <a:lvl1pPr marL="91440" indent="-91440" algn="l" defTabSz="914400" rtl="0" eaLnBrk="1" latinLnBrk="0" hangingPunct="1">
+      <a:lvl1pPr marL="228600" indent="-228600" algn="l" defTabSz="914400" rtl="0" eaLnBrk="1" latinLnBrk="0" hangingPunct="1">
         <a:lnSpc>
           <a:spcPct val="90000"/>
         </a:lnSpc>
         <a:spcBef>
-          <a:spcPts val="1200"/>
+          <a:spcPts val="1000"/>
         </a:spcBef>
-        <a:spcAft>
-          <a:spcPts val="200"/>
-        </a:spcAft>
-        <a:buClr>
-          <a:schemeClr val="accent2"/>
-        </a:buClr>
-        <a:buSzPct val="100000"/>
-        <a:buFont typeface="Tw Cen MT" panose="020B0602020104020603" pitchFamily="34" charset="0"/>
-        <a:buChar char=" "/>
+        <a:buFont typeface="Arial" panose="020B0604020202020204" pitchFamily="34" charset="0"/>
+        <a:buChar char="•"/>
+        <a:defRPr sz="2800" kern="1200">
+          <a:solidFill>
+            <a:schemeClr val="tx1"/>
+          </a:solidFill>
+          <a:latin typeface="+mn-lt"/>
+          <a:ea typeface="+mn-ea"/>
+          <a:cs typeface="+mn-cs"/>
+        </a:defRPr>
+      </a:lvl1pPr>
+      <a:lvl2pPr marL="685800" indent="-228600" algn="l" defTabSz="914400" rtl="0" eaLnBrk="1" latinLnBrk="0" hangingPunct="1">
+        <a:lnSpc>
+          <a:spcPct val="90000"/>
+        </a:lnSpc>
+        <a:spcBef>
+          <a:spcPts val="500"/>
+        </a:spcBef>
+        <a:buFont typeface="Arial" panose="020B0604020202020204" pitchFamily="34" charset="0"/>
+        <a:buChar char="•"/>
+        <a:defRPr sz="2400" kern="1200">
+          <a:solidFill>
+            <a:schemeClr val="tx1"/>
+          </a:solidFill>
+          <a:latin typeface="+mn-lt"/>
+          <a:ea typeface="+mn-ea"/>
+          <a:cs typeface="+mn-cs"/>
+        </a:defRPr>
+      </a:lvl2pPr>
+      <a:lvl3pPr marL="1143000" indent="-228600" algn="l" defTabSz="914400" rtl="0" eaLnBrk="1" latinLnBrk="0" hangingPunct="1">
+        <a:lnSpc>
+          <a:spcPct val="90000"/>
+        </a:lnSpc>
+        <a:spcBef>
+          <a:spcPts val="500"/>
+        </a:spcBef>
+        <a:buFont typeface="Arial" panose="020B0604020202020204" pitchFamily="34" charset="0"/>
+        <a:buChar char="•"/>
         <a:defRPr sz="2000" kern="1200">
           <a:solidFill>
             <a:schemeClr val="tx1"/>
@@ -3491,71 +3510,17 @@
           <a:ea typeface="+mn-ea"/>
           <a:cs typeface="+mn-cs"/>
         </a:defRPr>
-      </a:lvl1pPr>
-      <a:lvl2pPr marL="265176" indent="-137160" algn="l" defTabSz="914400" rtl="0" eaLnBrk="1" latinLnBrk="0" hangingPunct="1">
+      </a:lvl3pPr>
+      <a:lvl4pPr marL="1600200" indent="-228600" algn="l" defTabSz="914400" rtl="0" eaLnBrk="1" latinLnBrk="0" hangingPunct="1">
         <a:lnSpc>
           <a:spcPct val="90000"/>
         </a:lnSpc>
         <a:spcBef>
-          <a:spcPts val="200"/>
+          <a:spcPts val="500"/>
         </a:spcBef>
-        <a:spcAft>
-          <a:spcPts val="400"/>
-        </a:spcAft>
-        <a:buClr>
-          <a:schemeClr val="accent2"/>
-        </a:buClr>
-        <a:buFont typeface="Wingdings 3" pitchFamily="18" charset="2"/>
-        <a:buChar char=""/>
-        <a:defRPr sz="1600" kern="1200">
-          <a:solidFill>
-            <a:schemeClr val="tx1"/>
-          </a:solidFill>
-          <a:latin typeface="+mn-lt"/>
-          <a:ea typeface="+mn-ea"/>
-          <a:cs typeface="+mn-cs"/>
-        </a:defRPr>
-      </a:lvl2pPr>
-      <a:lvl3pPr marL="448056" indent="-137160" algn="l" defTabSz="914400" rtl="0" eaLnBrk="1" latinLnBrk="0" hangingPunct="1">
-        <a:lnSpc>
-          <a:spcPct val="90000"/>
-        </a:lnSpc>
-        <a:spcBef>
-          <a:spcPts val="200"/>
-        </a:spcBef>
-        <a:spcAft>
-          <a:spcPts val="400"/>
-        </a:spcAft>
-        <a:buClr>
-          <a:schemeClr val="accent2"/>
-        </a:buClr>
-        <a:buFont typeface="Wingdings 3" pitchFamily="18" charset="2"/>
-        <a:buChar char=""/>
-        <a:defRPr sz="1200" kern="1200">
-          <a:solidFill>
-            <a:schemeClr val="tx1"/>
-          </a:solidFill>
-          <a:latin typeface="+mn-lt"/>
-          <a:ea typeface="+mn-ea"/>
-          <a:cs typeface="+mn-cs"/>
-        </a:defRPr>
-      </a:lvl3pPr>
-      <a:lvl4pPr marL="594360" indent="-137160" algn="l" defTabSz="914400" rtl="0" eaLnBrk="1" latinLnBrk="0" hangingPunct="1">
-        <a:lnSpc>
-          <a:spcPct val="90000"/>
-        </a:lnSpc>
-        <a:spcBef>
-          <a:spcPts val="200"/>
-        </a:spcBef>
-        <a:spcAft>
-          <a:spcPts val="400"/>
-        </a:spcAft>
-        <a:buClr>
-          <a:schemeClr val="accent2"/>
-        </a:buClr>
-        <a:buFont typeface="Wingdings 3" pitchFamily="18" charset="2"/>
-        <a:buChar char=""/>
-        <a:defRPr sz="1200" kern="1200">
+        <a:buFont typeface="Arial" panose="020B0604020202020204" pitchFamily="34" charset="0"/>
+        <a:buChar char="•"/>
+        <a:defRPr sz="1800" kern="1200">
           <a:solidFill>
             <a:schemeClr val="tx1"/>
           </a:solidFill>
@@ -3564,22 +3529,16 @@
           <a:cs typeface="+mn-cs"/>
         </a:defRPr>
       </a:lvl4pPr>
-      <a:lvl5pPr marL="777240" indent="-137160" algn="l" defTabSz="914400" rtl="0" eaLnBrk="1" latinLnBrk="0" hangingPunct="1">
+      <a:lvl5pPr marL="2057400" indent="-228600" algn="l" defTabSz="914400" rtl="0" eaLnBrk="1" latinLnBrk="0" hangingPunct="1">
         <a:lnSpc>
           <a:spcPct val="90000"/>
         </a:lnSpc>
         <a:spcBef>
-          <a:spcPts val="200"/>
+          <a:spcPts val="500"/>
         </a:spcBef>
-        <a:spcAft>
-          <a:spcPts val="400"/>
-        </a:spcAft>
-        <a:buClr>
-          <a:schemeClr val="accent2"/>
-        </a:buClr>
-        <a:buFont typeface="Wingdings 3" pitchFamily="18" charset="2"/>
-        <a:buChar char=""/>
-        <a:defRPr sz="1200" kern="1200">
+        <a:buFont typeface="Arial" panose="020B0604020202020204" pitchFamily="34" charset="0"/>
+        <a:buChar char="•"/>
+        <a:defRPr sz="1800" kern="1200">
           <a:solidFill>
             <a:schemeClr val="tx1"/>
           </a:solidFill>
@@ -3588,22 +3547,16 @@
           <a:cs typeface="+mn-cs"/>
         </a:defRPr>
       </a:lvl5pPr>
-      <a:lvl6pPr marL="914400" indent="-137160" algn="l" defTabSz="914400" rtl="0" eaLnBrk="1" latinLnBrk="0" hangingPunct="1">
+      <a:lvl6pPr marL="2514600" indent="-228600" algn="l" defTabSz="914400" rtl="0" eaLnBrk="1" latinLnBrk="0" hangingPunct="1">
         <a:lnSpc>
           <a:spcPct val="90000"/>
         </a:lnSpc>
         <a:spcBef>
-          <a:spcPts val="200"/>
+          <a:spcPts val="500"/>
         </a:spcBef>
-        <a:spcAft>
-          <a:spcPts val="400"/>
-        </a:spcAft>
-        <a:buClr>
-          <a:schemeClr val="accent2"/>
-        </a:buClr>
-        <a:buFont typeface="Wingdings 3" pitchFamily="18" charset="2"/>
-        <a:buChar char=""/>
-        <a:defRPr sz="1200" kern="1200">
+        <a:buFont typeface="Arial" panose="020B0604020202020204" pitchFamily="34" charset="0"/>
+        <a:buChar char="•"/>
+        <a:defRPr sz="1800" kern="1200">
           <a:solidFill>
             <a:schemeClr val="tx1"/>
           </a:solidFill>
@@ -3612,22 +3565,16 @@
           <a:cs typeface="+mn-cs"/>
         </a:defRPr>
       </a:lvl6pPr>
-      <a:lvl7pPr marL="1060704" indent="-137160" algn="l" defTabSz="914400" rtl="0" eaLnBrk="1" latinLnBrk="0" hangingPunct="1">
+      <a:lvl7pPr marL="2971800" indent="-228600" algn="l" defTabSz="914400" rtl="0" eaLnBrk="1" latinLnBrk="0" hangingPunct="1">
         <a:lnSpc>
           <a:spcPct val="90000"/>
         </a:lnSpc>
         <a:spcBef>
-          <a:spcPts val="200"/>
+          <a:spcPts val="500"/>
         </a:spcBef>
-        <a:spcAft>
-          <a:spcPts val="400"/>
-        </a:spcAft>
-        <a:buClr>
-          <a:schemeClr val="accent2"/>
-        </a:buClr>
-        <a:buFont typeface="Wingdings 3" pitchFamily="18" charset="2"/>
-        <a:buChar char=""/>
-        <a:defRPr sz="1200" kern="1200">
+        <a:buFont typeface="Arial" panose="020B0604020202020204" pitchFamily="34" charset="0"/>
+        <a:buChar char="•"/>
+        <a:defRPr sz="1800" kern="1200">
           <a:solidFill>
             <a:schemeClr val="tx1"/>
           </a:solidFill>
@@ -3636,22 +3583,16 @@
           <a:cs typeface="+mn-cs"/>
         </a:defRPr>
       </a:lvl7pPr>
-      <a:lvl8pPr marL="1216152" indent="-137160" algn="l" defTabSz="914400" rtl="0" eaLnBrk="1" latinLnBrk="0" hangingPunct="1">
+      <a:lvl8pPr marL="3429000" indent="-228600" algn="l" defTabSz="914400" rtl="0" eaLnBrk="1" latinLnBrk="0" hangingPunct="1">
         <a:lnSpc>
           <a:spcPct val="90000"/>
         </a:lnSpc>
         <a:spcBef>
-          <a:spcPts val="200"/>
+          <a:spcPts val="500"/>
         </a:spcBef>
-        <a:spcAft>
-          <a:spcPts val="400"/>
-        </a:spcAft>
-        <a:buClr>
-          <a:schemeClr val="accent2"/>
-        </a:buClr>
-        <a:buFont typeface="Wingdings 3" pitchFamily="18" charset="2"/>
-        <a:buChar char=""/>
-        <a:defRPr sz="1200" kern="1200">
+        <a:buFont typeface="Arial" panose="020B0604020202020204" pitchFamily="34" charset="0"/>
+        <a:buChar char="•"/>
+        <a:defRPr sz="1800" kern="1200">
           <a:solidFill>
             <a:schemeClr val="tx1"/>
           </a:solidFill>
@@ -3660,22 +3601,16 @@
           <a:cs typeface="+mn-cs"/>
         </a:defRPr>
       </a:lvl8pPr>
-      <a:lvl9pPr marL="1362456" indent="-137160" algn="l" defTabSz="914400" rtl="0" eaLnBrk="1" latinLnBrk="0" hangingPunct="1">
+      <a:lvl9pPr marL="3886200" indent="-228600" algn="l" defTabSz="914400" rtl="0" eaLnBrk="1" latinLnBrk="0" hangingPunct="1">
         <a:lnSpc>
           <a:spcPct val="90000"/>
         </a:lnSpc>
         <a:spcBef>
-          <a:spcPts val="200"/>
+          <a:spcPts val="500"/>
         </a:spcBef>
-        <a:spcAft>
-          <a:spcPts val="400"/>
-        </a:spcAft>
-        <a:buClr>
-          <a:schemeClr val="accent2"/>
-        </a:buClr>
-        <a:buFont typeface="Wingdings 3" pitchFamily="18" charset="2"/>
-        <a:buChar char=""/>
-        <a:defRPr sz="1200" kern="1200">
+        <a:buFont typeface="Arial" panose="020B0604020202020204" pitchFamily="34" charset="0"/>
+        <a:buChar char="•"/>
+        <a:defRPr sz="1800" kern="1200">
           <a:solidFill>
             <a:schemeClr val="tx1"/>
           </a:solidFill>
@@ -3819,7 +3754,7 @@
         </p:nvSpPr>
         <p:spPr>
           <a:xfrm>
-            <a:off x="762000" y="762000"/>
+            <a:off x="2286000" y="762000"/>
             <a:ext cx="8229600" cy="1143000"/>
           </a:xfrm>
         </p:spPr>
@@ -3832,34 +3767,6 @@
             <a:r>
               <a:rPr lang="en-US" altLang="en-US" dirty="0"/>
               <a:t>Program Flow Control</a:t>
-            </a:r>
-          </a:p>
-        </p:txBody>
-      </p:sp>
-      <p:sp>
-        <p:nvSpPr>
-          <p:cNvPr id="4" name="Footer Placeholder 3">
-            <a:extLst>
-              <a:ext uri="{FF2B5EF4-FFF2-40B4-BE49-F238E27FC236}">
-                <a16:creationId xmlns:a16="http://schemas.microsoft.com/office/drawing/2014/main" id="{BEBD7842-9EE0-6200-661D-9EDC40555D1F}"/>
-              </a:ext>
-            </a:extLst>
-          </p:cNvPr>
-          <p:cNvSpPr>
-            <a:spLocks noGrp="1"/>
-          </p:cNvSpPr>
-          <p:nvPr>
-            <p:ph type="ftr" sz="quarter" idx="11"/>
-          </p:nvPr>
-        </p:nvSpPr>
-        <p:spPr/>
-        <p:txBody>
-          <a:bodyPr/>
-          <a:lstStyle/>
-          <a:p>
-            <a:r>
-              <a:rPr lang="en-US" altLang="en-US"/>
-              <a:t>YETANOTHERMASTERYLEARNING</a:t>
             </a:r>
           </a:p>
         </p:txBody>
@@ -4086,34 +3993,6 @@
           </a:p>
         </p:txBody>
       </p:sp>
-      <p:sp>
-        <p:nvSpPr>
-          <p:cNvPr id="2" name="Footer Placeholder 1">
-            <a:extLst>
-              <a:ext uri="{FF2B5EF4-FFF2-40B4-BE49-F238E27FC236}">
-                <a16:creationId xmlns:a16="http://schemas.microsoft.com/office/drawing/2014/main" id="{601AD7A5-57B6-B02B-5A4C-DF7688EAF0C3}"/>
-              </a:ext>
-            </a:extLst>
-          </p:cNvPr>
-          <p:cNvSpPr>
-            <a:spLocks noGrp="1"/>
-          </p:cNvSpPr>
-          <p:nvPr>
-            <p:ph type="ftr" sz="quarter" idx="11"/>
-          </p:nvPr>
-        </p:nvSpPr>
-        <p:spPr/>
-        <p:txBody>
-          <a:bodyPr/>
-          <a:lstStyle/>
-          <a:p>
-            <a:r>
-              <a:rPr lang="en-US" altLang="en-US"/>
-              <a:t>YETANOTHERMASTERYLEARNING</a:t>
-            </a:r>
-          </a:p>
-        </p:txBody>
-      </p:sp>
     </p:spTree>
   </p:cSld>
   <p:clrMapOvr>
@@ -4157,7 +4036,7 @@
         </p:nvSpPr>
         <p:spPr>
           <a:xfrm>
-            <a:off x="768096" y="585216"/>
+            <a:off x="2292096" y="585216"/>
             <a:ext cx="8223504" cy="1499616"/>
           </a:xfrm>
         </p:spPr>
@@ -4207,7 +4086,7 @@
         </p:nvGrpSpPr>
         <p:grpSpPr bwMode="auto">
           <a:xfrm>
-            <a:off x="1066800" y="1752600"/>
+            <a:off x="2590800" y="1752600"/>
             <a:ext cx="7162800" cy="4648200"/>
             <a:chOff x="672" y="960"/>
             <a:chExt cx="4512" cy="2928"/>
@@ -5040,34 +4919,6 @@
           </p:txBody>
         </p:sp>
       </p:grpSp>
-      <p:sp>
-        <p:nvSpPr>
-          <p:cNvPr id="2" name="Footer Placeholder 1">
-            <a:extLst>
-              <a:ext uri="{FF2B5EF4-FFF2-40B4-BE49-F238E27FC236}">
-                <a16:creationId xmlns:a16="http://schemas.microsoft.com/office/drawing/2014/main" id="{2A2693DC-9AEF-4409-A300-11F68A777D7B}"/>
-              </a:ext>
-            </a:extLst>
-          </p:cNvPr>
-          <p:cNvSpPr>
-            <a:spLocks noGrp="1"/>
-          </p:cNvSpPr>
-          <p:nvPr>
-            <p:ph type="ftr" sz="quarter" idx="11"/>
-          </p:nvPr>
-        </p:nvSpPr>
-        <p:spPr/>
-        <p:txBody>
-          <a:bodyPr/>
-          <a:lstStyle/>
-          <a:p>
-            <a:r>
-              <a:rPr lang="en-US" altLang="en-US"/>
-              <a:t>YETANOTHERMASTERYLEARNING</a:t>
-            </a:r>
-          </a:p>
-        </p:txBody>
-      </p:sp>
     </p:spTree>
   </p:cSld>
   <p:clrMapOvr>
@@ -5353,34 +5204,6 @@
             <a:r>
               <a:rPr lang="en-US" altLang="en-US" dirty="0"/>
               <a:t>}</a:t>
-            </a:r>
-          </a:p>
-        </p:txBody>
-      </p:sp>
-      <p:sp>
-        <p:nvSpPr>
-          <p:cNvPr id="2" name="Footer Placeholder 1">
-            <a:extLst>
-              <a:ext uri="{FF2B5EF4-FFF2-40B4-BE49-F238E27FC236}">
-                <a16:creationId xmlns:a16="http://schemas.microsoft.com/office/drawing/2014/main" id="{345DD4B1-034B-4F3E-D6D2-945E4C324D24}"/>
-              </a:ext>
-            </a:extLst>
-          </p:cNvPr>
-          <p:cNvSpPr>
-            <a:spLocks noGrp="1"/>
-          </p:cNvSpPr>
-          <p:nvPr>
-            <p:ph type="ftr" sz="quarter" idx="11"/>
-          </p:nvPr>
-        </p:nvSpPr>
-        <p:spPr/>
-        <p:txBody>
-          <a:bodyPr/>
-          <a:lstStyle/>
-          <a:p>
-            <a:r>
-              <a:rPr lang="en-US" altLang="en-US"/>
-              <a:t>YETANOTHERMASTERYLEARNING</a:t>
             </a:r>
           </a:p>
         </p:txBody>
@@ -5428,7 +5251,7 @@
         </p:nvSpPr>
         <p:spPr>
           <a:xfrm>
-            <a:off x="768096" y="585216"/>
+            <a:off x="2292096" y="585216"/>
             <a:ext cx="8299704" cy="1319784"/>
           </a:xfrm>
         </p:spPr>
@@ -5531,34 +5354,6 @@
             <a:r>
               <a:rPr lang="en-US" altLang="en-US" dirty="0"/>
               <a:t>Example: Ask for the password until user gets it right</a:t>
-            </a:r>
-          </a:p>
-        </p:txBody>
-      </p:sp>
-      <p:sp>
-        <p:nvSpPr>
-          <p:cNvPr id="2" name="Footer Placeholder 1">
-            <a:extLst>
-              <a:ext uri="{FF2B5EF4-FFF2-40B4-BE49-F238E27FC236}">
-                <a16:creationId xmlns:a16="http://schemas.microsoft.com/office/drawing/2014/main" id="{52A0948E-E05B-B278-9ABC-61FAA5917FB6}"/>
-              </a:ext>
-            </a:extLst>
-          </p:cNvPr>
-          <p:cNvSpPr>
-            <a:spLocks noGrp="1"/>
-          </p:cNvSpPr>
-          <p:nvPr>
-            <p:ph type="ftr" sz="quarter" idx="11"/>
-          </p:nvPr>
-        </p:nvSpPr>
-        <p:spPr/>
-        <p:txBody>
-          <a:bodyPr/>
-          <a:lstStyle/>
-          <a:p>
-            <a:r>
-              <a:rPr lang="en-US" altLang="en-US"/>
-              <a:t>YETANOTHERMASTERYLEARNING</a:t>
             </a:r>
           </a:p>
         </p:txBody>
@@ -5701,34 +5496,6 @@
           </a:p>
         </p:txBody>
       </p:sp>
-      <p:sp>
-        <p:nvSpPr>
-          <p:cNvPr id="2" name="Footer Placeholder 1">
-            <a:extLst>
-              <a:ext uri="{FF2B5EF4-FFF2-40B4-BE49-F238E27FC236}">
-                <a16:creationId xmlns:a16="http://schemas.microsoft.com/office/drawing/2014/main" id="{5EA32C45-C236-34C0-430F-136B93C49ACF}"/>
-              </a:ext>
-            </a:extLst>
-          </p:cNvPr>
-          <p:cNvSpPr>
-            <a:spLocks noGrp="1"/>
-          </p:cNvSpPr>
-          <p:nvPr>
-            <p:ph type="ftr" sz="quarter" idx="11"/>
-          </p:nvPr>
-        </p:nvSpPr>
-        <p:spPr/>
-        <p:txBody>
-          <a:bodyPr/>
-          <a:lstStyle/>
-          <a:p>
-            <a:r>
-              <a:rPr lang="en-US" altLang="en-US"/>
-              <a:t>YETANOTHERMASTERYLEARNING</a:t>
-            </a:r>
-          </a:p>
-        </p:txBody>
-      </p:sp>
     </p:spTree>
   </p:cSld>
   <p:clrMapOvr>
@@ -5772,7 +5539,7 @@
         </p:nvSpPr>
         <p:spPr>
           <a:xfrm>
-            <a:off x="615696" y="737616"/>
+            <a:off x="2139696" y="737616"/>
             <a:ext cx="9137904" cy="1319784"/>
           </a:xfrm>
         </p:spPr>
@@ -5825,7 +5592,7 @@
         <p:spPr/>
         <p:txBody>
           <a:bodyPr vert="horz" lIns="45720" tIns="45720" rIns="45720" bIns="45720" rtlCol="0">
-            <a:normAutofit/>
+            <a:normAutofit fontScale="92500" lnSpcReduction="10000"/>
           </a:bodyPr>
           <a:lstStyle/>
           <a:p>
@@ -6045,7 +5812,7 @@
         <p:spPr/>
         <p:txBody>
           <a:bodyPr vert="horz" lIns="45720" tIns="45720" rIns="45720" bIns="45720" rtlCol="0">
-            <a:normAutofit/>
+            <a:normAutofit fontScale="92500" lnSpcReduction="10000"/>
           </a:bodyPr>
           <a:lstStyle/>
           <a:p>
@@ -6153,34 +5920,6 @@
             <a:endParaRPr lang="en-US" altLang="en-US" dirty="0">
               <a:latin typeface="Calibri" panose="020F0502020204030204" pitchFamily="34" charset="0"/>
             </a:endParaRPr>
-          </a:p>
-        </p:txBody>
-      </p:sp>
-      <p:sp>
-        <p:nvSpPr>
-          <p:cNvPr id="2" name="Footer Placeholder 1">
-            <a:extLst>
-              <a:ext uri="{FF2B5EF4-FFF2-40B4-BE49-F238E27FC236}">
-                <a16:creationId xmlns:a16="http://schemas.microsoft.com/office/drawing/2014/main" id="{C5E9FE58-6AE9-CD68-050E-DBDA07E91022}"/>
-              </a:ext>
-            </a:extLst>
-          </p:cNvPr>
-          <p:cNvSpPr>
-            <a:spLocks noGrp="1"/>
-          </p:cNvSpPr>
-          <p:nvPr>
-            <p:ph type="ftr" sz="quarter" idx="11"/>
-          </p:nvPr>
-        </p:nvSpPr>
-        <p:spPr/>
-        <p:txBody>
-          <a:bodyPr/>
-          <a:lstStyle/>
-          <a:p>
-            <a:r>
-              <a:rPr lang="en-US" altLang="en-US"/>
-              <a:t>YETANOTHERMASTERYLEARNING</a:t>
-            </a:r>
           </a:p>
         </p:txBody>
       </p:sp>
@@ -6227,7 +5966,7 @@
         </p:nvSpPr>
         <p:spPr>
           <a:xfrm>
-            <a:off x="768096" y="585216"/>
+            <a:off x="2292096" y="585216"/>
             <a:ext cx="7994904" cy="1499616"/>
           </a:xfrm>
         </p:spPr>
@@ -6309,7 +6048,7 @@
         </p:nvGrpSpPr>
         <p:grpSpPr bwMode="auto">
           <a:xfrm>
-            <a:off x="762000" y="1600200"/>
+            <a:off x="2286000" y="1600200"/>
             <a:ext cx="7924800" cy="4876800"/>
             <a:chOff x="480" y="1008"/>
             <a:chExt cx="4992" cy="3072"/>
@@ -7758,34 +7497,6 @@
           </p:txBody>
         </p:sp>
       </p:grpSp>
-      <p:sp>
-        <p:nvSpPr>
-          <p:cNvPr id="2" name="Footer Placeholder 1">
-            <a:extLst>
-              <a:ext uri="{FF2B5EF4-FFF2-40B4-BE49-F238E27FC236}">
-                <a16:creationId xmlns:a16="http://schemas.microsoft.com/office/drawing/2014/main" id="{D35DBE98-1CF1-583B-D43C-2AB0153023E7}"/>
-              </a:ext>
-            </a:extLst>
-          </p:cNvPr>
-          <p:cNvSpPr>
-            <a:spLocks noGrp="1"/>
-          </p:cNvSpPr>
-          <p:nvPr>
-            <p:ph type="ftr" sz="quarter" idx="11"/>
-          </p:nvPr>
-        </p:nvSpPr>
-        <p:spPr/>
-        <p:txBody>
-          <a:bodyPr/>
-          <a:lstStyle/>
-          <a:p>
-            <a:r>
-              <a:rPr lang="en-US" altLang="en-US"/>
-              <a:t>YETANOTHERMASTERYLEARNING</a:t>
-            </a:r>
-          </a:p>
-        </p:txBody>
-      </p:sp>
     </p:spTree>
   </p:cSld>
   <p:clrMapOvr>
@@ -7829,7 +7540,7 @@
         </p:nvSpPr>
         <p:spPr>
           <a:xfrm>
-            <a:off x="768096" y="585216"/>
+            <a:off x="2292096" y="585216"/>
             <a:ext cx="8299704" cy="1499616"/>
           </a:xfrm>
         </p:spPr>
@@ -7879,7 +7590,7 @@
         </p:nvGrpSpPr>
         <p:grpSpPr bwMode="auto">
           <a:xfrm>
-            <a:off x="176213" y="4038600"/>
+            <a:off x="1700214" y="4038600"/>
             <a:ext cx="3819525" cy="2559050"/>
             <a:chOff x="111" y="2544"/>
             <a:chExt cx="2406" cy="1612"/>
@@ -7902,7 +7613,7 @@
           <p:spPr bwMode="auto">
             <a:xfrm>
               <a:off x="240" y="3264"/>
-              <a:ext cx="1728" cy="748"/>
+              <a:ext cx="1728" cy="756"/>
             </a:xfrm>
             <a:prstGeom prst="rect">
               <a:avLst/>
@@ -8201,7 +7912,7 @@
         </p:nvGrpSpPr>
         <p:grpSpPr bwMode="auto">
           <a:xfrm>
-            <a:off x="762000" y="1600200"/>
+            <a:off x="2286000" y="1600200"/>
             <a:ext cx="7924800" cy="4876800"/>
             <a:chOff x="480" y="1008"/>
             <a:chExt cx="4992" cy="3072"/>
@@ -9656,34 +9367,6 @@
           </p:txBody>
         </p:sp>
       </p:grpSp>
-      <p:sp>
-        <p:nvSpPr>
-          <p:cNvPr id="2" name="Footer Placeholder 1">
-            <a:extLst>
-              <a:ext uri="{FF2B5EF4-FFF2-40B4-BE49-F238E27FC236}">
-                <a16:creationId xmlns:a16="http://schemas.microsoft.com/office/drawing/2014/main" id="{88AB234D-A20A-488B-01FB-3181ED2DEC1B}"/>
-              </a:ext>
-            </a:extLst>
-          </p:cNvPr>
-          <p:cNvSpPr>
-            <a:spLocks noGrp="1"/>
-          </p:cNvSpPr>
-          <p:nvPr>
-            <p:ph type="ftr" sz="quarter" idx="11"/>
-          </p:nvPr>
-        </p:nvSpPr>
-        <p:spPr/>
-        <p:txBody>
-          <a:bodyPr/>
-          <a:lstStyle/>
-          <a:p>
-            <a:r>
-              <a:rPr lang="en-US" altLang="en-US"/>
-              <a:t>YETANOTHERMASTERYLEARNING</a:t>
-            </a:r>
-          </a:p>
-        </p:txBody>
-      </p:sp>
     </p:spTree>
   </p:cSld>
   <p:clrMapOvr>
@@ -9727,13 +9410,13 @@
         </p:nvSpPr>
         <p:spPr>
           <a:xfrm>
-            <a:off x="766117" y="796402"/>
+            <a:off x="2290117" y="796402"/>
             <a:ext cx="8229600" cy="944562"/>
           </a:xfrm>
         </p:spPr>
         <p:txBody>
           <a:bodyPr vert="horz" lIns="91440" tIns="45720" rIns="91440" bIns="45720" rtlCol="0" anchor="ctr">
-            <a:normAutofit fontScale="90000"/>
+            <a:normAutofit/>
           </a:bodyPr>
           <a:lstStyle/>
           <a:p>
@@ -9780,7 +9463,7 @@
         <p:spPr/>
         <p:txBody>
           <a:bodyPr>
-            <a:normAutofit fontScale="92500" lnSpcReduction="20000"/>
+            <a:normAutofit fontScale="92500" lnSpcReduction="10000"/>
           </a:bodyPr>
           <a:lstStyle/>
           <a:p>
@@ -10271,34 +9954,6 @@
             <a:endParaRPr lang="en-US" altLang="en-US" sz="1800" dirty="0">
               <a:latin typeface="Trebuchet MS" panose="020B0703020202090204" pitchFamily="34" charset="0"/>
             </a:endParaRPr>
-          </a:p>
-        </p:txBody>
-      </p:sp>
-      <p:sp>
-        <p:nvSpPr>
-          <p:cNvPr id="2" name="Footer Placeholder 1">
-            <a:extLst>
-              <a:ext uri="{FF2B5EF4-FFF2-40B4-BE49-F238E27FC236}">
-                <a16:creationId xmlns:a16="http://schemas.microsoft.com/office/drawing/2014/main" id="{9324401F-78AE-982C-F63F-AC95275AD5D9}"/>
-              </a:ext>
-            </a:extLst>
-          </p:cNvPr>
-          <p:cNvSpPr>
-            <a:spLocks noGrp="1"/>
-          </p:cNvSpPr>
-          <p:nvPr>
-            <p:ph type="ftr" sz="quarter" idx="11"/>
-          </p:nvPr>
-        </p:nvSpPr>
-        <p:spPr/>
-        <p:txBody>
-          <a:bodyPr/>
-          <a:lstStyle/>
-          <a:p>
-            <a:r>
-              <a:rPr lang="en-US" altLang="en-US"/>
-              <a:t>YETANOTHERMASTERYLEARNING</a:t>
-            </a:r>
           </a:p>
         </p:txBody>
       </p:sp>
@@ -10361,39 +10016,6 @@
       </p:sp>
       <p:sp>
         <p:nvSpPr>
-          <p:cNvPr id="2" name="Footer Placeholder 1">
-            <a:extLst>
-              <a:ext uri="{FF2B5EF4-FFF2-40B4-BE49-F238E27FC236}">
-                <a16:creationId xmlns:a16="http://schemas.microsoft.com/office/drawing/2014/main" id="{5EA32C45-C236-34C0-430F-136B93C49ACF}"/>
-              </a:ext>
-            </a:extLst>
-          </p:cNvPr>
-          <p:cNvSpPr>
-            <a:spLocks noGrp="1"/>
-          </p:cNvSpPr>
-          <p:nvPr>
-            <p:ph type="ftr" sz="quarter" idx="11"/>
-          </p:nvPr>
-        </p:nvSpPr>
-        <p:spPr>
-          <a:xfrm>
-            <a:off x="3632200" y="6583680"/>
-            <a:ext cx="4426094" cy="274320"/>
-          </a:xfrm>
-        </p:spPr>
-        <p:txBody>
-          <a:bodyPr/>
-          <a:lstStyle/>
-          <a:p>
-            <a:r>
-              <a:rPr lang="en-US" altLang="en-US"/>
-              <a:t>YETANOTHERMASTERYLEARNING</a:t>
-            </a:r>
-          </a:p>
-        </p:txBody>
-      </p:sp>
-      <p:sp>
-        <p:nvSpPr>
           <p:cNvPr id="36" name="Rectangle 3">
             <a:extLst>
               <a:ext uri="{FF2B5EF4-FFF2-40B4-BE49-F238E27FC236}">
@@ -10408,7 +10030,7 @@
         </p:nvSpPr>
         <p:spPr>
           <a:xfrm>
-            <a:off x="457200" y="1600200"/>
+            <a:off x="1981200" y="1600201"/>
             <a:ext cx="8229600" cy="4525963"/>
           </a:xfrm>
           <a:prstGeom prst="rect">
@@ -10668,7 +10290,7 @@
         </p:nvGrpSpPr>
         <p:grpSpPr bwMode="auto">
           <a:xfrm>
-            <a:off x="547371" y="1565304"/>
+            <a:off x="2071371" y="1565304"/>
             <a:ext cx="8229600" cy="4897792"/>
             <a:chOff x="528" y="816"/>
             <a:chExt cx="4704" cy="3168"/>
@@ -10846,7 +10468,7 @@
           <p:spPr bwMode="auto">
             <a:xfrm>
               <a:off x="2496" y="816"/>
-              <a:ext cx="720" cy="252"/>
+              <a:ext cx="720" cy="259"/>
             </a:xfrm>
             <a:prstGeom prst="rect">
               <a:avLst/>
@@ -11013,7 +10635,7 @@
         </p:nvGrpSpPr>
         <p:grpSpPr bwMode="auto">
           <a:xfrm>
-            <a:off x="858414" y="2502634"/>
+            <a:off x="2382414" y="2502634"/>
             <a:ext cx="3904602" cy="3304234"/>
             <a:chOff x="765" y="1185"/>
             <a:chExt cx="3183" cy="2655"/>
@@ -11676,10 +11298,10 @@
         </p:nvGrpSpPr>
         <p:grpSpPr bwMode="auto">
           <a:xfrm>
-            <a:off x="990621" y="2960120"/>
-            <a:ext cx="2665902" cy="2071166"/>
+            <a:off x="2514621" y="2960120"/>
+            <a:ext cx="2665902" cy="1365006"/>
             <a:chOff x="937" y="1465"/>
-            <a:chExt cx="2135" cy="1751"/>
+            <a:chExt cx="2135" cy="1154"/>
           </a:xfrm>
         </p:grpSpPr>
         <p:sp>
@@ -11698,8 +11320,8 @@
           </p:nvSpPr>
           <p:spPr bwMode="auto">
             <a:xfrm>
-              <a:off x="937" y="1475"/>
-              <a:ext cx="2135" cy="1741"/>
+              <a:off x="937" y="2072"/>
+              <a:ext cx="2135" cy="547"/>
             </a:xfrm>
             <a:prstGeom prst="flowChartAlternateProcess">
               <a:avLst/>
@@ -12021,10 +11643,10 @@
         </p:nvGrpSpPr>
         <p:grpSpPr bwMode="auto">
           <a:xfrm>
-            <a:off x="1321504" y="3374269"/>
-            <a:ext cx="2031296" cy="320107"/>
-            <a:chOff x="1056" y="1584"/>
-            <a:chExt cx="1872" cy="192"/>
+            <a:off x="2845504" y="3242560"/>
+            <a:ext cx="2031296" cy="585196"/>
+            <a:chOff x="1056" y="1505"/>
+            <a:chExt cx="1872" cy="351"/>
           </a:xfrm>
         </p:grpSpPr>
         <p:sp>
@@ -12043,8 +11665,8 @@
           </p:nvSpPr>
           <p:spPr bwMode="auto">
             <a:xfrm>
-              <a:off x="1056" y="1584"/>
-              <a:ext cx="1872" cy="192"/>
+              <a:off x="1056" y="1505"/>
+              <a:ext cx="1872" cy="351"/>
             </a:xfrm>
             <a:prstGeom prst="flowChartProcess">
               <a:avLst/>
@@ -12366,10 +11988,10 @@
         </p:nvGrpSpPr>
         <p:grpSpPr bwMode="auto">
           <a:xfrm>
-            <a:off x="1303708" y="3824219"/>
-            <a:ext cx="2031296" cy="348478"/>
-            <a:chOff x="1056" y="1872"/>
-            <a:chExt cx="1872" cy="480"/>
+            <a:off x="2827708" y="3705883"/>
+            <a:ext cx="2031296" cy="584427"/>
+            <a:chOff x="1056" y="1709"/>
+            <a:chExt cx="1872" cy="805"/>
           </a:xfrm>
         </p:grpSpPr>
         <p:sp>
@@ -12388,8 +12010,8 @@
           </p:nvSpPr>
           <p:spPr bwMode="auto">
             <a:xfrm>
-              <a:off x="1056" y="1872"/>
-              <a:ext cx="1872" cy="480"/>
+              <a:off x="1056" y="1709"/>
+              <a:ext cx="1872" cy="805"/>
             </a:xfrm>
             <a:prstGeom prst="flowChartProcess">
               <a:avLst/>
@@ -12711,10 +12333,10 @@
         </p:nvGrpSpPr>
         <p:grpSpPr bwMode="auto">
           <a:xfrm>
-            <a:off x="1321505" y="4578762"/>
-            <a:ext cx="2031296" cy="321112"/>
-            <a:chOff x="1056" y="2448"/>
-            <a:chExt cx="1872" cy="528"/>
+            <a:off x="2845505" y="4446789"/>
+            <a:ext cx="2031296" cy="585056"/>
+            <a:chOff x="1056" y="2231"/>
+            <a:chExt cx="1872" cy="962"/>
           </a:xfrm>
         </p:grpSpPr>
         <p:sp>
@@ -12733,8 +12355,8 @@
           </p:nvSpPr>
           <p:spPr bwMode="auto">
             <a:xfrm>
-              <a:off x="1056" y="2448"/>
-              <a:ext cx="1872" cy="528"/>
+              <a:off x="1056" y="2231"/>
+              <a:ext cx="1872" cy="962"/>
             </a:xfrm>
             <a:prstGeom prst="flowChartProcess">
               <a:avLst/>
@@ -13056,10 +12678,10 @@
         </p:nvGrpSpPr>
         <p:grpSpPr bwMode="auto">
           <a:xfrm>
-            <a:off x="2373775" y="3867773"/>
-            <a:ext cx="1248067" cy="1064580"/>
-            <a:chOff x="1920" y="1920"/>
-            <a:chExt cx="677" cy="829"/>
+            <a:off x="3897776" y="3691842"/>
+            <a:ext cx="1248067" cy="1359940"/>
+            <a:chOff x="1920" y="1783"/>
+            <a:chExt cx="677" cy="1059"/>
           </a:xfrm>
         </p:grpSpPr>
         <p:sp>
@@ -13078,8 +12700,8 @@
           </p:nvSpPr>
           <p:spPr bwMode="auto">
             <a:xfrm>
-              <a:off x="1920" y="1920"/>
-              <a:ext cx="431" cy="182"/>
+              <a:off x="1920" y="1783"/>
+              <a:ext cx="431" cy="455"/>
             </a:xfrm>
             <a:prstGeom prst="flowChartProcess">
               <a:avLst/>
@@ -13229,7 +12851,7 @@
           <p:spPr bwMode="auto">
             <a:xfrm>
               <a:off x="1920" y="1940"/>
-              <a:ext cx="672" cy="182"/>
+              <a:ext cx="672" cy="216"/>
             </a:xfrm>
             <a:prstGeom prst="rect">
               <a:avLst/>
@@ -13400,8 +13022,8 @@
           </p:nvSpPr>
           <p:spPr bwMode="auto">
             <a:xfrm>
-              <a:off x="1920" y="2524"/>
-              <a:ext cx="431" cy="182"/>
+              <a:off x="1920" y="2387"/>
+              <a:ext cx="431" cy="455"/>
             </a:xfrm>
             <a:prstGeom prst="flowChartProcess">
               <a:avLst/>
@@ -13723,7 +13345,7 @@
         </p:nvSpPr>
         <p:spPr bwMode="auto">
           <a:xfrm>
-            <a:off x="5490877" y="4739313"/>
+            <a:off x="7014878" y="4739313"/>
             <a:ext cx="3116401" cy="1035946"/>
           </a:xfrm>
           <a:prstGeom prst="rect">
@@ -13736,7 +13358,7 @@
           </a:bodyPr>
           <a:lstStyle/>
           <a:p>
-            <a:pPr marL="91440" indent="-91440" defTabSz="914400">
+            <a:pPr marL="91440" indent="-91440">
               <a:lnSpc>
                 <a:spcPct val="90000"/>
               </a:lnSpc>
@@ -13761,7 +13383,7 @@
             </a:r>
           </a:p>
           <a:p>
-            <a:pPr marL="91440" indent="-91440" defTabSz="914400">
+            <a:pPr marL="91440" indent="-91440">
               <a:lnSpc>
                 <a:spcPct val="90000"/>
               </a:lnSpc>
@@ -13786,7 +13408,7 @@
             </a:r>
           </a:p>
           <a:p>
-            <a:pPr marL="91440" indent="-91440" defTabSz="914400">
+            <a:pPr marL="91440" indent="-91440">
               <a:lnSpc>
                 <a:spcPct val="90000"/>
               </a:lnSpc>
@@ -13828,7 +13450,7 @@
         </p:nvGrpSpPr>
         <p:grpSpPr bwMode="auto">
           <a:xfrm>
-            <a:off x="722799" y="1989481"/>
+            <a:off x="2246800" y="1989482"/>
             <a:ext cx="4458801" cy="3817387"/>
             <a:chOff x="528" y="751"/>
             <a:chExt cx="3303" cy="2958"/>
@@ -14006,7 +13628,7 @@
           <p:spPr bwMode="auto">
             <a:xfrm>
               <a:off x="1516" y="751"/>
-              <a:ext cx="924" cy="275"/>
+              <a:ext cx="924" cy="310"/>
             </a:xfrm>
             <a:prstGeom prst="rect">
               <a:avLst/>
@@ -14173,7 +13795,7 @@
         </p:nvSpPr>
         <p:spPr bwMode="auto">
           <a:xfrm>
-            <a:off x="4109182" y="3292417"/>
+            <a:off x="5633182" y="3292418"/>
             <a:ext cx="647700" cy="657113"/>
           </a:xfrm>
           <a:prstGeom prst="flowChartDocument">
@@ -14321,7 +13943,7 @@
         </p:nvSpPr>
         <p:spPr bwMode="auto">
           <a:xfrm>
-            <a:off x="4111104" y="4082200"/>
+            <a:off x="5635104" y="4082201"/>
             <a:ext cx="647700" cy="657113"/>
           </a:xfrm>
           <a:prstGeom prst="flowChartDocument">
@@ -14469,7 +14091,7 @@
         </p:nvSpPr>
         <p:spPr bwMode="auto">
           <a:xfrm>
-            <a:off x="4134149" y="3357865"/>
+            <a:off x="5658149" y="3357866"/>
             <a:ext cx="647700" cy="338513"/>
           </a:xfrm>
           <a:prstGeom prst="rect">
@@ -14641,7 +14263,7 @@
         </p:nvSpPr>
         <p:spPr bwMode="auto">
           <a:xfrm>
-            <a:off x="4072329" y="4107777"/>
+            <a:off x="5596329" y="4107778"/>
             <a:ext cx="647700" cy="338513"/>
           </a:xfrm>
           <a:prstGeom prst="rect">
@@ -14813,7 +14435,7 @@
         </p:nvGrpSpPr>
         <p:grpSpPr bwMode="auto">
           <a:xfrm>
-            <a:off x="5334000" y="2202396"/>
+            <a:off x="6858000" y="2202396"/>
             <a:ext cx="2818244" cy="729980"/>
             <a:chOff x="528" y="165"/>
             <a:chExt cx="3303" cy="3544"/>
@@ -15158,7 +14780,7 @@
         </p:nvGrpSpPr>
         <p:grpSpPr bwMode="auto">
           <a:xfrm>
-            <a:off x="5486400" y="2507196"/>
+            <a:off x="7010400" y="2507196"/>
             <a:ext cx="2818244" cy="729980"/>
             <a:chOff x="528" y="165"/>
             <a:chExt cx="3303" cy="3544"/>
@@ -15503,7 +15125,7 @@
         </p:nvGrpSpPr>
         <p:grpSpPr bwMode="auto">
           <a:xfrm>
-            <a:off x="5639956" y="2735796"/>
+            <a:off x="7163956" y="2735796"/>
             <a:ext cx="2818244" cy="729980"/>
             <a:chOff x="528" y="165"/>
             <a:chExt cx="3303" cy="3544"/>
@@ -16834,34 +16456,6 @@
           </a:p>
         </p:txBody>
       </p:sp>
-      <p:sp>
-        <p:nvSpPr>
-          <p:cNvPr id="2" name="Footer Placeholder 1">
-            <a:extLst>
-              <a:ext uri="{FF2B5EF4-FFF2-40B4-BE49-F238E27FC236}">
-                <a16:creationId xmlns:a16="http://schemas.microsoft.com/office/drawing/2014/main" id="{010654A6-AE95-2915-FB63-B76A6E563E65}"/>
-              </a:ext>
-            </a:extLst>
-          </p:cNvPr>
-          <p:cNvSpPr>
-            <a:spLocks noGrp="1"/>
-          </p:cNvSpPr>
-          <p:nvPr>
-            <p:ph type="ftr" sz="quarter" idx="11"/>
-          </p:nvPr>
-        </p:nvSpPr>
-        <p:spPr/>
-        <p:txBody>
-          <a:bodyPr/>
-          <a:lstStyle/>
-          <a:p>
-            <a:r>
-              <a:rPr lang="en-US" altLang="en-US"/>
-              <a:t>YETANOTHERMASTERYLEARNING</a:t>
-            </a:r>
-          </a:p>
-        </p:txBody>
-      </p:sp>
     </p:spTree>
   </p:cSld>
   <p:clrMapOvr>
@@ -17081,34 +16675,6 @@
             <a:endParaRPr lang="en-US" altLang="en-US" dirty="0">
               <a:latin typeface="Calibri" panose="020F0502020204030204" pitchFamily="34" charset="0"/>
             </a:endParaRPr>
-          </a:p>
-        </p:txBody>
-      </p:sp>
-      <p:sp>
-        <p:nvSpPr>
-          <p:cNvPr id="2" name="Footer Placeholder 1">
-            <a:extLst>
-              <a:ext uri="{FF2B5EF4-FFF2-40B4-BE49-F238E27FC236}">
-                <a16:creationId xmlns:a16="http://schemas.microsoft.com/office/drawing/2014/main" id="{F8216C57-56A8-A415-2F02-9CD69806B71C}"/>
-              </a:ext>
-            </a:extLst>
-          </p:cNvPr>
-          <p:cNvSpPr>
-            <a:spLocks noGrp="1"/>
-          </p:cNvSpPr>
-          <p:nvPr>
-            <p:ph type="ftr" sz="quarter" idx="11"/>
-          </p:nvPr>
-        </p:nvSpPr>
-        <p:spPr/>
-        <p:txBody>
-          <a:bodyPr/>
-          <a:lstStyle/>
-          <a:p>
-            <a:r>
-              <a:rPr lang="en-US" altLang="en-US"/>
-              <a:t>YETANOTHERMASTERYLEARNING</a:t>
-            </a:r>
           </a:p>
         </p:txBody>
       </p:sp>
@@ -17217,7 +16783,7 @@
         </p:nvGrpSpPr>
         <p:grpSpPr bwMode="auto">
           <a:xfrm>
-            <a:off x="1371600" y="1524000"/>
+            <a:off x="2895600" y="1524000"/>
             <a:ext cx="4267200" cy="4572000"/>
             <a:chOff x="864" y="960"/>
             <a:chExt cx="2688" cy="2880"/>
@@ -17823,7 +17389,7 @@
         </p:nvGrpSpPr>
         <p:grpSpPr bwMode="auto">
           <a:xfrm>
-            <a:off x="4572000" y="2514600"/>
+            <a:off x="6096000" y="2514600"/>
             <a:ext cx="3124200" cy="2514600"/>
             <a:chOff x="2880" y="1584"/>
             <a:chExt cx="1968" cy="1584"/>
@@ -18202,34 +17768,6 @@
           </p:txBody>
         </p:sp>
       </p:grpSp>
-      <p:sp>
-        <p:nvSpPr>
-          <p:cNvPr id="2" name="Footer Placeholder 1">
-            <a:extLst>
-              <a:ext uri="{FF2B5EF4-FFF2-40B4-BE49-F238E27FC236}">
-                <a16:creationId xmlns:a16="http://schemas.microsoft.com/office/drawing/2014/main" id="{3E1FBEA0-CAB4-7C4D-5B73-6368EC1DD3CD}"/>
-              </a:ext>
-            </a:extLst>
-          </p:cNvPr>
-          <p:cNvSpPr>
-            <a:spLocks noGrp="1"/>
-          </p:cNvSpPr>
-          <p:nvPr>
-            <p:ph type="ftr" sz="quarter" idx="11"/>
-          </p:nvPr>
-        </p:nvSpPr>
-        <p:spPr/>
-        <p:txBody>
-          <a:bodyPr/>
-          <a:lstStyle/>
-          <a:p>
-            <a:r>
-              <a:rPr lang="en-US" altLang="en-US"/>
-              <a:t>YETANOTHERMASTERYLEARNING</a:t>
-            </a:r>
-          </a:p>
-        </p:txBody>
-      </p:sp>
     </p:spTree>
   </p:cSld>
   <p:clrMapOvr>
@@ -18587,34 +18125,6 @@
             <a:endParaRPr lang="en-US" altLang="en-US" dirty="0">
               <a:latin typeface="Trebuchet MS" panose="020B0703020202090204" pitchFamily="34" charset="0"/>
             </a:endParaRPr>
-          </a:p>
-        </p:txBody>
-      </p:sp>
-      <p:sp>
-        <p:nvSpPr>
-          <p:cNvPr id="2" name="Footer Placeholder 1">
-            <a:extLst>
-              <a:ext uri="{FF2B5EF4-FFF2-40B4-BE49-F238E27FC236}">
-                <a16:creationId xmlns:a16="http://schemas.microsoft.com/office/drawing/2014/main" id="{28C90FC0-27BA-0DD2-E89C-D41340C18F39}"/>
-              </a:ext>
-            </a:extLst>
-          </p:cNvPr>
-          <p:cNvSpPr>
-            <a:spLocks noGrp="1"/>
-          </p:cNvSpPr>
-          <p:nvPr>
-            <p:ph type="ftr" sz="quarter" idx="11"/>
-          </p:nvPr>
-        </p:nvSpPr>
-        <p:spPr/>
-        <p:txBody>
-          <a:bodyPr/>
-          <a:lstStyle/>
-          <a:p>
-            <a:r>
-              <a:rPr lang="en-US" altLang="en-US"/>
-              <a:t>YETANOTHERMASTERYLEARNING</a:t>
-            </a:r>
           </a:p>
         </p:txBody>
       </p:sp>
@@ -18812,34 +18322,6 @@
           </a:p>
         </p:txBody>
       </p:sp>
-      <p:sp>
-        <p:nvSpPr>
-          <p:cNvPr id="2" name="Footer Placeholder 1">
-            <a:extLst>
-              <a:ext uri="{FF2B5EF4-FFF2-40B4-BE49-F238E27FC236}">
-                <a16:creationId xmlns:a16="http://schemas.microsoft.com/office/drawing/2014/main" id="{134E09C7-753A-CD45-6C4B-1B5BA40A87AE}"/>
-              </a:ext>
-            </a:extLst>
-          </p:cNvPr>
-          <p:cNvSpPr>
-            <a:spLocks noGrp="1"/>
-          </p:cNvSpPr>
-          <p:nvPr>
-            <p:ph type="ftr" sz="quarter" idx="11"/>
-          </p:nvPr>
-        </p:nvSpPr>
-        <p:spPr/>
-        <p:txBody>
-          <a:bodyPr/>
-          <a:lstStyle/>
-          <a:p>
-            <a:r>
-              <a:rPr lang="en-US" altLang="en-US"/>
-              <a:t>YETANOTHERMASTERYLEARNING</a:t>
-            </a:r>
-          </a:p>
-        </p:txBody>
-      </p:sp>
     </p:spTree>
   </p:cSld>
   <p:clrMapOvr>
@@ -18883,7 +18365,7 @@
         </p:nvSpPr>
         <p:spPr>
           <a:xfrm>
-            <a:off x="803148" y="588858"/>
+            <a:off x="2327148" y="588858"/>
             <a:ext cx="8188452" cy="1499616"/>
           </a:xfrm>
         </p:spPr>
@@ -18965,7 +18447,7 @@
         </p:nvGrpSpPr>
         <p:grpSpPr bwMode="auto">
           <a:xfrm>
-            <a:off x="1905000" y="1828800"/>
+            <a:off x="3429000" y="1828801"/>
             <a:ext cx="5029200" cy="3355975"/>
             <a:chOff x="1632" y="1152"/>
             <a:chExt cx="3168" cy="2114"/>
@@ -19548,34 +19030,6 @@
           </p:txBody>
         </p:sp>
       </p:grpSp>
-      <p:sp>
-        <p:nvSpPr>
-          <p:cNvPr id="2" name="Footer Placeholder 1">
-            <a:extLst>
-              <a:ext uri="{FF2B5EF4-FFF2-40B4-BE49-F238E27FC236}">
-                <a16:creationId xmlns:a16="http://schemas.microsoft.com/office/drawing/2014/main" id="{37D1E279-FC0C-C0BA-C30D-0A43BC768AD2}"/>
-              </a:ext>
-            </a:extLst>
-          </p:cNvPr>
-          <p:cNvSpPr>
-            <a:spLocks noGrp="1"/>
-          </p:cNvSpPr>
-          <p:nvPr>
-            <p:ph type="ftr" sz="quarter" idx="11"/>
-          </p:nvPr>
-        </p:nvSpPr>
-        <p:spPr/>
-        <p:txBody>
-          <a:bodyPr/>
-          <a:lstStyle/>
-          <a:p>
-            <a:r>
-              <a:rPr lang="en-US" altLang="en-US"/>
-              <a:t>YETANOTHERMASTERYLEARNING</a:t>
-            </a:r>
-          </a:p>
-        </p:txBody>
-      </p:sp>
     </p:spTree>
   </p:cSld>
   <p:clrMapOvr>
@@ -19747,34 +19201,6 @@
             <a:endParaRPr lang="en-US" altLang="en-US" dirty="0">
               <a:latin typeface="Calibri" panose="020F0502020204030204" pitchFamily="34" charset="0"/>
             </a:endParaRPr>
-          </a:p>
-        </p:txBody>
-      </p:sp>
-      <p:sp>
-        <p:nvSpPr>
-          <p:cNvPr id="2" name="Footer Placeholder 1">
-            <a:extLst>
-              <a:ext uri="{FF2B5EF4-FFF2-40B4-BE49-F238E27FC236}">
-                <a16:creationId xmlns:a16="http://schemas.microsoft.com/office/drawing/2014/main" id="{0B502ED6-0380-BD12-0E92-15DE8AF0735E}"/>
-              </a:ext>
-            </a:extLst>
-          </p:cNvPr>
-          <p:cNvSpPr>
-            <a:spLocks noGrp="1"/>
-          </p:cNvSpPr>
-          <p:nvPr>
-            <p:ph type="ftr" sz="quarter" idx="11"/>
-          </p:nvPr>
-        </p:nvSpPr>
-        <p:spPr/>
-        <p:txBody>
-          <a:bodyPr/>
-          <a:lstStyle/>
-          <a:p>
-            <a:r>
-              <a:rPr lang="en-US" altLang="en-US"/>
-              <a:t>YETANOTHERMASTERYLEARNING</a:t>
-            </a:r>
           </a:p>
         </p:txBody>
       </p:sp>
@@ -19821,7 +19247,7 @@
         </p:nvSpPr>
         <p:spPr>
           <a:xfrm>
-            <a:off x="609600" y="585216"/>
+            <a:off x="2133600" y="585216"/>
             <a:ext cx="8833104" cy="1499616"/>
           </a:xfrm>
         </p:spPr>
@@ -19903,7 +19329,7 @@
         </p:nvGrpSpPr>
         <p:grpSpPr bwMode="auto">
           <a:xfrm>
-            <a:off x="2895600" y="1752600"/>
+            <a:off x="4419600" y="1752600"/>
             <a:ext cx="3581400" cy="4114800"/>
             <a:chOff x="2160" y="1104"/>
             <a:chExt cx="2256" cy="2592"/>
@@ -20543,34 +19969,6 @@
           </p:txBody>
         </p:sp>
       </p:grpSp>
-      <p:sp>
-        <p:nvSpPr>
-          <p:cNvPr id="2" name="Footer Placeholder 1">
-            <a:extLst>
-              <a:ext uri="{FF2B5EF4-FFF2-40B4-BE49-F238E27FC236}">
-                <a16:creationId xmlns:a16="http://schemas.microsoft.com/office/drawing/2014/main" id="{2AF29A4E-1338-4E70-9C9E-7DB7B97F234B}"/>
-              </a:ext>
-            </a:extLst>
-          </p:cNvPr>
-          <p:cNvSpPr>
-            <a:spLocks noGrp="1"/>
-          </p:cNvSpPr>
-          <p:nvPr>
-            <p:ph type="ftr" sz="quarter" idx="11"/>
-          </p:nvPr>
-        </p:nvSpPr>
-        <p:spPr/>
-        <p:txBody>
-          <a:bodyPr/>
-          <a:lstStyle/>
-          <a:p>
-            <a:r>
-              <a:rPr lang="en-US" altLang="en-US"/>
-              <a:t>YETANOTHERMASTERYLEARNING</a:t>
-            </a:r>
-          </a:p>
-        </p:txBody>
-      </p:sp>
     </p:spTree>
   </p:cSld>
   <p:clrMapOvr>
@@ -20580,9 +19978,9 @@
 </file>
 
 <file path=ppt/theme/theme1.xml><?xml version="1.0" encoding="utf-8"?>
-<a:theme xmlns:a="http://schemas.openxmlformats.org/drawingml/2006/main" name="Integral">
+<a:theme xmlns:a="http://schemas.openxmlformats.org/drawingml/2006/main" name="Office Theme">
   <a:themeElements>
-    <a:clrScheme name="Integral">
+    <a:clrScheme name="Office">
       <a:dk1>
         <a:sysClr val="windowText" lastClr="000000"/>
       </a:dk1>
@@ -20590,50 +19988,100 @@
         <a:sysClr val="window" lastClr="FFFFFF"/>
       </a:lt1>
       <a:dk2>
-        <a:srgbClr val="373545"/>
+        <a:srgbClr val="44546A"/>
       </a:dk2>
       <a:lt2>
-        <a:srgbClr val="CEDBE6"/>
+        <a:srgbClr val="E7E6E6"/>
       </a:lt2>
       <a:accent1>
-        <a:srgbClr val="3494BA"/>
+        <a:srgbClr val="4472C4"/>
       </a:accent1>
       <a:accent2>
-        <a:srgbClr val="58B6C0"/>
+        <a:srgbClr val="ED7D31"/>
       </a:accent2>
       <a:accent3>
-        <a:srgbClr val="75BDA7"/>
+        <a:srgbClr val="A5A5A5"/>
       </a:accent3>
       <a:accent4>
-        <a:srgbClr val="7A8C8E"/>
+        <a:srgbClr val="FFC000"/>
       </a:accent4>
       <a:accent5>
-        <a:srgbClr val="84ACB6"/>
+        <a:srgbClr val="5B9BD5"/>
       </a:accent5>
       <a:accent6>
-        <a:srgbClr val="2683C6"/>
+        <a:srgbClr val="70AD47"/>
       </a:accent6>
       <a:hlink>
-        <a:srgbClr val="6B9F25"/>
+        <a:srgbClr val="0563C1"/>
       </a:hlink>
       <a:folHlink>
-        <a:srgbClr val="B26B02"/>
+        <a:srgbClr val="954F72"/>
       </a:folHlink>
     </a:clrScheme>
-    <a:fontScheme name="Integral">
+    <a:fontScheme name="Office">
       <a:majorFont>
-        <a:latin typeface="Tw Cen MT Condensed" panose="020B0606020104020203"/>
+        <a:latin typeface="Calibri Light" panose="020F0302020204030204"/>
         <a:ea typeface=""/>
         <a:cs typeface=""/>
-        <a:font script="Grek" typeface="Calibri"/>
-        <a:font script="Cyrl" typeface="Calibri"/>
-        <a:font script="Jpan" typeface="メイリオ"/>
-        <a:font script="Hang" typeface="HY얕은샘물M"/>
-        <a:font script="Hans" typeface="华文仿宋"/>
-        <a:font script="Hant" typeface="微軟正黑體"/>
+        <a:font script="Jpan" typeface="游ゴシック Light"/>
+        <a:font script="Hang" typeface="맑은 고딕"/>
+        <a:font script="Hans" typeface="等线 Light"/>
+        <a:font script="Hant" typeface="新細明體"/>
+        <a:font script="Arab" typeface="Times New Roman"/>
+        <a:font script="Hebr" typeface="Times New Roman"/>
+        <a:font script="Thai" typeface="Angsana New"/>
+        <a:font script="Ethi" typeface="Nyala"/>
+        <a:font script="Beng" typeface="Vrinda"/>
+        <a:font script="Gujr" typeface="Shruti"/>
+        <a:font script="Khmr" typeface="MoolBoran"/>
+        <a:font script="Knda" typeface="Tunga"/>
+        <a:font script="Guru" typeface="Raavi"/>
+        <a:font script="Cans" typeface="Euphemia"/>
+        <a:font script="Cher" typeface="Plantagenet Cherokee"/>
+        <a:font script="Yiii" typeface="Microsoft Yi Baiti"/>
+        <a:font script="Tibt" typeface="Microsoft Himalaya"/>
+        <a:font script="Thaa" typeface="MV Boli"/>
+        <a:font script="Deva" typeface="Mangal"/>
+        <a:font script="Telu" typeface="Gautami"/>
+        <a:font script="Taml" typeface="Latha"/>
+        <a:font script="Syrc" typeface="Estrangelo Edessa"/>
+        <a:font script="Orya" typeface="Kalinga"/>
+        <a:font script="Mlym" typeface="Kartika"/>
+        <a:font script="Laoo" typeface="DokChampa"/>
+        <a:font script="Sinh" typeface="Iskoola Pota"/>
+        <a:font script="Mong" typeface="Mongolian Baiti"/>
+        <a:font script="Viet" typeface="Times New Roman"/>
+        <a:font script="Uigh" typeface="Microsoft Uighur"/>
+        <a:font script="Geor" typeface="Sylfaen"/>
+        <a:font script="Armn" typeface="Arial"/>
+        <a:font script="Bugi" typeface="Leelawadee UI"/>
+        <a:font script="Bopo" typeface="Microsoft JhengHei"/>
+        <a:font script="Java" typeface="Javanese Text"/>
+        <a:font script="Lisu" typeface="Segoe UI"/>
+        <a:font script="Mymr" typeface="Myanmar Text"/>
+        <a:font script="Nkoo" typeface="Ebrima"/>
+        <a:font script="Olck" typeface="Nirmala UI"/>
+        <a:font script="Osma" typeface="Ebrima"/>
+        <a:font script="Phag" typeface="Phagspa"/>
+        <a:font script="Syrn" typeface="Estrangelo Edessa"/>
+        <a:font script="Syrj" typeface="Estrangelo Edessa"/>
+        <a:font script="Syre" typeface="Estrangelo Edessa"/>
+        <a:font script="Sora" typeface="Nirmala UI"/>
+        <a:font script="Tale" typeface="Microsoft Tai Le"/>
+        <a:font script="Talu" typeface="Microsoft New Tai Lue"/>
+        <a:font script="Tfng" typeface="Ebrima"/>
+      </a:majorFont>
+      <a:minorFont>
+        <a:latin typeface="Calibri" panose="020F0502020204030204"/>
+        <a:ea typeface=""/>
+        <a:cs typeface=""/>
+        <a:font script="Jpan" typeface="游ゴシック"/>
+        <a:font script="Hang" typeface="맑은 고딕"/>
+        <a:font script="Hans" typeface="等线"/>
+        <a:font script="Hant" typeface="新細明體"/>
         <a:font script="Arab" typeface="Arial"/>
-        <a:font script="Hebr" typeface="Levenim MT"/>
-        <a:font script="Thai" typeface="FreesiaUPC"/>
+        <a:font script="Hebr" typeface="Arial"/>
+        <a:font script="Thai" typeface="Cordia New"/>
         <a:font script="Ethi" typeface="Nyala"/>
         <a:font script="Beng" typeface="Vrinda"/>
         <a:font script="Gujr" typeface="Shruti"/>
@@ -20654,49 +20102,29 @@
         <a:font script="Laoo" typeface="DokChampa"/>
         <a:font script="Sinh" typeface="Iskoola Pota"/>
         <a:font script="Mong" typeface="Mongolian Baiti"/>
-        <a:font script="Viet" typeface="Tahoma"/>
+        <a:font script="Viet" typeface="Arial"/>
         <a:font script="Uigh" typeface="Microsoft Uighur"/>
         <a:font script="Geor" typeface="Sylfaen"/>
-      </a:majorFont>
-      <a:minorFont>
-        <a:latin typeface="Tw Cen MT" panose="020B0602020104020603"/>
-        <a:ea typeface=""/>
-        <a:cs typeface=""/>
-        <a:font script="Grek" typeface="Calibri"/>
-        <a:font script="Cyrl" typeface="Calibri"/>
-        <a:font script="Jpan" typeface="メイリオ"/>
-        <a:font script="Hang" typeface="HY얕은샘물M"/>
-        <a:font script="Hans" typeface="华文仿宋"/>
-        <a:font script="Hant" typeface="微軟正黑體"/>
-        <a:font script="Arab" typeface="Arial"/>
-        <a:font script="Hebr" typeface="Levenim MT"/>
-        <a:font script="Thai" typeface="FreesiaUPC"/>
-        <a:font script="Ethi" typeface="Nyala"/>
-        <a:font script="Beng" typeface="Vrinda"/>
-        <a:font script="Gujr" typeface="Shruti"/>
-        <a:font script="Khmr" typeface="DaunPenh"/>
-        <a:font script="Knda" typeface="Tunga"/>
-        <a:font script="Guru" typeface="Raavi"/>
-        <a:font script="Cans" typeface="Euphemia"/>
-        <a:font script="Cher" typeface="Plantagenet Cherokee"/>
-        <a:font script="Yiii" typeface="Microsoft Yi Baiti"/>
-        <a:font script="Tibt" typeface="Microsoft Himalaya"/>
-        <a:font script="Thaa" typeface="MV Boli"/>
-        <a:font script="Deva" typeface="Mangal"/>
-        <a:font script="Telu" typeface="Gautami"/>
-        <a:font script="Taml" typeface="Latha"/>
-        <a:font script="Syrc" typeface="Estrangelo Edessa"/>
-        <a:font script="Orya" typeface="Kalinga"/>
-        <a:font script="Mlym" typeface="Kartika"/>
-        <a:font script="Laoo" typeface="DokChampa"/>
-        <a:font script="Sinh" typeface="Iskoola Pota"/>
-        <a:font script="Mong" typeface="Mongolian Baiti"/>
-        <a:font script="Viet" typeface="Tahoma"/>
-        <a:font script="Uigh" typeface="Microsoft Uighur"/>
-        <a:font script="Geor" typeface="Sylfaen"/>
+        <a:font script="Armn" typeface="Arial"/>
+        <a:font script="Bugi" typeface="Leelawadee UI"/>
+        <a:font script="Bopo" typeface="Microsoft JhengHei"/>
+        <a:font script="Java" typeface="Javanese Text"/>
+        <a:font script="Lisu" typeface="Segoe UI"/>
+        <a:font script="Mymr" typeface="Myanmar Text"/>
+        <a:font script="Nkoo" typeface="Ebrima"/>
+        <a:font script="Olck" typeface="Nirmala UI"/>
+        <a:font script="Osma" typeface="Ebrima"/>
+        <a:font script="Phag" typeface="Phagspa"/>
+        <a:font script="Syrn" typeface="Estrangelo Edessa"/>
+        <a:font script="Syrj" typeface="Estrangelo Edessa"/>
+        <a:font script="Syre" typeface="Estrangelo Edessa"/>
+        <a:font script="Sora" typeface="Nirmala UI"/>
+        <a:font script="Tale" typeface="Microsoft Tai Le"/>
+        <a:font script="Talu" typeface="Microsoft New Tai Lue"/>
+        <a:font script="Tfng" typeface="Ebrima"/>
       </a:minorFont>
     </a:fontScheme>
-    <a:fmtScheme name="Integral">
+    <a:fmtScheme name="Office">
       <a:fillStyleLst>
         <a:solidFill>
           <a:schemeClr val="phClr"/>
@@ -20705,65 +20133,76 @@
           <a:gsLst>
             <a:gs pos="0">
               <a:schemeClr val="phClr">
-                <a:tint val="83000"/>
-                <a:satMod val="100000"/>
-                <a:lumMod val="100000"/>
+                <a:lumMod val="110000"/>
+                <a:satMod val="105000"/>
+                <a:tint val="67000"/>
+              </a:schemeClr>
+            </a:gs>
+            <a:gs pos="50000">
+              <a:schemeClr val="phClr">
+                <a:lumMod val="105000"/>
+                <a:satMod val="103000"/>
+                <a:tint val="73000"/>
               </a:schemeClr>
             </a:gs>
             <a:gs pos="100000">
               <a:schemeClr val="phClr">
-                <a:tint val="61000"/>
-                <a:satMod val="150000"/>
-                <a:lumMod val="100000"/>
+                <a:lumMod val="105000"/>
+                <a:satMod val="109000"/>
+                <a:tint val="81000"/>
               </a:schemeClr>
             </a:gs>
           </a:gsLst>
-          <a:path path="circle">
-            <a:fillToRect l="100000" t="100000" r="100000" b="100000"/>
-          </a:path>
+          <a:lin ang="5400000" scaled="0"/>
         </a:gradFill>
         <a:gradFill rotWithShape="1">
           <a:gsLst>
             <a:gs pos="0">
               <a:schemeClr val="phClr">
-                <a:tint val="100000"/>
-                <a:shade val="85000"/>
-                <a:satMod val="100000"/>
+                <a:satMod val="103000"/>
+                <a:lumMod val="102000"/>
+                <a:tint val="94000"/>
+              </a:schemeClr>
+            </a:gs>
+            <a:gs pos="50000">
+              <a:schemeClr val="phClr">
+                <a:satMod val="110000"/>
                 <a:lumMod val="100000"/>
+                <a:shade val="100000"/>
               </a:schemeClr>
             </a:gs>
             <a:gs pos="100000">
               <a:schemeClr val="phClr">
-                <a:tint val="90000"/>
-                <a:shade val="100000"/>
-                <a:satMod val="150000"/>
-                <a:lumMod val="100000"/>
+                <a:lumMod val="99000"/>
+                <a:satMod val="120000"/>
+                <a:shade val="78000"/>
               </a:schemeClr>
             </a:gs>
           </a:gsLst>
-          <a:path path="circle">
-            <a:fillToRect l="100000" t="100000" r="100000" b="100000"/>
-          </a:path>
+          <a:lin ang="5400000" scaled="0"/>
         </a:gradFill>
       </a:fillStyleLst>
       <a:lnStyleLst>
-        <a:ln w="9525" cap="flat" cmpd="sng" algn="ctr">
+        <a:ln w="6350" cap="flat" cmpd="sng" algn="ctr">
           <a:solidFill>
             <a:schemeClr val="phClr"/>
           </a:solidFill>
           <a:prstDash val="solid"/>
+          <a:miter lim="800000"/>
         </a:ln>
-        <a:ln w="15875" cap="flat" cmpd="sng" algn="ctr">
+        <a:ln w="12700" cap="flat" cmpd="sng" algn="ctr">
           <a:solidFill>
             <a:schemeClr val="phClr"/>
           </a:solidFill>
           <a:prstDash val="solid"/>
+          <a:miter lim="800000"/>
         </a:ln>
         <a:ln w="19050" cap="flat" cmpd="sng" algn="ctr">
           <a:solidFill>
             <a:schemeClr val="phClr"/>
           </a:solidFill>
           <a:prstDash val="solid"/>
+          <a:miter lim="800000"/>
         </a:ln>
       </a:lnStyleLst>
       <a:effectStyleLst>
@@ -20771,39 +20210,16 @@
           <a:effectLst/>
         </a:effectStyle>
         <a:effectStyle>
+          <a:effectLst/>
+        </a:effectStyle>
+        <a:effectStyle>
           <a:effectLst>
-            <a:outerShdw blurRad="50800" dist="12700" dir="5400000" algn="ctr" rotWithShape="0">
+            <a:outerShdw blurRad="57150" dist="19050" dir="5400000" algn="ctr" rotWithShape="0">
               <a:srgbClr val="000000">
-                <a:alpha val="50000"/>
+                <a:alpha val="63000"/>
               </a:srgbClr>
             </a:outerShdw>
           </a:effectLst>
-        </a:effectStyle>
-        <a:effectStyle>
-          <a:effectLst>
-            <a:outerShdw blurRad="76200" dist="25400" dir="5400000" algn="ctr" rotWithShape="0">
-              <a:srgbClr val="000000">
-                <a:alpha val="60000"/>
-              </a:srgbClr>
-            </a:outerShdw>
-          </a:effectLst>
-          <a:scene3d>
-            <a:camera prst="orthographicFront">
-              <a:rot lat="0" lon="0" rev="0"/>
-            </a:camera>
-            <a:lightRig rig="flat" dir="t">
-              <a:rot lat="0" lon="0" rev="3600000"/>
-            </a:lightRig>
-          </a:scene3d>
-          <a:sp3d contourW="12700" prstMaterial="flat">
-            <a:bevelT w="38100" h="44450" prst="angle"/>
-            <a:contourClr>
-              <a:schemeClr val="phClr">
-                <a:shade val="35000"/>
-                <a:satMod val="160000"/>
-              </a:schemeClr>
-            </a:contourClr>
-          </a:sp3d>
         </a:effectStyle>
       </a:effectStyleLst>
       <a:bgFillStyleLst>
@@ -20813,27 +20229,36 @@
         <a:solidFill>
           <a:schemeClr val="phClr">
             <a:tint val="95000"/>
-            <a:shade val="85000"/>
-            <a:satMod val="125000"/>
+            <a:satMod val="170000"/>
           </a:schemeClr>
         </a:solidFill>
-        <a:blipFill rotWithShape="1">
-          <a:blip xmlns:r="http://schemas.openxmlformats.org/officeDocument/2006/relationships" r:embed="rId1">
-            <a:duotone>
+        <a:gradFill rotWithShape="1">
+          <a:gsLst>
+            <a:gs pos="0">
               <a:schemeClr val="phClr">
-                <a:tint val="95000"/>
-                <a:shade val="74000"/>
-                <a:satMod val="230000"/>
+                <a:tint val="93000"/>
+                <a:satMod val="150000"/>
+                <a:shade val="98000"/>
+                <a:lumMod val="102000"/>
               </a:schemeClr>
+            </a:gs>
+            <a:gs pos="50000">
               <a:schemeClr val="phClr">
-                <a:tint val="92000"/>
-                <a:shade val="69000"/>
-                <a:satMod val="250000"/>
+                <a:tint val="98000"/>
+                <a:satMod val="130000"/>
+                <a:shade val="90000"/>
+                <a:lumMod val="103000"/>
               </a:schemeClr>
-            </a:duotone>
-          </a:blip>
-          <a:tile tx="0" ty="0" sx="40000" sy="40000" flip="none" algn="tl"/>
-        </a:blipFill>
+            </a:gs>
+            <a:gs pos="100000">
+              <a:schemeClr val="phClr">
+                <a:shade val="63000"/>
+                <a:satMod val="120000"/>
+              </a:schemeClr>
+            </a:gs>
+          </a:gsLst>
+          <a:lin ang="5400000" scaled="0"/>
+        </a:gradFill>
       </a:bgFillStyleLst>
     </a:fmtScheme>
   </a:themeElements>
@@ -20841,7 +20266,7 @@
   <a:extraClrSchemeLst/>
   <a:extLst>
     <a:ext uri="{05A4C25C-085E-4340-85A3-A5531E510DB2}">
-      <thm15:themeFamily xmlns:thm15="http://schemas.microsoft.com/office/thememl/2012/main" name="Integral" id="{3577F8C9-A904-41D8-97D2-FD898F53F20E}" vid="{C1C93EF2-4785-427F-84A5-F1666490E9CE}"/>
+      <thm15:themeFamily xmlns:thm15="http://schemas.microsoft.com/office/thememl/2012/main" name="Office Theme" id="{62F939B6-93AF-4DB8-9C6B-D6C7DFDC589F}" vid="{4A3C46E8-61CC-4603-A589-7422A47A8E4A}"/>
     </a:ext>
   </a:extLst>
 </a:theme>

</xml_diff>